<commit_message>
Updated lecture slides Ch 3,4
</commit_message>
<xml_diff>
--- a/1400_04_Making Decisions.pptx
+++ b/1400_04_Making Decisions.pptx
@@ -2174,7 +2174,7 @@
               <a:pPr>
                 <a:defRPr/>
               </a:pPr>
-              <a:t>9/22/2022</a:t>
+              <a:t>9/28/2022</a:t>
             </a:fld>
             <a:endParaRPr lang="en-US"/>
           </a:p>
@@ -2470,7 +2470,7 @@
           <a:p>
             <a:fld id="{96DFF08F-DC6B-4601-B491-B0F83F6DD2DA}" type="datetimeFigureOut">
               <a:rPr lang="en-US" smtClean="0"/>
-              <a:t>9/22/2022</a:t>
+              <a:t>9/28/2022</a:t>
             </a:fld>
             <a:endParaRPr lang="en-US" dirty="0"/>
           </a:p>
@@ -2722,7 +2722,7 @@
           <a:p>
             <a:fld id="{96DFF08F-DC6B-4601-B491-B0F83F6DD2DA}" type="datetimeFigureOut">
               <a:rPr lang="en-US" smtClean="0"/>
-              <a:t>9/22/2022</a:t>
+              <a:t>9/28/2022</a:t>
             </a:fld>
             <a:endParaRPr lang="en-US" dirty="0"/>
           </a:p>
@@ -2986,7 +2986,7 @@
           <a:p>
             <a:fld id="{96DFF08F-DC6B-4601-B491-B0F83F6DD2DA}" type="datetimeFigureOut">
               <a:rPr lang="en-US" smtClean="0"/>
-              <a:t>9/22/2022</a:t>
+              <a:t>9/28/2022</a:t>
             </a:fld>
             <a:endParaRPr lang="en-US" dirty="0"/>
           </a:p>
@@ -3162,7 +3162,7 @@
           <a:p>
             <a:fld id="{A3E28D29-1ECB-41DF-951B-2A23F95AD026}" type="datetimeFigureOut">
               <a:rPr lang="en-US" smtClean="0"/>
-              <a:t>9/22/2022</a:t>
+              <a:t>9/28/2022</a:t>
             </a:fld>
             <a:endParaRPr lang="en-US" dirty="0"/>
           </a:p>
@@ -3467,7 +3467,7 @@
           <a:p>
             <a:fld id="{96DFF08F-DC6B-4601-B491-B0F83F6DD2DA}" type="datetimeFigureOut">
               <a:rPr lang="en-US" smtClean="0"/>
-              <a:t>9/22/2022</a:t>
+              <a:t>9/28/2022</a:t>
             </a:fld>
             <a:endParaRPr lang="en-US" dirty="0"/>
           </a:p>
@@ -3786,7 +3786,7 @@
           <a:p>
             <a:fld id="{96DFF08F-DC6B-4601-B491-B0F83F6DD2DA}" type="datetimeFigureOut">
               <a:rPr lang="en-US" smtClean="0"/>
-              <a:t>9/22/2022</a:t>
+              <a:t>9/28/2022</a:t>
             </a:fld>
             <a:endParaRPr lang="en-US" dirty="0"/>
           </a:p>
@@ -4171,7 +4171,7 @@
           <a:p>
             <a:fld id="{96DFF08F-DC6B-4601-B491-B0F83F6DD2DA}" type="datetimeFigureOut">
               <a:rPr lang="en-US" smtClean="0"/>
-              <a:t>9/22/2022</a:t>
+              <a:t>9/28/2022</a:t>
             </a:fld>
             <a:endParaRPr lang="en-US" dirty="0"/>
           </a:p>
@@ -4295,7 +4295,7 @@
           <a:p>
             <a:fld id="{96DFF08F-DC6B-4601-B491-B0F83F6DD2DA}" type="datetimeFigureOut">
               <a:rPr lang="en-US" smtClean="0"/>
-              <a:t>9/22/2022</a:t>
+              <a:t>9/28/2022</a:t>
             </a:fld>
             <a:endParaRPr lang="en-US" dirty="0"/>
           </a:p>
@@ -4475,7 +4475,7 @@
             <a:fld id="{96DFF08F-DC6B-4601-B491-B0F83F6DD2DA}" type="datetimeFigureOut">
               <a:rPr lang="en-US" smtClean="0"/>
               <a:pPr/>
-              <a:t>9/22/2022</a:t>
+              <a:t>9/28/2022</a:t>
             </a:fld>
             <a:endParaRPr lang="en-US" dirty="0"/>
           </a:p>
@@ -4838,7 +4838,7 @@
             <a:fld id="{96DFF08F-DC6B-4601-B491-B0F83F6DD2DA}" type="datetimeFigureOut">
               <a:rPr lang="en-US" smtClean="0"/>
               <a:pPr/>
-              <a:t>9/22/2022</a:t>
+              <a:t>9/28/2022</a:t>
             </a:fld>
             <a:endParaRPr lang="en-US" dirty="0"/>
           </a:p>
@@ -5223,7 +5223,7 @@
           <a:p>
             <a:fld id="{96DFF08F-DC6B-4601-B491-B0F83F6DD2DA}" type="datetimeFigureOut">
               <a:rPr lang="en-US" smtClean="0"/>
-              <a:t>9/22/2022</a:t>
+              <a:t>9/28/2022</a:t>
             </a:fld>
             <a:endParaRPr lang="en-US" dirty="0"/>
           </a:p>
@@ -5519,7 +5519,7 @@
             <a:fld id="{96DFF08F-DC6B-4601-B491-B0F83F6DD2DA}" type="datetimeFigureOut">
               <a:rPr lang="en-US" smtClean="0"/>
               <a:pPr/>
-              <a:t>9/22/2022</a:t>
+              <a:t>9/28/2022</a:t>
             </a:fld>
             <a:endParaRPr lang="en-US" dirty="0"/>
           </a:p>
@@ -6426,73 +6426,63 @@
           <a:bodyPr/>
           <a:lstStyle/>
           <a:p>
-            <a:pPr>
-              <a:buFontTx/>
-              <a:buChar char="•"/>
-            </a:pPr>
-            <a:r>
-              <a:rPr lang="en-US" altLang="en-US"/>
+            <a:r>
+              <a:rPr lang="en-US" altLang="en-US" dirty="0"/>
               <a:t>General Format:</a:t>
             </a:r>
             <a:br>
-              <a:rPr lang="en-US" altLang="en-US"/>
+              <a:rPr lang="en-US" altLang="en-US" dirty="0"/>
             </a:br>
-            <a:endParaRPr lang="en-US" altLang="en-US"/>
-          </a:p>
-          <a:p>
-            <a:pPr lvl="1">
-              <a:buFontTx/>
+            <a:endParaRPr lang="en-US" altLang="en-US" dirty="0"/>
+          </a:p>
+          <a:p>
+            <a:pPr marL="201168" lvl="1" indent="0">
               <a:buNone/>
             </a:pPr>
             <a:r>
-              <a:rPr lang="en-US" altLang="en-US">
+              <a:rPr lang="en-US" altLang="en-US" dirty="0">
                 <a:latin typeface="Courier New" panose="02070309020205020404" pitchFamily="49" charset="0"/>
               </a:rPr>
               <a:t>	if (</a:t>
             </a:r>
             <a:r>
-              <a:rPr lang="en-US" altLang="en-US" i="1">
+              <a:rPr lang="en-US" altLang="en-US" i="1" dirty="0">
                 <a:latin typeface="Courier New" panose="02070309020205020404" pitchFamily="49" charset="0"/>
               </a:rPr>
               <a:t>expression</a:t>
             </a:r>
             <a:r>
-              <a:rPr lang="en-US" altLang="en-US">
+              <a:rPr lang="en-US" altLang="en-US" dirty="0">
                 <a:latin typeface="Courier New" panose="02070309020205020404" pitchFamily="49" charset="0"/>
               </a:rPr>
               <a:t>)</a:t>
             </a:r>
           </a:p>
           <a:p>
-            <a:pPr lvl="1">
-              <a:buFontTx/>
+            <a:pPr marL="201168" lvl="1" indent="0">
               <a:buNone/>
             </a:pPr>
             <a:r>
-              <a:rPr lang="en-US" altLang="en-US">
-                <a:latin typeface="Courier New" panose="02070309020205020404" pitchFamily="49" charset="0"/>
-              </a:rPr>
-              <a:t>			</a:t>
-            </a:r>
-            <a:r>
-              <a:rPr lang="en-US" altLang="en-US" i="1">
+              <a:rPr lang="en-US" altLang="en-US" dirty="0">
+                <a:latin typeface="Courier New" panose="02070309020205020404" pitchFamily="49" charset="0"/>
+              </a:rPr>
+              <a:t>		</a:t>
+            </a:r>
+            <a:r>
+              <a:rPr lang="en-US" altLang="en-US" i="1" dirty="0">
                 <a:latin typeface="Courier New" panose="02070309020205020404" pitchFamily="49" charset="0"/>
               </a:rPr>
               <a:t>statement</a:t>
             </a:r>
             <a:r>
-              <a:rPr lang="en-US" altLang="en-US">
+              <a:rPr lang="en-US" altLang="en-US" dirty="0">
                 <a:latin typeface="Courier New" panose="02070309020205020404" pitchFamily="49" charset="0"/>
               </a:rPr>
               <a:t>;</a:t>
             </a:r>
           </a:p>
           <a:p>
-            <a:pPr>
-              <a:buFontTx/>
-              <a:buChar char="•"/>
-            </a:pPr>
-            <a:endParaRPr lang="en-US" altLang="en-US"/>
+            <a:endParaRPr lang="en-US" altLang="en-US" dirty="0"/>
           </a:p>
         </p:txBody>
       </p:sp>
@@ -6570,163 +6560,145 @@
           <a:bodyPr/>
           <a:lstStyle/>
           <a:p>
-            <a:pPr>
-              <a:buFont typeface="Times" panose="02020603050405020304" pitchFamily="18" charset="0"/>
+            <a:r>
+              <a:rPr lang="en-US" altLang="en-US" dirty="0"/>
+              <a:t>To evaluate:</a:t>
+            </a:r>
+          </a:p>
+          <a:p>
+            <a:pPr marL="201168" lvl="1" indent="0">
               <a:buNone/>
             </a:pPr>
             <a:r>
-              <a:rPr lang="en-US" altLang="en-US"/>
-              <a:t>To evaluate:</a:t>
-            </a:r>
-          </a:p>
-          <a:p>
-            <a:pPr lvl="1">
-              <a:buFontTx/>
+              <a:rPr lang="en-US" altLang="en-US" dirty="0">
+                <a:latin typeface="Courier New" panose="02070309020205020404" pitchFamily="49" charset="0"/>
+              </a:rPr>
+              <a:t>if (</a:t>
+            </a:r>
+            <a:r>
+              <a:rPr lang="en-US" altLang="en-US" i="1" dirty="0">
+                <a:latin typeface="Courier New" panose="02070309020205020404" pitchFamily="49" charset="0"/>
+              </a:rPr>
+              <a:t>expression</a:t>
+            </a:r>
+            <a:r>
+              <a:rPr lang="en-US" altLang="en-US" dirty="0">
+                <a:latin typeface="Courier New" panose="02070309020205020404" pitchFamily="49" charset="0"/>
+              </a:rPr>
+              <a:t>)</a:t>
+            </a:r>
+          </a:p>
+          <a:p>
+            <a:pPr marL="201168" lvl="1" indent="0">
               <a:buNone/>
             </a:pPr>
             <a:r>
-              <a:rPr lang="en-US" altLang="en-US">
-                <a:latin typeface="Courier New" panose="02070309020205020404" pitchFamily="49" charset="0"/>
-              </a:rPr>
-              <a:t>if (</a:t>
-            </a:r>
-            <a:r>
-              <a:rPr lang="en-US" altLang="en-US" i="1">
+              <a:rPr lang="en-US" altLang="en-US" dirty="0">
+                <a:latin typeface="Courier New" panose="02070309020205020404" pitchFamily="49" charset="0"/>
+              </a:rPr>
+              <a:t>	</a:t>
+            </a:r>
+            <a:r>
+              <a:rPr lang="en-US" altLang="en-US" i="1" dirty="0">
+                <a:latin typeface="Courier New" panose="02070309020205020404" pitchFamily="49" charset="0"/>
+              </a:rPr>
+              <a:t>statement</a:t>
+            </a:r>
+            <a:r>
+              <a:rPr lang="en-US" altLang="en-US" dirty="0">
+                <a:latin typeface="Courier New" panose="02070309020205020404" pitchFamily="49" charset="0"/>
+              </a:rPr>
+              <a:t>;</a:t>
+            </a:r>
+            <a:endParaRPr lang="en-US" altLang="en-US" dirty="0"/>
+          </a:p>
+          <a:p>
+            <a:r>
+              <a:rPr lang="en-US" altLang="en-US" dirty="0"/>
+              <a:t>If the </a:t>
+            </a:r>
+            <a:r>
+              <a:rPr lang="en-US" altLang="en-US" i="1" dirty="0">
                 <a:latin typeface="Courier New" panose="02070309020205020404" pitchFamily="49" charset="0"/>
               </a:rPr>
               <a:t>expression</a:t>
             </a:r>
             <a:r>
-              <a:rPr lang="en-US" altLang="en-US">
-                <a:latin typeface="Courier New" panose="02070309020205020404" pitchFamily="49" charset="0"/>
-              </a:rPr>
-              <a:t>)</a:t>
-            </a:r>
-          </a:p>
-          <a:p>
-            <a:pPr lvl="1">
-              <a:buFontTx/>
-              <a:buNone/>
-            </a:pPr>
-            <a:r>
-              <a:rPr lang="en-US" altLang="en-US">
-                <a:latin typeface="Courier New" panose="02070309020205020404" pitchFamily="49" charset="0"/>
-              </a:rPr>
-              <a:t>		 </a:t>
-            </a:r>
-            <a:r>
-              <a:rPr lang="en-US" altLang="en-US" i="1">
+              <a:rPr lang="en-US" altLang="en-US" dirty="0"/>
+              <a:t> is </a:t>
+            </a:r>
+            <a:r>
+              <a:rPr lang="en-US" altLang="en-US" dirty="0">
+                <a:latin typeface="Courier New" panose="02070309020205020404" pitchFamily="49" charset="0"/>
+              </a:rPr>
+              <a:t>true</a:t>
+            </a:r>
+            <a:r>
+              <a:rPr lang="en-US" altLang="en-US" dirty="0"/>
+              <a:t>, then </a:t>
+            </a:r>
+            <a:r>
+              <a:rPr lang="en-US" altLang="en-US" i="1" dirty="0">
                 <a:latin typeface="Courier New" panose="02070309020205020404" pitchFamily="49" charset="0"/>
               </a:rPr>
               <a:t>statement</a:t>
             </a:r>
             <a:r>
-              <a:rPr lang="en-US" altLang="en-US">
-                <a:latin typeface="Courier New" panose="02070309020205020404" pitchFamily="49" charset="0"/>
-              </a:rPr>
-              <a:t>;</a:t>
-            </a:r>
-            <a:endParaRPr lang="en-US" altLang="en-US"/>
-          </a:p>
-          <a:p>
-            <a:pPr>
-              <a:buFontTx/>
-              <a:buChar char="•"/>
-            </a:pPr>
-            <a:r>
-              <a:rPr lang="en-US" altLang="en-US"/>
+              <a:rPr lang="en-US" altLang="en-US" dirty="0"/>
+              <a:t> is executed.</a:t>
+            </a:r>
+            <a:br>
+              <a:rPr lang="en-US" altLang="en-US" dirty="0"/>
+            </a:br>
+            <a:endParaRPr lang="en-US" altLang="en-US" dirty="0"/>
+          </a:p>
+          <a:p>
+            <a:r>
+              <a:rPr lang="en-US" altLang="en-US" dirty="0"/>
               <a:t>If the </a:t>
             </a:r>
             <a:r>
-              <a:rPr lang="en-US" altLang="en-US" i="1">
+              <a:rPr lang="en-US" altLang="en-US" i="1" dirty="0">
                 <a:latin typeface="Courier New" panose="02070309020205020404" pitchFamily="49" charset="0"/>
               </a:rPr>
               <a:t>expression</a:t>
             </a:r>
             <a:r>
-              <a:rPr lang="en-US" altLang="en-US"/>
-              <a:t> is </a:t>
-            </a:r>
-            <a:r>
-              <a:rPr lang="en-US" altLang="en-US">
-                <a:latin typeface="Courier New" panose="02070309020205020404" pitchFamily="49" charset="0"/>
-              </a:rPr>
-              <a:t>true</a:t>
-            </a:r>
-            <a:r>
-              <a:rPr lang="en-US" altLang="en-US"/>
+              <a:rPr lang="en-US" altLang="en-US" dirty="0">
+                <a:latin typeface="Courier New" panose="02070309020205020404" pitchFamily="49" charset="0"/>
+              </a:rPr>
+              <a:t> </a:t>
+            </a:r>
+            <a:r>
+              <a:rPr lang="en-US" altLang="en-US" dirty="0"/>
+              <a:t>is </a:t>
+            </a:r>
+            <a:r>
+              <a:rPr lang="en-US" altLang="en-US" dirty="0">
+                <a:latin typeface="Courier New" panose="02070309020205020404" pitchFamily="49" charset="0"/>
+              </a:rPr>
+              <a:t>false</a:t>
+            </a:r>
+            <a:r>
+              <a:rPr lang="en-US" altLang="en-US" dirty="0"/>
               <a:t>, then </a:t>
             </a:r>
             <a:r>
-              <a:rPr lang="en-US" altLang="en-US" i="1">
+              <a:rPr lang="en-US" altLang="en-US" i="1" dirty="0">
                 <a:latin typeface="Courier New" panose="02070309020205020404" pitchFamily="49" charset="0"/>
               </a:rPr>
               <a:t>statement</a:t>
             </a:r>
             <a:r>
-              <a:rPr lang="en-US" altLang="en-US"/>
-              <a:t> is executed.</a:t>
-            </a:r>
-            <a:br>
-              <a:rPr lang="en-US" altLang="en-US"/>
-            </a:br>
-            <a:endParaRPr lang="en-US" altLang="en-US"/>
-          </a:p>
-          <a:p>
-            <a:pPr>
-              <a:buFontTx/>
-              <a:buChar char="•"/>
-            </a:pPr>
-            <a:r>
-              <a:rPr lang="en-US" altLang="en-US"/>
-              <a:t>If the </a:t>
-            </a:r>
-            <a:r>
-              <a:rPr lang="en-US" altLang="en-US" i="1">
-                <a:latin typeface="Courier New" panose="02070309020205020404" pitchFamily="49" charset="0"/>
-              </a:rPr>
-              <a:t>expression</a:t>
-            </a:r>
-            <a:r>
-              <a:rPr lang="en-US" altLang="en-US">
-                <a:latin typeface="Courier New" panose="02070309020205020404" pitchFamily="49" charset="0"/>
-              </a:rPr>
-              <a:t> </a:t>
-            </a:r>
-            <a:r>
-              <a:rPr lang="en-US" altLang="en-US"/>
-              <a:t>is </a:t>
-            </a:r>
-            <a:r>
-              <a:rPr lang="en-US" altLang="en-US">
-                <a:latin typeface="Courier New" panose="02070309020205020404" pitchFamily="49" charset="0"/>
-              </a:rPr>
-              <a:t>false</a:t>
-            </a:r>
-            <a:r>
-              <a:rPr lang="en-US" altLang="en-US"/>
-              <a:t>, then </a:t>
-            </a:r>
-            <a:r>
-              <a:rPr lang="en-US" altLang="en-US" i="1">
-                <a:latin typeface="Courier New" panose="02070309020205020404" pitchFamily="49" charset="0"/>
-              </a:rPr>
-              <a:t>statement</a:t>
-            </a:r>
-            <a:r>
-              <a:rPr lang="en-US" altLang="en-US"/>
+              <a:rPr lang="en-US" altLang="en-US" dirty="0"/>
               <a:t> is skipped.</a:t>
             </a:r>
-            <a:endParaRPr lang="en-US" altLang="en-US">
+            <a:endParaRPr lang="en-US" altLang="en-US" dirty="0">
               <a:latin typeface="Courier New" panose="02070309020205020404" pitchFamily="49" charset="0"/>
             </a:endParaRPr>
           </a:p>
           <a:p>
-            <a:pPr>
-              <a:buFontTx/>
-              <a:buChar char="•"/>
-            </a:pPr>
-            <a:endParaRPr lang="en-US" altLang="en-US"/>
+            <a:endParaRPr lang="en-US" altLang="en-US" dirty="0"/>
           </a:p>
         </p:txBody>
       </p:sp>
@@ -7015,8 +6987,8 @@
         </p:blipFill>
         <p:spPr bwMode="auto">
           <a:xfrm>
-            <a:off x="304800" y="1676400"/>
-            <a:ext cx="8001000" cy="3057525"/>
+            <a:off x="1828800" y="1828800"/>
+            <a:ext cx="5486400" cy="2096589"/>
           </a:xfrm>
           <a:prstGeom prst="rect">
             <a:avLst/>
@@ -7135,8 +7107,8 @@
         </p:blipFill>
         <p:spPr bwMode="auto">
           <a:xfrm>
-            <a:off x="762000" y="1219200"/>
-            <a:ext cx="6843713" cy="5083175"/>
+            <a:off x="1828800" y="1905000"/>
+            <a:ext cx="5486400" cy="4075029"/>
           </a:xfrm>
           <a:prstGeom prst="rect">
             <a:avLst/>
@@ -7367,112 +7339,94 @@
           </a:bodyPr>
           <a:lstStyle/>
           <a:p>
-            <a:pPr>
-              <a:lnSpc>
-                <a:spcPct val="90000"/>
-              </a:lnSpc>
-              <a:buFontTx/>
-              <a:buChar char="•"/>
-            </a:pPr>
-            <a:r>
-              <a:rPr lang="en-US" altLang="en-US" sz="2800"/>
+            <a:r>
+              <a:rPr lang="en-US" altLang="en-US" sz="2800" dirty="0"/>
               <a:t>Do not place </a:t>
             </a:r>
             <a:r>
-              <a:rPr lang="en-US" altLang="en-US" sz="2800">
+              <a:rPr lang="en-US" altLang="en-US" sz="2800" dirty="0">
                 <a:latin typeface="Courier New" panose="02070309020205020404" pitchFamily="49" charset="0"/>
               </a:rPr>
               <a:t>;</a:t>
             </a:r>
             <a:r>
-              <a:rPr lang="en-US" altLang="en-US" sz="2800"/>
+              <a:rPr lang="en-US" altLang="en-US" sz="2800" dirty="0"/>
               <a:t> after </a:t>
             </a:r>
             <a:r>
-              <a:rPr lang="en-US" altLang="en-US" sz="2800">
+              <a:rPr lang="en-US" altLang="en-US" sz="2800" dirty="0">
                 <a:latin typeface="Courier New" panose="02070309020205020404" pitchFamily="49" charset="0"/>
               </a:rPr>
               <a:t>(</a:t>
             </a:r>
             <a:r>
-              <a:rPr lang="en-US" altLang="en-US" sz="2800" i="1">
+              <a:rPr lang="en-US" altLang="en-US" sz="2800" i="1" dirty="0">
                 <a:latin typeface="Courier New" panose="02070309020205020404" pitchFamily="49" charset="0"/>
               </a:rPr>
               <a:t>expression</a:t>
             </a:r>
             <a:r>
-              <a:rPr lang="en-US" altLang="en-US" sz="2800">
+              <a:rPr lang="en-US" altLang="en-US" sz="2800" dirty="0">
                 <a:latin typeface="Courier New" panose="02070309020205020404" pitchFamily="49" charset="0"/>
               </a:rPr>
               <a:t>)</a:t>
             </a:r>
-            <a:endParaRPr lang="en-US" altLang="en-US" sz="2800"/>
-          </a:p>
-          <a:p>
-            <a:pPr>
-              <a:lnSpc>
-                <a:spcPct val="90000"/>
-              </a:lnSpc>
-              <a:buFontTx/>
-              <a:buChar char="•"/>
-            </a:pPr>
-            <a:r>
-              <a:rPr lang="en-US" altLang="en-US" sz="2800"/>
+            <a:endParaRPr lang="en-US" altLang="en-US" sz="2800" dirty="0"/>
+          </a:p>
+          <a:p>
+            <a:r>
+              <a:rPr lang="en-US" altLang="en-US" sz="2800" dirty="0"/>
               <a:t>Place </a:t>
             </a:r>
             <a:r>
-              <a:rPr lang="en-US" altLang="en-US" sz="2800" i="1">
+              <a:rPr lang="en-US" altLang="en-US" sz="2800" i="1" dirty="0">
                 <a:latin typeface="Courier New" panose="02070309020205020404" pitchFamily="49" charset="0"/>
               </a:rPr>
               <a:t>statement</a:t>
             </a:r>
             <a:r>
-              <a:rPr lang="en-US" altLang="en-US" sz="2800">
+              <a:rPr lang="en-US" altLang="en-US" sz="2800" dirty="0">
                 <a:latin typeface="Courier New" panose="02070309020205020404" pitchFamily="49" charset="0"/>
               </a:rPr>
               <a:t>;</a:t>
             </a:r>
             <a:r>
-              <a:rPr lang="en-US" altLang="en-US" sz="2800"/>
+              <a:rPr lang="en-US" altLang="en-US" sz="2800" dirty="0"/>
               <a:t> on a separate line after </a:t>
             </a:r>
             <a:r>
-              <a:rPr lang="en-US" altLang="en-US" sz="2800">
+              <a:rPr lang="en-US" altLang="en-US" sz="2800" dirty="0">
                 <a:latin typeface="Courier New" panose="02070309020205020404" pitchFamily="49" charset="0"/>
               </a:rPr>
               <a:t>(</a:t>
             </a:r>
             <a:r>
-              <a:rPr lang="en-US" altLang="en-US" sz="2800" i="1">
+              <a:rPr lang="en-US" altLang="en-US" sz="2800" i="1" dirty="0">
                 <a:latin typeface="Courier New" panose="02070309020205020404" pitchFamily="49" charset="0"/>
               </a:rPr>
               <a:t>expression</a:t>
             </a:r>
             <a:r>
-              <a:rPr lang="en-US" altLang="en-US" sz="2800">
+              <a:rPr lang="en-US" altLang="en-US" sz="2800" dirty="0">
                 <a:latin typeface="Courier New" panose="02070309020205020404" pitchFamily="49" charset="0"/>
               </a:rPr>
               <a:t>)</a:t>
             </a:r>
             <a:r>
-              <a:rPr lang="en-US" altLang="en-US" sz="2800"/>
+              <a:rPr lang="en-US" altLang="en-US" sz="2800" dirty="0"/>
               <a:t>, indented:</a:t>
             </a:r>
             <a:br>
-              <a:rPr lang="en-US" altLang="en-US" sz="2800"/>
+              <a:rPr lang="en-US" altLang="en-US" sz="2800" dirty="0"/>
             </a:br>
-            <a:endParaRPr lang="en-US" altLang="en-US" sz="2800"/>
+            <a:endParaRPr lang="en-US" altLang="en-US" sz="2800" dirty="0"/>
           </a:p>
           <a:p>
             <a:pPr marL="457200" lvl="1" indent="0">
-              <a:lnSpc>
-                <a:spcPct val="90000"/>
-              </a:lnSpc>
-              <a:buFontTx/>
               <a:buNone/>
             </a:pPr>
             <a:r>
-              <a:rPr lang="en-US" altLang="en-US" sz="2400">
+              <a:rPr lang="en-US" altLang="en-US" sz="2400" dirty="0">
                 <a:latin typeface="Courier New" panose="02070309020205020404" pitchFamily="49" charset="0"/>
               </a:rPr>
               <a:t>	if (score &gt; 90)</a:t>
@@ -7480,99 +7434,77 @@
           </a:p>
           <a:p>
             <a:pPr marL="457200" lvl="1" indent="0">
-              <a:lnSpc>
-                <a:spcPct val="90000"/>
-              </a:lnSpc>
-              <a:buFontTx/>
               <a:buNone/>
             </a:pPr>
             <a:r>
-              <a:rPr lang="en-US" altLang="en-US" sz="2400">
+              <a:rPr lang="en-US" altLang="en-US" sz="2400" dirty="0">
                 <a:latin typeface="Courier New" panose="02070309020205020404" pitchFamily="49" charset="0"/>
               </a:rPr>
               <a:t>	   grade = 'A';</a:t>
             </a:r>
             <a:br>
-              <a:rPr lang="en-US" altLang="en-US" sz="2400">
+              <a:rPr lang="en-US" altLang="en-US" sz="2400" dirty="0">
                 <a:latin typeface="Courier New" panose="02070309020205020404" pitchFamily="49" charset="0"/>
               </a:rPr>
             </a:br>
-            <a:endParaRPr lang="en-US" altLang="en-US" sz="2400"/>
-          </a:p>
-          <a:p>
-            <a:pPr>
-              <a:lnSpc>
-                <a:spcPct val="90000"/>
-              </a:lnSpc>
-              <a:buFontTx/>
-              <a:buChar char="•"/>
-            </a:pPr>
-            <a:r>
-              <a:rPr lang="en-US" altLang="en-US" sz="2800"/>
+            <a:endParaRPr lang="en-US" altLang="en-US" sz="2400" dirty="0"/>
+          </a:p>
+          <a:p>
+            <a:r>
+              <a:rPr lang="en-US" altLang="en-US" sz="2800" dirty="0"/>
               <a:t>Be careful testing </a:t>
             </a:r>
             <a:r>
-              <a:rPr lang="en-US" altLang="en-US" sz="2800">
+              <a:rPr lang="en-US" altLang="en-US" sz="2800" dirty="0">
                 <a:latin typeface="Courier New" panose="02070309020205020404" pitchFamily="49" charset="0"/>
               </a:rPr>
               <a:t>float</a:t>
             </a:r>
             <a:r>
-              <a:rPr lang="en-US" altLang="en-US" sz="2800"/>
+              <a:rPr lang="en-US" altLang="en-US" sz="2800" dirty="0"/>
               <a:t>s and </a:t>
             </a:r>
             <a:r>
-              <a:rPr lang="en-US" altLang="en-US" sz="2800">
+              <a:rPr lang="en-US" altLang="en-US" sz="2800" dirty="0">
                 <a:latin typeface="Courier New" panose="02070309020205020404" pitchFamily="49" charset="0"/>
               </a:rPr>
               <a:t>double</a:t>
             </a:r>
             <a:r>
-              <a:rPr lang="en-US" altLang="en-US" sz="2800"/>
+              <a:rPr lang="en-US" altLang="en-US" sz="2800" dirty="0"/>
               <a:t>s for equality</a:t>
             </a:r>
           </a:p>
           <a:p>
-            <a:pPr>
-              <a:lnSpc>
-                <a:spcPct val="90000"/>
-              </a:lnSpc>
-              <a:buFontTx/>
-              <a:buChar char="•"/>
-            </a:pPr>
-            <a:r>
-              <a:rPr lang="en-US" altLang="en-US" sz="2800">
+            <a:r>
+              <a:rPr lang="en-US" altLang="en-US" sz="2800" dirty="0">
                 <a:latin typeface="Courier New" panose="02070309020205020404" pitchFamily="49" charset="0"/>
               </a:rPr>
               <a:t>0</a:t>
             </a:r>
             <a:r>
-              <a:rPr lang="en-US" altLang="en-US" sz="2800"/>
+              <a:rPr lang="en-US" altLang="en-US" sz="2800" dirty="0"/>
               <a:t> is </a:t>
             </a:r>
             <a:r>
-              <a:rPr lang="en-US" altLang="en-US" sz="2800">
+              <a:rPr lang="en-US" altLang="en-US" sz="2800" dirty="0">
                 <a:latin typeface="Courier New" panose="02070309020205020404" pitchFamily="49" charset="0"/>
               </a:rPr>
               <a:t>false</a:t>
             </a:r>
             <a:r>
-              <a:rPr lang="en-US" altLang="en-US" sz="2800"/>
+              <a:rPr lang="en-US" altLang="en-US" sz="2800" dirty="0"/>
               <a:t>; any other value is </a:t>
             </a:r>
             <a:r>
-              <a:rPr lang="en-US" altLang="en-US" sz="2800">
+              <a:rPr lang="en-US" altLang="en-US" sz="2800" dirty="0">
                 <a:latin typeface="Courier New" panose="02070309020205020404" pitchFamily="49" charset="0"/>
               </a:rPr>
               <a:t>true</a:t>
             </a:r>
           </a:p>
           <a:p>
-            <a:pPr>
-              <a:buFontTx/>
-              <a:buChar char="•"/>
-            </a:pPr>
-            <a:endParaRPr lang="en-US" altLang="en-US" sz="2800"/>
+            <a:endParaRPr lang="en-US" altLang="en-US" sz="2800" dirty="0"/>
           </a:p>
         </p:txBody>
       </p:sp>
@@ -7755,143 +7687,138 @@
           </a:bodyPr>
           <a:lstStyle/>
           <a:p>
-            <a:pPr>
-              <a:buFontTx/>
-              <a:buChar char="•"/>
-            </a:pPr>
-            <a:r>
-              <a:rPr lang="en-US" altLang="en-US" sz="2800"/>
+            <a:r>
+              <a:rPr lang="en-US" altLang="en-US" sz="2800" dirty="0"/>
               <a:t>To execute more than one statement as part of an </a:t>
             </a:r>
             <a:r>
-              <a:rPr lang="en-US" altLang="en-US" sz="2800">
+              <a:rPr lang="en-US" altLang="en-US" sz="2800" dirty="0">
                 <a:latin typeface="Courier New" panose="02070309020205020404" pitchFamily="49" charset="0"/>
               </a:rPr>
               <a:t>if</a:t>
             </a:r>
             <a:r>
-              <a:rPr lang="en-US" altLang="en-US" sz="2800"/>
+              <a:rPr lang="en-US" altLang="en-US" sz="2800" dirty="0"/>
               <a:t> statement, enclose them in </a:t>
             </a:r>
             <a:r>
-              <a:rPr lang="en-US" altLang="en-US" sz="2800">
+              <a:rPr lang="en-US" altLang="en-US" sz="2800" dirty="0">
                 <a:latin typeface="Courier New" panose="02070309020205020404" pitchFamily="49" charset="0"/>
               </a:rPr>
               <a:t>{ }</a:t>
             </a:r>
             <a:r>
-              <a:rPr lang="en-US" altLang="en-US" sz="2800"/>
+              <a:rPr lang="en-US" altLang="en-US" sz="2800" dirty="0"/>
               <a:t>:</a:t>
             </a:r>
             <a:br>
-              <a:rPr lang="en-US" altLang="en-US" sz="2800"/>
+              <a:rPr lang="en-US" altLang="en-US" sz="2800" dirty="0"/>
             </a:br>
-            <a:endParaRPr lang="en-US" altLang="en-US" sz="2800"/>
-          </a:p>
-          <a:p>
-            <a:pPr lvl="1">
-              <a:buFontTx/>
+            <a:endParaRPr lang="en-US" altLang="en-US" sz="2800" dirty="0"/>
+          </a:p>
+          <a:p>
+            <a:pPr marL="201168" lvl="1" indent="0">
               <a:buNone/>
             </a:pPr>
             <a:r>
-              <a:rPr lang="en-US" altLang="en-US" sz="2400"/>
+              <a:rPr lang="en-US" altLang="en-US" sz="2400" dirty="0"/>
               <a:t>	</a:t>
             </a:r>
             <a:r>
-              <a:rPr lang="en-US" altLang="en-US" sz="2400">
+              <a:rPr lang="en-US" altLang="en-US" sz="2400" dirty="0">
                 <a:latin typeface="Courier New" panose="02070309020205020404" pitchFamily="49" charset="0"/>
               </a:rPr>
               <a:t>if (score &gt; 90)</a:t>
             </a:r>
           </a:p>
           <a:p>
-            <a:pPr lvl="1">
-              <a:buFontTx/>
+            <a:pPr marL="201168" lvl="1" indent="0">
               <a:buNone/>
             </a:pPr>
             <a:r>
-              <a:rPr lang="en-US" altLang="en-US" sz="2400">
+              <a:rPr lang="en-US" altLang="en-US" sz="2400" dirty="0">
                 <a:latin typeface="Courier New" panose="02070309020205020404" pitchFamily="49" charset="0"/>
               </a:rPr>
               <a:t>	{</a:t>
             </a:r>
           </a:p>
           <a:p>
-            <a:pPr lvl="1">
-              <a:buFontTx/>
+            <a:pPr marL="201168" lvl="1" indent="0">
               <a:buNone/>
             </a:pPr>
             <a:r>
-              <a:rPr lang="en-US" altLang="en-US" sz="2400">
+              <a:rPr lang="en-US" altLang="en-US" sz="2400" dirty="0">
                 <a:latin typeface="Courier New" panose="02070309020205020404" pitchFamily="49" charset="0"/>
               </a:rPr>
               <a:t>		   grade = 'A';</a:t>
             </a:r>
           </a:p>
           <a:p>
-            <a:pPr lvl="1">
-              <a:buFontTx/>
+            <a:pPr marL="201168" lvl="1" indent="0">
               <a:buNone/>
             </a:pPr>
             <a:r>
-              <a:rPr lang="en-US" altLang="en-US" sz="2400">
-                <a:latin typeface="Courier New" panose="02070309020205020404" pitchFamily="49" charset="0"/>
-              </a:rPr>
-              <a:t>		   cout &lt;&lt; "Good Job!\n";</a:t>
-            </a:r>
-          </a:p>
-          <a:p>
-            <a:pPr lvl="1">
-              <a:buFontTx/>
+              <a:rPr lang="en-US" altLang="en-US" sz="2400" dirty="0">
+                <a:latin typeface="Courier New" panose="02070309020205020404" pitchFamily="49" charset="0"/>
+              </a:rPr>
+              <a:t>		   </a:t>
+            </a:r>
+            <a:r>
+              <a:rPr lang="en-US" altLang="en-US" sz="2400" dirty="0" err="1">
+                <a:latin typeface="Courier New" panose="02070309020205020404" pitchFamily="49" charset="0"/>
+              </a:rPr>
+              <a:t>cout</a:t>
+            </a:r>
+            <a:r>
+              <a:rPr lang="en-US" altLang="en-US" sz="2400" dirty="0">
+                <a:latin typeface="Courier New" panose="02070309020205020404" pitchFamily="49" charset="0"/>
+              </a:rPr>
+              <a:t> &lt;&lt; "Good Job!\n";</a:t>
+            </a:r>
+          </a:p>
+          <a:p>
+            <a:pPr marL="201168" lvl="1" indent="0">
               <a:buNone/>
             </a:pPr>
             <a:r>
-              <a:rPr lang="en-US" altLang="en-US" sz="2400">
+              <a:rPr lang="en-US" altLang="en-US" sz="2400" dirty="0">
                 <a:latin typeface="Courier New" panose="02070309020205020404" pitchFamily="49" charset="0"/>
               </a:rPr>
               <a:t>	}</a:t>
             </a:r>
             <a:br>
-              <a:rPr lang="en-US" altLang="en-US" sz="2400">
+              <a:rPr lang="en-US" altLang="en-US" sz="2400" dirty="0">
                 <a:latin typeface="Courier New" panose="02070309020205020404" pitchFamily="49" charset="0"/>
               </a:rPr>
             </a:br>
-            <a:endParaRPr lang="en-US" altLang="en-US" sz="2400"/>
-          </a:p>
-          <a:p>
-            <a:pPr>
-              <a:buFontTx/>
-              <a:buChar char="•"/>
-            </a:pPr>
-            <a:r>
-              <a:rPr lang="en-US" altLang="en-US" sz="2800"/>
+            <a:endParaRPr lang="en-US" altLang="en-US" sz="2400" dirty="0"/>
+          </a:p>
+          <a:p>
+            <a:r>
+              <a:rPr lang="en-US" altLang="en-US" sz="2800" dirty="0"/>
               <a:t> </a:t>
             </a:r>
             <a:r>
-              <a:rPr lang="en-US" altLang="en-US" sz="2800">
+              <a:rPr lang="en-US" altLang="en-US" sz="2800" dirty="0">
                 <a:latin typeface="Courier New" panose="02070309020205020404" pitchFamily="49" charset="0"/>
               </a:rPr>
               <a:t>{ }</a:t>
             </a:r>
             <a:r>
-              <a:rPr lang="en-US" altLang="en-US" sz="2800"/>
+              <a:rPr lang="en-US" altLang="en-US" sz="2800" dirty="0"/>
               <a:t> creates a </a:t>
             </a:r>
             <a:r>
-              <a:rPr lang="en-US" altLang="en-US" sz="2800" u="sng"/>
+              <a:rPr lang="en-US" altLang="en-US" sz="2800" u="sng" dirty="0"/>
               <a:t>block</a:t>
             </a:r>
             <a:r>
-              <a:rPr lang="en-US" altLang="en-US" sz="2800"/>
+              <a:rPr lang="en-US" altLang="en-US" sz="2800" dirty="0"/>
               <a:t> of code</a:t>
             </a:r>
           </a:p>
           <a:p>
-            <a:pPr>
-              <a:buFontTx/>
-              <a:buChar char="•"/>
-            </a:pPr>
-            <a:endParaRPr lang="en-US" altLang="en-US"/>
+            <a:endParaRPr lang="en-US" altLang="en-US" dirty="0"/>
           </a:p>
         </p:txBody>
       </p:sp>
@@ -8072,41 +7999,29 @@
           <a:bodyPr/>
           <a:lstStyle/>
           <a:p>
-            <a:pPr>
-              <a:buFontTx/>
-              <a:buChar char="•"/>
-            </a:pPr>
-            <a:r>
-              <a:rPr lang="en-US" altLang="en-US"/>
+            <a:r>
+              <a:rPr lang="en-US" altLang="en-US" dirty="0"/>
               <a:t>Provides two possible paths of execution</a:t>
             </a:r>
           </a:p>
           <a:p>
-            <a:pPr>
-              <a:buFontTx/>
-              <a:buChar char="•"/>
-            </a:pPr>
-            <a:r>
-              <a:rPr lang="en-US" altLang="en-US"/>
+            <a:r>
+              <a:rPr lang="en-US" altLang="en-US" dirty="0"/>
               <a:t>Performs one statement or block if the </a:t>
             </a:r>
             <a:r>
-              <a:rPr lang="en-US" altLang="en-US" i="1">
+              <a:rPr lang="en-US" altLang="en-US" i="1" dirty="0">
                 <a:latin typeface="Courier New" panose="02070309020205020404" pitchFamily="49" charset="0"/>
               </a:rPr>
               <a:t>expression</a:t>
             </a:r>
             <a:r>
-              <a:rPr lang="en-US" altLang="en-US"/>
+              <a:rPr lang="en-US" altLang="en-US" dirty="0"/>
               <a:t> is true, otherwise performs another statement or block.</a:t>
             </a:r>
           </a:p>
           <a:p>
-            <a:pPr>
-              <a:buFontTx/>
-              <a:buChar char="•"/>
-            </a:pPr>
-            <a:endParaRPr lang="en-US" altLang="en-US"/>
+            <a:endParaRPr lang="en-US" altLang="en-US" dirty="0"/>
           </a:p>
         </p:txBody>
       </p:sp>
@@ -8279,113 +8194,101 @@
           <a:bodyPr/>
           <a:lstStyle/>
           <a:p>
-            <a:pPr>
-              <a:buFontTx/>
-              <a:buChar char="•"/>
-            </a:pPr>
-            <a:r>
-              <a:rPr lang="en-US" altLang="en-US"/>
+            <a:r>
+              <a:rPr lang="en-US" altLang="en-US" dirty="0"/>
               <a:t>General Format:</a:t>
             </a:r>
             <a:br>
-              <a:rPr lang="en-US" altLang="en-US"/>
+              <a:rPr lang="en-US" altLang="en-US" dirty="0"/>
             </a:br>
-            <a:endParaRPr lang="en-US" altLang="en-US"/>
-          </a:p>
-          <a:p>
-            <a:pPr lvl="1">
-              <a:buFontTx/>
+            <a:endParaRPr lang="en-US" altLang="en-US" dirty="0"/>
+          </a:p>
+          <a:p>
+            <a:pPr marL="201168" lvl="1" indent="0">
               <a:buNone/>
             </a:pPr>
             <a:r>
-              <a:rPr lang="en-US" altLang="en-US"/>
+              <a:rPr lang="en-US" altLang="en-US" dirty="0"/>
               <a:t>	</a:t>
             </a:r>
             <a:r>
-              <a:rPr lang="en-US" altLang="en-US">
+              <a:rPr lang="en-US" altLang="en-US" dirty="0">
                 <a:latin typeface="Courier New" panose="02070309020205020404" pitchFamily="49" charset="0"/>
               </a:rPr>
               <a:t>if (</a:t>
             </a:r>
             <a:r>
-              <a:rPr lang="en-US" altLang="en-US" i="1">
+              <a:rPr lang="en-US" altLang="en-US" i="1" dirty="0">
                 <a:latin typeface="Courier New" panose="02070309020205020404" pitchFamily="49" charset="0"/>
               </a:rPr>
               <a:t>expression</a:t>
             </a:r>
             <a:r>
-              <a:rPr lang="en-US" altLang="en-US">
+              <a:rPr lang="en-US" altLang="en-US" dirty="0">
                 <a:latin typeface="Courier New" panose="02070309020205020404" pitchFamily="49" charset="0"/>
               </a:rPr>
               <a:t>)</a:t>
             </a:r>
           </a:p>
           <a:p>
-            <a:pPr lvl="1">
-              <a:buFontTx/>
+            <a:pPr marL="201168" lvl="1" indent="0">
               <a:buNone/>
             </a:pPr>
             <a:r>
-              <a:rPr lang="en-US" altLang="en-US">
+              <a:rPr lang="en-US" altLang="en-US" dirty="0">
                 <a:latin typeface="Courier New" panose="02070309020205020404" pitchFamily="49" charset="0"/>
               </a:rPr>
               <a:t>	   </a:t>
             </a:r>
             <a:r>
-              <a:rPr lang="en-US" altLang="en-US" i="1">
+              <a:rPr lang="en-US" altLang="en-US" i="1" dirty="0">
                 <a:latin typeface="Courier New" panose="02070309020205020404" pitchFamily="49" charset="0"/>
               </a:rPr>
               <a:t>statement1</a:t>
             </a:r>
             <a:r>
-              <a:rPr lang="en-US" altLang="en-US">
+              <a:rPr lang="en-US" altLang="en-US" dirty="0">
                 <a:latin typeface="Courier New" panose="02070309020205020404" pitchFamily="49" charset="0"/>
               </a:rPr>
               <a:t>;  // or block</a:t>
             </a:r>
           </a:p>
           <a:p>
-            <a:pPr lvl="1">
-              <a:buFontTx/>
+            <a:pPr marL="201168" lvl="1" indent="0">
               <a:buNone/>
             </a:pPr>
             <a:r>
-              <a:rPr lang="en-US" altLang="en-US">
+              <a:rPr lang="en-US" altLang="en-US" dirty="0">
                 <a:latin typeface="Courier New" panose="02070309020205020404" pitchFamily="49" charset="0"/>
               </a:rPr>
               <a:t>	else</a:t>
             </a:r>
           </a:p>
           <a:p>
-            <a:pPr lvl="1">
-              <a:buFontTx/>
+            <a:pPr marL="201168" lvl="1" indent="0">
               <a:buNone/>
             </a:pPr>
             <a:r>
-              <a:rPr lang="en-US" altLang="en-US">
+              <a:rPr lang="en-US" altLang="en-US" dirty="0">
                 <a:latin typeface="Courier New" panose="02070309020205020404" pitchFamily="49" charset="0"/>
               </a:rPr>
               <a:t>	   </a:t>
             </a:r>
             <a:r>
-              <a:rPr lang="en-US" altLang="en-US" i="1">
+              <a:rPr lang="en-US" altLang="en-US" i="1" dirty="0">
                 <a:latin typeface="Courier New" panose="02070309020205020404" pitchFamily="49" charset="0"/>
               </a:rPr>
               <a:t>statement2</a:t>
             </a:r>
             <a:r>
-              <a:rPr lang="en-US" altLang="en-US">
+              <a:rPr lang="en-US" altLang="en-US" dirty="0">
                 <a:latin typeface="Courier New" panose="02070309020205020404" pitchFamily="49" charset="0"/>
               </a:rPr>
               <a:t>;  // or block</a:t>
             </a:r>
           </a:p>
           <a:p>
-            <a:pPr>
-              <a:buFontTx/>
-              <a:buChar char="•"/>
-            </a:pPr>
-            <a:endParaRPr lang="en-US" altLang="en-US"/>
+            <a:endParaRPr lang="en-US" altLang="en-US" dirty="0"/>
           </a:p>
         </p:txBody>
       </p:sp>
@@ -8474,12 +8377,106 @@
               <a:lnSpc>
                 <a:spcPct val="80000"/>
               </a:lnSpc>
-              <a:buFont typeface="Times" panose="02020603050405020304" pitchFamily="18" charset="0"/>
+            </a:pPr>
+            <a:r>
+              <a:rPr lang="en-US" altLang="en-US" sz="2400" dirty="0"/>
+              <a:t>To evaluate:</a:t>
+            </a:r>
+          </a:p>
+          <a:p>
+            <a:pPr marL="201168" lvl="1" indent="0">
+              <a:lnSpc>
+                <a:spcPct val="80000"/>
+              </a:lnSpc>
               <a:buNone/>
             </a:pPr>
             <a:r>
-              <a:rPr lang="en-US" altLang="en-US" sz="2400"/>
-              <a:t>To evaluate:</a:t>
+              <a:rPr lang="en-US" altLang="en-US" sz="2000" dirty="0"/>
+              <a:t>	</a:t>
+            </a:r>
+            <a:r>
+              <a:rPr lang="en-US" altLang="en-US" sz="2000" dirty="0">
+                <a:latin typeface="Courier New" panose="02070309020205020404" pitchFamily="49" charset="0"/>
+              </a:rPr>
+              <a:t>if (</a:t>
+            </a:r>
+            <a:r>
+              <a:rPr lang="en-US" altLang="en-US" sz="2000" i="1" dirty="0">
+                <a:latin typeface="Courier New" panose="02070309020205020404" pitchFamily="49" charset="0"/>
+              </a:rPr>
+              <a:t>expression</a:t>
+            </a:r>
+            <a:r>
+              <a:rPr lang="en-US" altLang="en-US" sz="2000" dirty="0">
+                <a:latin typeface="Courier New" panose="02070309020205020404" pitchFamily="49" charset="0"/>
+              </a:rPr>
+              <a:t>)</a:t>
+            </a:r>
+          </a:p>
+          <a:p>
+            <a:pPr marL="201168" lvl="1" indent="0">
+              <a:lnSpc>
+                <a:spcPct val="80000"/>
+              </a:lnSpc>
+              <a:buNone/>
+            </a:pPr>
+            <a:r>
+              <a:rPr lang="en-US" altLang="en-US" sz="2000" dirty="0">
+                <a:latin typeface="Courier New" panose="02070309020205020404" pitchFamily="49" charset="0"/>
+              </a:rPr>
+              <a:t>	   </a:t>
+            </a:r>
+            <a:r>
+              <a:rPr lang="en-US" altLang="en-US" sz="2000" i="1" dirty="0">
+                <a:latin typeface="Courier New" panose="02070309020205020404" pitchFamily="49" charset="0"/>
+              </a:rPr>
+              <a:t>statement1</a:t>
+            </a:r>
+            <a:r>
+              <a:rPr lang="en-US" altLang="en-US" sz="2000" dirty="0">
+                <a:latin typeface="Courier New" panose="02070309020205020404" pitchFamily="49" charset="0"/>
+              </a:rPr>
+              <a:t>;</a:t>
+            </a:r>
+          </a:p>
+          <a:p>
+            <a:pPr marL="201168" lvl="1" indent="0">
+              <a:lnSpc>
+                <a:spcPct val="80000"/>
+              </a:lnSpc>
+              <a:buNone/>
+            </a:pPr>
+            <a:r>
+              <a:rPr lang="en-US" altLang="en-US" sz="2000" dirty="0">
+                <a:latin typeface="Courier New" panose="02070309020205020404" pitchFamily="49" charset="0"/>
+              </a:rPr>
+              <a:t>	else</a:t>
+            </a:r>
+          </a:p>
+          <a:p>
+            <a:pPr marL="201168" lvl="1" indent="0">
+              <a:lnSpc>
+                <a:spcPct val="80000"/>
+              </a:lnSpc>
+              <a:buNone/>
+            </a:pPr>
+            <a:r>
+              <a:rPr lang="en-US" altLang="en-US" sz="2000" dirty="0">
+                <a:latin typeface="Courier New" panose="02070309020205020404" pitchFamily="49" charset="0"/>
+              </a:rPr>
+              <a:t>	   </a:t>
+            </a:r>
+            <a:r>
+              <a:rPr lang="en-US" altLang="en-US" sz="2000" i="1" dirty="0">
+                <a:latin typeface="Courier New" panose="02070309020205020404" pitchFamily="49" charset="0"/>
+              </a:rPr>
+              <a:t>statement2</a:t>
+            </a:r>
+            <a:r>
+              <a:rPr lang="en-US" altLang="en-US" sz="2000" dirty="0">
+                <a:latin typeface="Courier New" panose="02070309020205020404" pitchFamily="49" charset="0"/>
+              </a:rPr>
+              <a:t>;</a:t>
             </a:r>
           </a:p>
           <a:p>
@@ -8487,223 +8484,103 @@
               <a:lnSpc>
                 <a:spcPct val="80000"/>
               </a:lnSpc>
-              <a:buFontTx/>
-              <a:buNone/>
             </a:pPr>
-            <a:r>
-              <a:rPr lang="en-US" altLang="en-US" sz="2000"/>
-              <a:t>	</a:t>
-            </a:r>
-            <a:r>
-              <a:rPr lang="en-US" altLang="en-US" sz="2000">
-                <a:latin typeface="Courier New" panose="02070309020205020404" pitchFamily="49" charset="0"/>
-              </a:rPr>
-              <a:t>if (</a:t>
-            </a:r>
-            <a:r>
-              <a:rPr lang="en-US" altLang="en-US" sz="2000" i="1">
+            <a:endParaRPr lang="en-US" altLang="en-US" sz="2000" dirty="0"/>
+          </a:p>
+          <a:p>
+            <a:r>
+              <a:rPr lang="en-US" altLang="en-US" sz="2400" dirty="0"/>
+              <a:t>If the </a:t>
+            </a:r>
+            <a:r>
+              <a:rPr lang="en-US" altLang="en-US" sz="2400" i="1" dirty="0">
                 <a:latin typeface="Courier New" panose="02070309020205020404" pitchFamily="49" charset="0"/>
               </a:rPr>
               <a:t>expression</a:t>
             </a:r>
             <a:r>
-              <a:rPr lang="en-US" altLang="en-US" sz="2000">
-                <a:latin typeface="Courier New" panose="02070309020205020404" pitchFamily="49" charset="0"/>
-              </a:rPr>
-              <a:t>)</a:t>
-            </a:r>
-          </a:p>
-          <a:p>
-            <a:pPr lvl="1">
-              <a:lnSpc>
-                <a:spcPct val="80000"/>
-              </a:lnSpc>
-              <a:buFontTx/>
-              <a:buNone/>
-            </a:pPr>
-            <a:r>
-              <a:rPr lang="en-US" altLang="en-US" sz="2000">
-                <a:latin typeface="Courier New" panose="02070309020205020404" pitchFamily="49" charset="0"/>
-              </a:rPr>
-              <a:t>	   </a:t>
-            </a:r>
-            <a:r>
-              <a:rPr lang="en-US" altLang="en-US" sz="2000" i="1">
+              <a:rPr lang="en-US" altLang="en-US" sz="2400" dirty="0"/>
+              <a:t> is </a:t>
+            </a:r>
+            <a:r>
+              <a:rPr lang="en-US" altLang="en-US" sz="2400" dirty="0">
+                <a:latin typeface="Courier New" panose="02070309020205020404" pitchFamily="49" charset="0"/>
+              </a:rPr>
+              <a:t>true</a:t>
+            </a:r>
+            <a:r>
+              <a:rPr lang="en-US" altLang="en-US" sz="2400" dirty="0"/>
+              <a:t>, then </a:t>
+            </a:r>
+            <a:r>
+              <a:rPr lang="en-US" altLang="en-US" sz="2400" i="1" dirty="0">
                 <a:latin typeface="Courier New" panose="02070309020205020404" pitchFamily="49" charset="0"/>
               </a:rPr>
               <a:t>statement1</a:t>
             </a:r>
             <a:r>
-              <a:rPr lang="en-US" altLang="en-US" sz="2000">
-                <a:latin typeface="Courier New" panose="02070309020205020404" pitchFamily="49" charset="0"/>
-              </a:rPr>
-              <a:t>;</a:t>
-            </a:r>
-          </a:p>
-          <a:p>
-            <a:pPr lvl="1">
-              <a:lnSpc>
-                <a:spcPct val="80000"/>
-              </a:lnSpc>
-              <a:buFontTx/>
-              <a:buNone/>
-            </a:pPr>
-            <a:r>
-              <a:rPr lang="en-US" altLang="en-US" sz="2000">
-                <a:latin typeface="Courier New" panose="02070309020205020404" pitchFamily="49" charset="0"/>
-              </a:rPr>
-              <a:t>	else</a:t>
-            </a:r>
-          </a:p>
-          <a:p>
-            <a:pPr lvl="1">
-              <a:lnSpc>
-                <a:spcPct val="80000"/>
-              </a:lnSpc>
-              <a:buFontTx/>
-              <a:buNone/>
-            </a:pPr>
-            <a:r>
-              <a:rPr lang="en-US" altLang="en-US" sz="2000">
-                <a:latin typeface="Courier New" panose="02070309020205020404" pitchFamily="49" charset="0"/>
-              </a:rPr>
-              <a:t>	   </a:t>
-            </a:r>
-            <a:r>
-              <a:rPr lang="en-US" altLang="en-US" sz="2000" i="1">
+              <a:rPr lang="en-US" altLang="en-US" sz="2400" dirty="0"/>
+              <a:t> is executed and </a:t>
+            </a:r>
+            <a:r>
+              <a:rPr lang="en-US" altLang="en-US" sz="2400" i="1" dirty="0">
                 <a:latin typeface="Courier New" panose="02070309020205020404" pitchFamily="49" charset="0"/>
               </a:rPr>
               <a:t>statement2</a:t>
             </a:r>
             <a:r>
-              <a:rPr lang="en-US" altLang="en-US" sz="2000">
-                <a:latin typeface="Courier New" panose="02070309020205020404" pitchFamily="49" charset="0"/>
-              </a:rPr>
-              <a:t>;</a:t>
-            </a:r>
-          </a:p>
-          <a:p>
-            <a:pPr lvl="1">
-              <a:lnSpc>
-                <a:spcPct val="80000"/>
-              </a:lnSpc>
-              <a:buFontTx/>
-              <a:buNone/>
-            </a:pPr>
-            <a:endParaRPr lang="en-US" altLang="en-US" sz="2000"/>
-          </a:p>
-          <a:p>
-            <a:pPr>
-              <a:lnSpc>
-                <a:spcPct val="90000"/>
-              </a:lnSpc>
-              <a:buFontTx/>
-              <a:buChar char="•"/>
-            </a:pPr>
-            <a:r>
-              <a:rPr lang="en-US" altLang="en-US" sz="2400"/>
+              <a:rPr lang="en-US" altLang="en-US" sz="2400" dirty="0"/>
+              <a:t> is skipped.</a:t>
+            </a:r>
+          </a:p>
+          <a:p>
+            <a:r>
+              <a:rPr lang="en-US" altLang="en-US" sz="2400" dirty="0"/>
               <a:t>If the </a:t>
             </a:r>
             <a:r>
-              <a:rPr lang="en-US" altLang="en-US" sz="2400" i="1">
+              <a:rPr lang="en-US" altLang="en-US" sz="2400" i="1" dirty="0">
                 <a:latin typeface="Courier New" panose="02070309020205020404" pitchFamily="49" charset="0"/>
               </a:rPr>
               <a:t>expression</a:t>
             </a:r>
             <a:r>
-              <a:rPr lang="en-US" altLang="en-US" sz="2400"/>
+              <a:rPr lang="en-US" altLang="en-US" sz="2400" dirty="0"/>
               <a:t> is </a:t>
             </a:r>
             <a:r>
-              <a:rPr lang="en-US" altLang="en-US" sz="2400">
-                <a:latin typeface="Courier New" panose="02070309020205020404" pitchFamily="49" charset="0"/>
-              </a:rPr>
-              <a:t>true</a:t>
-            </a:r>
-            <a:r>
-              <a:rPr lang="en-US" altLang="en-US" sz="2400"/>
+              <a:rPr lang="en-US" altLang="en-US" sz="2400" i="1" dirty="0">
+                <a:latin typeface="Courier New" panose="02070309020205020404" pitchFamily="49" charset="0"/>
+              </a:rPr>
+              <a:t>false</a:t>
+            </a:r>
+            <a:r>
+              <a:rPr lang="en-US" altLang="en-US" sz="2400" dirty="0"/>
               <a:t>, then </a:t>
             </a:r>
             <a:r>
-              <a:rPr lang="en-US" altLang="en-US" sz="2400" i="1">
+              <a:rPr lang="en-US" altLang="en-US" sz="2400" i="1" dirty="0">
                 <a:latin typeface="Courier New" panose="02070309020205020404" pitchFamily="49" charset="0"/>
               </a:rPr>
               <a:t>statement1</a:t>
             </a:r>
             <a:r>
-              <a:rPr lang="en-US" altLang="en-US" sz="2400"/>
-              <a:t> is executed and </a:t>
-            </a:r>
-            <a:r>
-              <a:rPr lang="en-US" altLang="en-US" sz="2400" i="1">
+              <a:rPr lang="en-US" altLang="en-US" sz="2400" dirty="0"/>
+              <a:t> is skipped and </a:t>
+            </a:r>
+            <a:r>
+              <a:rPr lang="en-US" altLang="en-US" sz="2400" i="1" dirty="0">
                 <a:latin typeface="Courier New" panose="02070309020205020404" pitchFamily="49" charset="0"/>
               </a:rPr>
               <a:t>statement2</a:t>
             </a:r>
             <a:r>
-              <a:rPr lang="en-US" altLang="en-US" sz="2400"/>
-              <a:t> is skipped.</a:t>
-            </a:r>
-          </a:p>
-          <a:p>
-            <a:pPr>
-              <a:lnSpc>
-                <a:spcPct val="90000"/>
-              </a:lnSpc>
-              <a:buFontTx/>
-              <a:buChar char="•"/>
-            </a:pPr>
-            <a:r>
-              <a:rPr lang="en-US" altLang="en-US" sz="2400"/>
-              <a:t>If the </a:t>
-            </a:r>
-            <a:r>
-              <a:rPr lang="en-US" altLang="en-US" sz="2400" i="1">
-                <a:latin typeface="Courier New" panose="02070309020205020404" pitchFamily="49" charset="0"/>
-              </a:rPr>
-              <a:t>expression</a:t>
-            </a:r>
-            <a:r>
-              <a:rPr lang="en-US" altLang="en-US" sz="2400"/>
-              <a:t> is </a:t>
-            </a:r>
-            <a:r>
-              <a:rPr lang="en-US" altLang="en-US" sz="2400" i="1">
-                <a:latin typeface="Courier New" panose="02070309020205020404" pitchFamily="49" charset="0"/>
-              </a:rPr>
-              <a:t>false</a:t>
-            </a:r>
-            <a:r>
-              <a:rPr lang="en-US" altLang="en-US" sz="2400"/>
-              <a:t>, then </a:t>
-            </a:r>
-            <a:r>
-              <a:rPr lang="en-US" altLang="en-US" sz="2400" i="1">
-                <a:latin typeface="Courier New" panose="02070309020205020404" pitchFamily="49" charset="0"/>
-              </a:rPr>
-              <a:t>statement1</a:t>
-            </a:r>
-            <a:r>
-              <a:rPr lang="en-US" altLang="en-US" sz="2400"/>
-              <a:t> is skipped and </a:t>
-            </a:r>
-            <a:r>
-              <a:rPr lang="en-US" altLang="en-US" sz="2400" i="1">
-                <a:latin typeface="Courier New" panose="02070309020205020404" pitchFamily="49" charset="0"/>
-              </a:rPr>
-              <a:t>statement2</a:t>
-            </a:r>
-            <a:r>
-              <a:rPr lang="en-US" altLang="en-US" sz="2400"/>
+              <a:rPr lang="en-US" altLang="en-US" sz="2400" dirty="0"/>
               <a:t> is executed.</a:t>
             </a:r>
           </a:p>
           <a:p>
-            <a:pPr>
-              <a:buFontTx/>
-              <a:buChar char="•"/>
-            </a:pPr>
-            <a:endParaRPr lang="en-US" altLang="en-US"/>
+            <a:endParaRPr lang="en-US" altLang="en-US" dirty="0"/>
           </a:p>
         </p:txBody>
       </p:sp>
@@ -8805,8 +8682,8 @@
         </p:blipFill>
         <p:spPr bwMode="auto">
           <a:xfrm>
-            <a:off x="468313" y="1452563"/>
-            <a:ext cx="7521575" cy="4872037"/>
+            <a:off x="1454553" y="1866899"/>
+            <a:ext cx="6234894" cy="4038600"/>
           </a:xfrm>
           <a:prstGeom prst="rect">
             <a:avLst/>
@@ -8858,8 +8735,8 @@
         </p:blipFill>
         <p:spPr>
           <a:xfrm>
-            <a:off x="3429000" y="2895600"/>
-            <a:ext cx="5370513" cy="990600"/>
+            <a:off x="4114800" y="3065056"/>
+            <a:ext cx="4451806" cy="821143"/>
           </a:xfrm>
           <a:prstGeom prst="rect">
             <a:avLst/>
@@ -9279,8 +9156,8 @@
         </p:blipFill>
         <p:spPr bwMode="auto">
           <a:xfrm>
-            <a:off x="609600" y="1143000"/>
-            <a:ext cx="7170738" cy="4757738"/>
+            <a:off x="1828800" y="1828800"/>
+            <a:ext cx="5486400" cy="3640191"/>
           </a:xfrm>
           <a:prstGeom prst="rect">
             <a:avLst/>
@@ -9397,8 +9274,8 @@
         </p:blipFill>
         <p:spPr bwMode="auto">
           <a:xfrm>
-            <a:off x="609600" y="1295400"/>
-            <a:ext cx="6858000" cy="4975225"/>
+            <a:off x="1828800" y="1905000"/>
+            <a:ext cx="5486400" cy="3980180"/>
           </a:xfrm>
           <a:prstGeom prst="rect">
             <a:avLst/>
@@ -10030,31 +9907,19 @@
           <a:bodyPr/>
           <a:lstStyle/>
           <a:p>
-            <a:pPr>
-              <a:buFontTx/>
-              <a:buChar char="•"/>
-            </a:pPr>
-            <a:r>
-              <a:rPr lang="en-US" altLang="en-US"/>
+            <a:r>
+              <a:rPr lang="en-US" altLang="en-US" dirty="0"/>
               <a:t>Used to compare numbers to determine relative order</a:t>
             </a:r>
           </a:p>
           <a:p>
-            <a:pPr>
-              <a:buFontTx/>
-              <a:buChar char="•"/>
-            </a:pPr>
-            <a:r>
-              <a:rPr lang="en-US" altLang="en-US"/>
+            <a:r>
+              <a:rPr lang="en-US" altLang="en-US" dirty="0"/>
               <a:t>Operators:</a:t>
             </a:r>
           </a:p>
           <a:p>
-            <a:pPr eaLnBrk="1" hangingPunct="1">
-              <a:buFontTx/>
-              <a:buChar char="•"/>
-            </a:pPr>
-            <a:endParaRPr lang="en-US" altLang="en-US"/>
+            <a:endParaRPr lang="en-US" altLang="en-US" dirty="0"/>
           </a:p>
         </p:txBody>
       </p:sp>
@@ -13168,7 +13033,7 @@
           <a:lstStyle/>
           <a:p>
             <a:r>
-              <a:rPr lang="en-US" altLang="en-US"/>
+              <a:rPr lang="en-US" altLang="en-US" dirty="0"/>
               <a:t>Relational Expressions</a:t>
             </a:r>
           </a:p>
@@ -13195,213 +13060,198 @@
           <a:bodyPr/>
           <a:lstStyle/>
           <a:p>
-            <a:pPr>
-              <a:buFontTx/>
-              <a:buChar char="•"/>
-            </a:pPr>
-            <a:r>
-              <a:rPr lang="en-US" altLang="en-US" sz="2800"/>
+            <a:r>
+              <a:rPr lang="en-US" altLang="en-US" sz="2800" dirty="0"/>
               <a:t>Boolean expressions – </a:t>
             </a:r>
             <a:r>
-              <a:rPr lang="en-US" altLang="en-US" sz="2800">
+              <a:rPr lang="en-US" altLang="en-US" sz="2800" dirty="0">
                 <a:latin typeface="Courier New" panose="02070309020205020404" pitchFamily="49" charset="0"/>
               </a:rPr>
               <a:t>true</a:t>
             </a:r>
             <a:r>
-              <a:rPr lang="en-US" altLang="en-US" sz="2800"/>
+              <a:rPr lang="en-US" altLang="en-US" sz="2800" dirty="0"/>
               <a:t> or </a:t>
             </a:r>
             <a:r>
-              <a:rPr lang="en-US" altLang="en-US" sz="2800">
+              <a:rPr lang="en-US" altLang="en-US" sz="2800" dirty="0">
                 <a:latin typeface="Courier New" panose="02070309020205020404" pitchFamily="49" charset="0"/>
               </a:rPr>
               <a:t>false</a:t>
             </a:r>
           </a:p>
           <a:p>
-            <a:pPr>
-              <a:buFontTx/>
-              <a:buChar char="•"/>
-            </a:pPr>
-            <a:r>
-              <a:rPr lang="en-US" altLang="en-US" sz="2800"/>
+            <a:r>
+              <a:rPr lang="en-US" altLang="en-US" sz="2800" dirty="0"/>
               <a:t>Examples:</a:t>
             </a:r>
           </a:p>
           <a:p>
-            <a:pPr lvl="1">
-              <a:buFontTx/>
+            <a:pPr marL="201168" lvl="1" indent="0">
               <a:buNone/>
             </a:pPr>
             <a:r>
-              <a:rPr lang="en-US" altLang="en-US" sz="2400"/>
+              <a:rPr lang="en-US" altLang="en-US" sz="2400" dirty="0"/>
               <a:t>	</a:t>
             </a:r>
             <a:r>
-              <a:rPr lang="en-US" altLang="en-US" sz="2400">
+              <a:rPr lang="en-US" altLang="en-US" sz="2400" dirty="0">
                 <a:latin typeface="Courier New" panose="02070309020205020404" pitchFamily="49" charset="0"/>
               </a:rPr>
               <a:t>12 &gt; 5</a:t>
             </a:r>
             <a:r>
-              <a:rPr lang="en-US" altLang="en-US" sz="2400"/>
+              <a:rPr lang="en-US" altLang="en-US" sz="2400" dirty="0"/>
               <a:t> is </a:t>
             </a:r>
             <a:r>
-              <a:rPr lang="en-US" altLang="en-US" sz="2400">
+              <a:rPr lang="en-US" altLang="en-US" sz="2400" dirty="0">
                 <a:latin typeface="Courier New" panose="02070309020205020404" pitchFamily="49" charset="0"/>
               </a:rPr>
               <a:t>true</a:t>
             </a:r>
           </a:p>
           <a:p>
-            <a:pPr lvl="1">
-              <a:buFontTx/>
+            <a:pPr marL="201168" lvl="1" indent="0">
               <a:buNone/>
             </a:pPr>
             <a:r>
-              <a:rPr lang="en-US" altLang="en-US" sz="2400">
+              <a:rPr lang="en-US" altLang="en-US" sz="2400" dirty="0">
                 <a:latin typeface="Courier New" panose="02070309020205020404" pitchFamily="49" charset="0"/>
               </a:rPr>
               <a:t>	7 &lt;= 5</a:t>
             </a:r>
             <a:r>
-              <a:rPr lang="en-US" altLang="en-US" sz="2400"/>
+              <a:rPr lang="en-US" altLang="en-US" sz="2400" dirty="0"/>
               <a:t> is </a:t>
             </a:r>
             <a:r>
-              <a:rPr lang="en-US" altLang="en-US" sz="2400">
+              <a:rPr lang="en-US" altLang="en-US" sz="2400" dirty="0">
                 <a:latin typeface="Courier New" panose="02070309020205020404" pitchFamily="49" charset="0"/>
               </a:rPr>
               <a:t>false</a:t>
             </a:r>
           </a:p>
           <a:p>
-            <a:pPr lvl="1">
-              <a:buFontTx/>
+            <a:pPr marL="201168" lvl="1" indent="0">
               <a:buNone/>
             </a:pPr>
             <a:r>
-              <a:rPr lang="en-US" altLang="en-US" sz="2400">
+              <a:rPr lang="en-US" altLang="en-US" sz="2400" dirty="0">
                 <a:latin typeface="Courier New" panose="02070309020205020404" pitchFamily="49" charset="0"/>
               </a:rPr>
               <a:t>	</a:t>
             </a:r>
           </a:p>
           <a:p>
-            <a:pPr lvl="1">
-              <a:buFontTx/>
+            <a:pPr marL="201168" lvl="1" indent="0">
               <a:buNone/>
             </a:pPr>
             <a:r>
-              <a:rPr lang="en-US" altLang="en-US" sz="2400">
+              <a:rPr lang="en-US" altLang="en-US" sz="2400" dirty="0">
                 <a:latin typeface="Courier New" panose="02070309020205020404" pitchFamily="49" charset="0"/>
               </a:rPr>
               <a:t>	</a:t>
             </a:r>
             <a:r>
-              <a:rPr lang="en-US" altLang="en-US" sz="2400"/>
+              <a:rPr lang="en-US" altLang="en-US" sz="2400" dirty="0"/>
               <a:t>if </a:t>
             </a:r>
             <a:r>
-              <a:rPr lang="en-US" altLang="en-US" sz="2400">
+              <a:rPr lang="en-US" altLang="en-US" sz="2400" dirty="0">
                 <a:latin typeface="Courier New" panose="02070309020205020404" pitchFamily="49" charset="0"/>
               </a:rPr>
               <a:t>x </a:t>
             </a:r>
             <a:r>
-              <a:rPr lang="en-US" altLang="en-US" sz="2400"/>
+              <a:rPr lang="en-US" altLang="en-US" sz="2400" dirty="0"/>
               <a:t>is 10, then </a:t>
             </a:r>
           </a:p>
           <a:p>
-            <a:pPr lvl="1">
-              <a:buFontTx/>
+            <a:pPr marL="201168" lvl="1" indent="0">
               <a:buNone/>
             </a:pPr>
             <a:r>
-              <a:rPr lang="en-US" altLang="en-US" sz="2400"/>
+              <a:rPr lang="en-US" altLang="en-US" sz="2400" dirty="0"/>
               <a:t>	</a:t>
             </a:r>
             <a:r>
-              <a:rPr lang="en-US" altLang="en-US" sz="2400">
+              <a:rPr lang="en-US" altLang="en-US" sz="2400" dirty="0">
                 <a:latin typeface="Courier New" panose="02070309020205020404" pitchFamily="49" charset="0"/>
               </a:rPr>
               <a:t>x == 10</a:t>
             </a:r>
             <a:r>
-              <a:rPr lang="en-US" altLang="en-US" sz="2400"/>
+              <a:rPr lang="en-US" altLang="en-US" sz="2400" dirty="0"/>
               <a:t> is</a:t>
             </a:r>
             <a:r>
-              <a:rPr lang="en-US" altLang="en-US" sz="2400">
+              <a:rPr lang="en-US" altLang="en-US" sz="2400" dirty="0">
                 <a:latin typeface="Courier New" panose="02070309020205020404" pitchFamily="49" charset="0"/>
               </a:rPr>
               <a:t> true</a:t>
             </a:r>
             <a:r>
-              <a:rPr lang="en-US" altLang="en-US" sz="2400"/>
+              <a:rPr lang="en-US" altLang="en-US" sz="2400" dirty="0"/>
               <a:t>, </a:t>
             </a:r>
           </a:p>
           <a:p>
-            <a:pPr lvl="1">
-              <a:buFontTx/>
+            <a:pPr marL="201168" lvl="1" indent="0">
               <a:buNone/>
             </a:pPr>
             <a:r>
-              <a:rPr lang="en-US" altLang="en-US" sz="2400"/>
+              <a:rPr lang="en-US" altLang="en-US" sz="2400" dirty="0"/>
               <a:t>	</a:t>
             </a:r>
             <a:r>
-              <a:rPr lang="en-US" altLang="en-US" sz="2400">
+              <a:rPr lang="en-US" altLang="en-US" sz="2400" dirty="0">
                 <a:latin typeface="Courier New" panose="02070309020205020404" pitchFamily="49" charset="0"/>
               </a:rPr>
               <a:t>x != 8</a:t>
             </a:r>
             <a:r>
-              <a:rPr lang="en-US" altLang="en-US" sz="2400"/>
+              <a:rPr lang="en-US" altLang="en-US" sz="2400" dirty="0"/>
               <a:t> is </a:t>
             </a:r>
             <a:r>
-              <a:rPr lang="en-US" altLang="en-US" sz="2400">
+              <a:rPr lang="en-US" altLang="en-US" sz="2400" dirty="0">
                 <a:latin typeface="Courier New" panose="02070309020205020404" pitchFamily="49" charset="0"/>
               </a:rPr>
               <a:t>true</a:t>
             </a:r>
             <a:r>
-              <a:rPr lang="en-US" altLang="en-US" sz="2400"/>
+              <a:rPr lang="en-US" altLang="en-US" sz="2400" dirty="0"/>
               <a:t>, and </a:t>
             </a:r>
           </a:p>
           <a:p>
-            <a:pPr lvl="1">
-              <a:buFontTx/>
+            <a:pPr marL="201168" lvl="1" indent="0">
               <a:buNone/>
             </a:pPr>
             <a:r>
-              <a:rPr lang="en-US" altLang="en-US" sz="2400"/>
+              <a:rPr lang="en-US" altLang="en-US" sz="2400" dirty="0"/>
               <a:t>	</a:t>
             </a:r>
             <a:r>
-              <a:rPr lang="en-US" altLang="en-US" sz="2400">
+              <a:rPr lang="en-US" altLang="en-US" sz="2400" dirty="0">
                 <a:latin typeface="Courier New" panose="02070309020205020404" pitchFamily="49" charset="0"/>
               </a:rPr>
               <a:t>x == 8</a:t>
             </a:r>
             <a:r>
-              <a:rPr lang="en-US" altLang="en-US" sz="2400"/>
+              <a:rPr lang="en-US" altLang="en-US" sz="2400" dirty="0"/>
               <a:t> is </a:t>
             </a:r>
             <a:r>
-              <a:rPr lang="en-US" altLang="en-US" sz="2400">
+              <a:rPr lang="en-US" altLang="en-US" sz="2400" dirty="0">
                 <a:latin typeface="Courier New" panose="02070309020205020404" pitchFamily="49" charset="0"/>
               </a:rPr>
               <a:t>false</a:t>
             </a:r>
-            <a:endParaRPr lang="en-US" altLang="en-US" sz="2400"/>
+            <a:endParaRPr lang="en-US" altLang="en-US" sz="2400" dirty="0"/>
           </a:p>
         </p:txBody>
       </p:sp>
@@ -16705,111 +16555,94 @@
           <a:bodyPr/>
           <a:lstStyle/>
           <a:p>
-            <a:pPr>
-              <a:buFontTx/>
-              <a:buChar char="•"/>
-            </a:pPr>
-            <a:r>
-              <a:rPr lang="en-US" altLang="en-US"/>
+            <a:r>
+              <a:rPr lang="en-US" altLang="en-US" dirty="0"/>
               <a:t>Can be assigned to a variable:</a:t>
             </a:r>
           </a:p>
           <a:p>
-            <a:pPr lvl="1">
-              <a:buFontTx/>
+            <a:pPr marL="201168" lvl="1" indent="0">
               <a:buNone/>
             </a:pPr>
             <a:r>
-              <a:rPr lang="en-US" altLang="en-US"/>
+              <a:rPr lang="en-US" altLang="en-US" dirty="0"/>
               <a:t>	</a:t>
             </a:r>
             <a:r>
-              <a:rPr lang="en-US" altLang="en-US">
+              <a:rPr lang="en-US" altLang="en-US" dirty="0">
                 <a:latin typeface="Courier New" panose="02070309020205020404" pitchFamily="49" charset="0"/>
               </a:rPr>
               <a:t>result = x &lt;= y;</a:t>
             </a:r>
-            <a:endParaRPr lang="en-US" altLang="en-US"/>
-          </a:p>
-          <a:p>
-            <a:pPr>
-              <a:buFontTx/>
-              <a:buChar char="•"/>
-            </a:pPr>
-            <a:r>
-              <a:rPr lang="en-US" altLang="en-US"/>
+            <a:endParaRPr lang="en-US" altLang="en-US" dirty="0"/>
+          </a:p>
+          <a:p>
+            <a:r>
+              <a:rPr lang="en-US" altLang="en-US" dirty="0"/>
               <a:t>Assigns </a:t>
             </a:r>
             <a:r>
-              <a:rPr lang="en-US" altLang="en-US">
+              <a:rPr lang="en-US" altLang="en-US" dirty="0">
                 <a:latin typeface="Courier New" panose="02070309020205020404" pitchFamily="49" charset="0"/>
               </a:rPr>
               <a:t>0</a:t>
             </a:r>
             <a:r>
-              <a:rPr lang="en-US" altLang="en-US"/>
+              <a:rPr lang="en-US" altLang="en-US" dirty="0"/>
               <a:t> for </a:t>
             </a:r>
             <a:r>
-              <a:rPr lang="en-US" altLang="en-US">
+              <a:rPr lang="en-US" altLang="en-US" dirty="0">
                 <a:latin typeface="Courier New" panose="02070309020205020404" pitchFamily="49" charset="0"/>
               </a:rPr>
               <a:t>false</a:t>
             </a:r>
             <a:r>
-              <a:rPr lang="en-US" altLang="en-US"/>
+              <a:rPr lang="en-US" altLang="en-US" dirty="0"/>
               <a:t>, </a:t>
             </a:r>
             <a:r>
-              <a:rPr lang="en-US" altLang="en-US">
+              <a:rPr lang="en-US" altLang="en-US" dirty="0">
                 <a:latin typeface="Courier New" panose="02070309020205020404" pitchFamily="49" charset="0"/>
               </a:rPr>
               <a:t>1</a:t>
             </a:r>
             <a:r>
-              <a:rPr lang="en-US" altLang="en-US"/>
+              <a:rPr lang="en-US" altLang="en-US" dirty="0"/>
               <a:t> for </a:t>
             </a:r>
             <a:r>
-              <a:rPr lang="en-US" altLang="en-US">
+              <a:rPr lang="en-US" altLang="en-US" dirty="0">
                 <a:latin typeface="Courier New" panose="02070309020205020404" pitchFamily="49" charset="0"/>
               </a:rPr>
               <a:t>true</a:t>
             </a:r>
-            <a:endParaRPr lang="en-US" altLang="en-US"/>
-          </a:p>
-          <a:p>
-            <a:pPr>
-              <a:buFontTx/>
-              <a:buChar char="•"/>
-            </a:pPr>
-            <a:r>
-              <a:rPr lang="en-US" altLang="en-US"/>
+            <a:endParaRPr lang="en-US" altLang="en-US" dirty="0"/>
+          </a:p>
+          <a:p>
+            <a:r>
+              <a:rPr lang="en-US" altLang="en-US" dirty="0"/>
               <a:t>Do not confuse </a:t>
             </a:r>
             <a:r>
-              <a:rPr lang="en-US" altLang="en-US">
+              <a:rPr lang="en-US" altLang="en-US" dirty="0">
                 <a:latin typeface="Courier New" panose="02070309020205020404" pitchFamily="49" charset="0"/>
               </a:rPr>
               <a:t>=</a:t>
             </a:r>
             <a:r>
-              <a:rPr lang="en-US" altLang="en-US"/>
+              <a:rPr lang="en-US" altLang="en-US" dirty="0"/>
               <a:t>  and </a:t>
             </a:r>
             <a:r>
-              <a:rPr lang="en-US" altLang="en-US">
+              <a:rPr lang="en-US" altLang="en-US" dirty="0">
                 <a:latin typeface="Courier New" panose="02070309020205020404" pitchFamily="49" charset="0"/>
               </a:rPr>
               <a:t>==</a:t>
             </a:r>
           </a:p>
           <a:p>
-            <a:pPr>
-              <a:buFontTx/>
-              <a:buChar char="•"/>
-            </a:pPr>
-            <a:endParaRPr lang="en-US" altLang="en-US"/>
+            <a:endParaRPr lang="en-US" altLang="en-US" dirty="0"/>
           </a:p>
         </p:txBody>
       </p:sp>
@@ -22446,45 +22279,33 @@
           <a:bodyPr/>
           <a:lstStyle/>
           <a:p>
-            <a:pPr>
-              <a:buFontTx/>
-              <a:buChar char="•"/>
-            </a:pPr>
-            <a:r>
-              <a:rPr lang="en-US" altLang="en-US"/>
+            <a:r>
+              <a:rPr lang="en-US" altLang="en-US" dirty="0"/>
               <a:t>Allows statements to be conditionally executed or skipped over</a:t>
             </a:r>
           </a:p>
           <a:p>
-            <a:pPr>
-              <a:buFontTx/>
-              <a:buChar char="•"/>
-            </a:pPr>
-            <a:r>
-              <a:rPr lang="en-US" altLang="en-US"/>
+            <a:r>
+              <a:rPr lang="en-US" altLang="en-US" dirty="0"/>
               <a:t>Models the way we mentally evaluate situations: </a:t>
             </a:r>
           </a:p>
           <a:p>
             <a:pPr lvl="1"/>
             <a:r>
-              <a:rPr lang="en-US" altLang="en-US"/>
+              <a:rPr lang="en-US" altLang="en-US" dirty="0"/>
               <a:t>"If it is raining, take an umbrella."</a:t>
             </a:r>
           </a:p>
           <a:p>
             <a:pPr lvl="1"/>
             <a:r>
-              <a:rPr lang="en-US" altLang="en-US"/>
+              <a:rPr lang="en-US" altLang="en-US" dirty="0"/>
               <a:t>"If it is cold outside, wear a coat."</a:t>
             </a:r>
           </a:p>
           <a:p>
-            <a:pPr>
-              <a:buFontTx/>
-              <a:buChar char="•"/>
-            </a:pPr>
-            <a:endParaRPr lang="en-US" altLang="en-US"/>
+            <a:endParaRPr lang="en-US" altLang="en-US" dirty="0"/>
           </a:p>
         </p:txBody>
       </p:sp>

</xml_diff>

<commit_message>
Created MadLib for Exam1
</commit_message>
<xml_diff>
--- a/1400_04_Making Decisions.pptx
+++ b/1400_04_Making Decisions.pptx
@@ -2174,7 +2174,7 @@
               <a:pPr>
                 <a:defRPr/>
               </a:pPr>
-              <a:t>9/28/2022</a:t>
+              <a:t>10/3/2022</a:t>
             </a:fld>
             <a:endParaRPr lang="en-US"/>
           </a:p>
@@ -2470,7 +2470,7 @@
           <a:p>
             <a:fld id="{96DFF08F-DC6B-4601-B491-B0F83F6DD2DA}" type="datetimeFigureOut">
               <a:rPr lang="en-US" smtClean="0"/>
-              <a:t>9/28/2022</a:t>
+              <a:t>10/3/2022</a:t>
             </a:fld>
             <a:endParaRPr lang="en-US" dirty="0"/>
           </a:p>
@@ -2722,7 +2722,7 @@
           <a:p>
             <a:fld id="{96DFF08F-DC6B-4601-B491-B0F83F6DD2DA}" type="datetimeFigureOut">
               <a:rPr lang="en-US" smtClean="0"/>
-              <a:t>9/28/2022</a:t>
+              <a:t>10/3/2022</a:t>
             </a:fld>
             <a:endParaRPr lang="en-US" dirty="0"/>
           </a:p>
@@ -2986,7 +2986,7 @@
           <a:p>
             <a:fld id="{96DFF08F-DC6B-4601-B491-B0F83F6DD2DA}" type="datetimeFigureOut">
               <a:rPr lang="en-US" smtClean="0"/>
-              <a:t>9/28/2022</a:t>
+              <a:t>10/3/2022</a:t>
             </a:fld>
             <a:endParaRPr lang="en-US" dirty="0"/>
           </a:p>
@@ -3162,7 +3162,7 @@
           <a:p>
             <a:fld id="{A3E28D29-1ECB-41DF-951B-2A23F95AD026}" type="datetimeFigureOut">
               <a:rPr lang="en-US" smtClean="0"/>
-              <a:t>9/28/2022</a:t>
+              <a:t>10/3/2022</a:t>
             </a:fld>
             <a:endParaRPr lang="en-US" dirty="0"/>
           </a:p>
@@ -3467,7 +3467,7 @@
           <a:p>
             <a:fld id="{96DFF08F-DC6B-4601-B491-B0F83F6DD2DA}" type="datetimeFigureOut">
               <a:rPr lang="en-US" smtClean="0"/>
-              <a:t>9/28/2022</a:t>
+              <a:t>10/3/2022</a:t>
             </a:fld>
             <a:endParaRPr lang="en-US" dirty="0"/>
           </a:p>
@@ -3786,7 +3786,7 @@
           <a:p>
             <a:fld id="{96DFF08F-DC6B-4601-B491-B0F83F6DD2DA}" type="datetimeFigureOut">
               <a:rPr lang="en-US" smtClean="0"/>
-              <a:t>9/28/2022</a:t>
+              <a:t>10/3/2022</a:t>
             </a:fld>
             <a:endParaRPr lang="en-US" dirty="0"/>
           </a:p>
@@ -4171,7 +4171,7 @@
           <a:p>
             <a:fld id="{96DFF08F-DC6B-4601-B491-B0F83F6DD2DA}" type="datetimeFigureOut">
               <a:rPr lang="en-US" smtClean="0"/>
-              <a:t>9/28/2022</a:t>
+              <a:t>10/3/2022</a:t>
             </a:fld>
             <a:endParaRPr lang="en-US" dirty="0"/>
           </a:p>
@@ -4295,7 +4295,7 @@
           <a:p>
             <a:fld id="{96DFF08F-DC6B-4601-B491-B0F83F6DD2DA}" type="datetimeFigureOut">
               <a:rPr lang="en-US" smtClean="0"/>
-              <a:t>9/28/2022</a:t>
+              <a:t>10/3/2022</a:t>
             </a:fld>
             <a:endParaRPr lang="en-US" dirty="0"/>
           </a:p>
@@ -4475,7 +4475,7 @@
             <a:fld id="{96DFF08F-DC6B-4601-B491-B0F83F6DD2DA}" type="datetimeFigureOut">
               <a:rPr lang="en-US" smtClean="0"/>
               <a:pPr/>
-              <a:t>9/28/2022</a:t>
+              <a:t>10/3/2022</a:t>
             </a:fld>
             <a:endParaRPr lang="en-US" dirty="0"/>
           </a:p>
@@ -4838,7 +4838,7 @@
             <a:fld id="{96DFF08F-DC6B-4601-B491-B0F83F6DD2DA}" type="datetimeFigureOut">
               <a:rPr lang="en-US" smtClean="0"/>
               <a:pPr/>
-              <a:t>9/28/2022</a:t>
+              <a:t>10/3/2022</a:t>
             </a:fld>
             <a:endParaRPr lang="en-US" dirty="0"/>
           </a:p>
@@ -5223,7 +5223,7 @@
           <a:p>
             <a:fld id="{96DFF08F-DC6B-4601-B491-B0F83F6DD2DA}" type="datetimeFigureOut">
               <a:rPr lang="en-US" smtClean="0"/>
-              <a:t>9/28/2022</a:t>
+              <a:t>10/3/2022</a:t>
             </a:fld>
             <a:endParaRPr lang="en-US" dirty="0"/>
           </a:p>
@@ -5519,7 +5519,7 @@
             <a:fld id="{96DFF08F-DC6B-4601-B491-B0F83F6DD2DA}" type="datetimeFigureOut">
               <a:rPr lang="en-US" smtClean="0"/>
               <a:pPr/>
-              <a:t>9/28/2022</a:t>
+              <a:t>10/3/2022</a:t>
             </a:fld>
             <a:endParaRPr lang="en-US" dirty="0"/>
           </a:p>
@@ -13149,12 +13149,6 @@
               <a:buNone/>
             </a:pPr>
             <a:r>
-              <a:rPr lang="en-US" altLang="en-US" sz="2400" dirty="0">
-                <a:latin typeface="Courier New" panose="02070309020205020404" pitchFamily="49" charset="0"/>
-              </a:rPr>
-              <a:t>	</a:t>
-            </a:r>
-            <a:r>
               <a:rPr lang="en-US" altLang="en-US" sz="2400" dirty="0"/>
               <a:t>if </a:t>
             </a:r>
@@ -13162,11 +13156,11 @@
               <a:rPr lang="en-US" altLang="en-US" sz="2400" dirty="0">
                 <a:latin typeface="Courier New" panose="02070309020205020404" pitchFamily="49" charset="0"/>
               </a:rPr>
-              <a:t>x </a:t>
+              <a:t>x</a:t>
             </a:r>
             <a:r>
               <a:rPr lang="en-US" altLang="en-US" sz="2400" dirty="0"/>
-              <a:t>is 10, then </a:t>
+              <a:t> is 10, then </a:t>
             </a:r>
           </a:p>
           <a:p>

</xml_diff>

<commit_message>
Files after lecture Oct 12 2022
</commit_message>
<xml_diff>
--- a/1400_04_Making Decisions.pptx
+++ b/1400_04_Making Decisions.pptx
@@ -222,1835 +222,6 @@
 </p1510:revInfo>
 </file>
 
-<file path=ppt/changesInfos/changesInfo1.xml><?xml version="1.0" encoding="utf-8"?>
-<pc:chgInfo xmlns:a="http://schemas.openxmlformats.org/drawingml/2006/main" xmlns:r="http://schemas.openxmlformats.org/officeDocument/2006/relationships" xmlns:ac="http://schemas.microsoft.com/office/drawing/2013/main/command" xmlns:pc="http://schemas.microsoft.com/office/powerpoint/2013/main/command">
-  <pc:docChgLst>
-    <pc:chgData name="Michael Olson2" userId="7fb21594-b682-4edc-9482-c69c6202f15f" providerId="ADAL" clId="{BA5D99CB-F5AF-4C7D-AD32-A9CF23A66002}"/>
-    <pc:docChg chg="custSel addSld delSld modSld modMainMaster">
-      <pc:chgData name="Michael Olson2" userId="7fb21594-b682-4edc-9482-c69c6202f15f" providerId="ADAL" clId="{BA5D99CB-F5AF-4C7D-AD32-A9CF23A66002}" dt="2022-09-22T17:57:36.841" v="51" actId="20577"/>
-      <pc:docMkLst>
-        <pc:docMk/>
-      </pc:docMkLst>
-      <pc:sldChg chg="del">
-        <pc:chgData name="Michael Olson2" userId="7fb21594-b682-4edc-9482-c69c6202f15f" providerId="ADAL" clId="{BA5D99CB-F5AF-4C7D-AD32-A9CF23A66002}" dt="2022-09-22T17:57:28.077" v="31" actId="47"/>
-        <pc:sldMkLst>
-          <pc:docMk/>
-          <pc:sldMk cId="0" sldId="261"/>
-        </pc:sldMkLst>
-      </pc:sldChg>
-      <pc:sldChg chg="modSp">
-        <pc:chgData name="Michael Olson2" userId="7fb21594-b682-4edc-9482-c69c6202f15f" providerId="ADAL" clId="{BA5D99CB-F5AF-4C7D-AD32-A9CF23A66002}" dt="2022-09-22T17:57:10.007" v="29"/>
-        <pc:sldMkLst>
-          <pc:docMk/>
-          <pc:sldMk cId="0" sldId="262"/>
-        </pc:sldMkLst>
-        <pc:spChg chg="mod">
-          <ac:chgData name="Michael Olson2" userId="7fb21594-b682-4edc-9482-c69c6202f15f" providerId="ADAL" clId="{BA5D99CB-F5AF-4C7D-AD32-A9CF23A66002}" dt="2022-09-22T17:57:10.007" v="29"/>
-          <ac:spMkLst>
-            <pc:docMk/>
-            <pc:sldMk cId="0" sldId="262"/>
-            <ac:spMk id="5122" creationId="{85579C84-3F80-86CF-7AAE-26B767EABB27}"/>
-          </ac:spMkLst>
-        </pc:spChg>
-        <pc:spChg chg="mod">
-          <ac:chgData name="Michael Olson2" userId="7fb21594-b682-4edc-9482-c69c6202f15f" providerId="ADAL" clId="{BA5D99CB-F5AF-4C7D-AD32-A9CF23A66002}" dt="2022-09-22T17:57:10.007" v="29"/>
-          <ac:spMkLst>
-            <pc:docMk/>
-            <pc:sldMk cId="0" sldId="262"/>
-            <ac:spMk id="5123" creationId="{27FFA47C-EACE-D18C-3E92-1CA030E47A1F}"/>
-          </ac:spMkLst>
-        </pc:spChg>
-      </pc:sldChg>
-      <pc:sldChg chg="modSp">
-        <pc:chgData name="Michael Olson2" userId="7fb21594-b682-4edc-9482-c69c6202f15f" providerId="ADAL" clId="{BA5D99CB-F5AF-4C7D-AD32-A9CF23A66002}" dt="2022-09-22T17:57:10.007" v="29"/>
-        <pc:sldMkLst>
-          <pc:docMk/>
-          <pc:sldMk cId="0" sldId="263"/>
-        </pc:sldMkLst>
-        <pc:spChg chg="mod">
-          <ac:chgData name="Michael Olson2" userId="7fb21594-b682-4edc-9482-c69c6202f15f" providerId="ADAL" clId="{BA5D99CB-F5AF-4C7D-AD32-A9CF23A66002}" dt="2022-09-22T17:57:10.007" v="29"/>
-          <ac:spMkLst>
-            <pc:docMk/>
-            <pc:sldMk cId="0" sldId="263"/>
-            <ac:spMk id="6146" creationId="{548A5AAE-A305-AACE-3913-8E70DB433C73}"/>
-          </ac:spMkLst>
-        </pc:spChg>
-        <pc:spChg chg="mod">
-          <ac:chgData name="Michael Olson2" userId="7fb21594-b682-4edc-9482-c69c6202f15f" providerId="ADAL" clId="{BA5D99CB-F5AF-4C7D-AD32-A9CF23A66002}" dt="2022-09-22T17:57:10.007" v="29"/>
-          <ac:spMkLst>
-            <pc:docMk/>
-            <pc:sldMk cId="0" sldId="263"/>
-            <ac:spMk id="6147" creationId="{F66E208A-A7CF-54A3-EE4D-5BF07E43C3F3}"/>
-          </ac:spMkLst>
-        </pc:spChg>
-      </pc:sldChg>
-      <pc:sldChg chg="modSp">
-        <pc:chgData name="Michael Olson2" userId="7fb21594-b682-4edc-9482-c69c6202f15f" providerId="ADAL" clId="{BA5D99CB-F5AF-4C7D-AD32-A9CF23A66002}" dt="2022-09-22T17:57:10.007" v="29"/>
-        <pc:sldMkLst>
-          <pc:docMk/>
-          <pc:sldMk cId="0" sldId="264"/>
-        </pc:sldMkLst>
-        <pc:spChg chg="mod">
-          <ac:chgData name="Michael Olson2" userId="7fb21594-b682-4edc-9482-c69c6202f15f" providerId="ADAL" clId="{BA5D99CB-F5AF-4C7D-AD32-A9CF23A66002}" dt="2022-09-22T17:57:10.007" v="29"/>
-          <ac:spMkLst>
-            <pc:docMk/>
-            <pc:sldMk cId="0" sldId="264"/>
-            <ac:spMk id="7170" creationId="{54623AAB-5E87-5EFD-8372-CAC1B44A5C12}"/>
-          </ac:spMkLst>
-        </pc:spChg>
-        <pc:spChg chg="mod">
-          <ac:chgData name="Michael Olson2" userId="7fb21594-b682-4edc-9482-c69c6202f15f" providerId="ADAL" clId="{BA5D99CB-F5AF-4C7D-AD32-A9CF23A66002}" dt="2022-09-22T17:57:10.007" v="29"/>
-          <ac:spMkLst>
-            <pc:docMk/>
-            <pc:sldMk cId="0" sldId="264"/>
-            <ac:spMk id="7171" creationId="{CC29FCDD-296A-4565-46D4-DC05F112DF36}"/>
-          </ac:spMkLst>
-        </pc:spChg>
-      </pc:sldChg>
-      <pc:sldChg chg="modSp">
-        <pc:chgData name="Michael Olson2" userId="7fb21594-b682-4edc-9482-c69c6202f15f" providerId="ADAL" clId="{BA5D99CB-F5AF-4C7D-AD32-A9CF23A66002}" dt="2022-09-22T17:57:10.007" v="29"/>
-        <pc:sldMkLst>
-          <pc:docMk/>
-          <pc:sldMk cId="0" sldId="265"/>
-        </pc:sldMkLst>
-        <pc:spChg chg="mod">
-          <ac:chgData name="Michael Olson2" userId="7fb21594-b682-4edc-9482-c69c6202f15f" providerId="ADAL" clId="{BA5D99CB-F5AF-4C7D-AD32-A9CF23A66002}" dt="2022-09-22T17:57:10.007" v="29"/>
-          <ac:spMkLst>
-            <pc:docMk/>
-            <pc:sldMk cId="0" sldId="265"/>
-            <ac:spMk id="8194" creationId="{5872B02E-DD44-E121-4B03-2BD4C2E3E175}"/>
-          </ac:spMkLst>
-        </pc:spChg>
-        <pc:spChg chg="mod">
-          <ac:chgData name="Michael Olson2" userId="7fb21594-b682-4edc-9482-c69c6202f15f" providerId="ADAL" clId="{BA5D99CB-F5AF-4C7D-AD32-A9CF23A66002}" dt="2022-09-22T17:57:10.007" v="29"/>
-          <ac:spMkLst>
-            <pc:docMk/>
-            <pc:sldMk cId="0" sldId="265"/>
-            <ac:spMk id="8195" creationId="{D279F53E-AF2C-49AA-8133-E57E82B7E819}"/>
-          </ac:spMkLst>
-        </pc:spChg>
-      </pc:sldChg>
-      <pc:sldChg chg="modSp">
-        <pc:chgData name="Michael Olson2" userId="7fb21594-b682-4edc-9482-c69c6202f15f" providerId="ADAL" clId="{BA5D99CB-F5AF-4C7D-AD32-A9CF23A66002}" dt="2022-09-22T17:57:10.007" v="29"/>
-        <pc:sldMkLst>
-          <pc:docMk/>
-          <pc:sldMk cId="0" sldId="266"/>
-        </pc:sldMkLst>
-        <pc:spChg chg="mod">
-          <ac:chgData name="Michael Olson2" userId="7fb21594-b682-4edc-9482-c69c6202f15f" providerId="ADAL" clId="{BA5D99CB-F5AF-4C7D-AD32-A9CF23A66002}" dt="2022-09-22T17:57:10.007" v="29"/>
-          <ac:spMkLst>
-            <pc:docMk/>
-            <pc:sldMk cId="0" sldId="266"/>
-            <ac:spMk id="9218" creationId="{29F51A05-D782-4AA5-A9AD-EA49F0575AE1}"/>
-          </ac:spMkLst>
-        </pc:spChg>
-        <pc:spChg chg="mod">
-          <ac:chgData name="Michael Olson2" userId="7fb21594-b682-4edc-9482-c69c6202f15f" providerId="ADAL" clId="{BA5D99CB-F5AF-4C7D-AD32-A9CF23A66002}" dt="2022-09-22T17:57:10.007" v="29"/>
-          <ac:spMkLst>
-            <pc:docMk/>
-            <pc:sldMk cId="0" sldId="266"/>
-            <ac:spMk id="9219" creationId="{8E39E6C8-6E0D-1F51-C002-6D22D4DDE206}"/>
-          </ac:spMkLst>
-        </pc:spChg>
-      </pc:sldChg>
-      <pc:sldChg chg="modSp">
-        <pc:chgData name="Michael Olson2" userId="7fb21594-b682-4edc-9482-c69c6202f15f" providerId="ADAL" clId="{BA5D99CB-F5AF-4C7D-AD32-A9CF23A66002}" dt="2022-09-22T17:57:10.007" v="29"/>
-        <pc:sldMkLst>
-          <pc:docMk/>
-          <pc:sldMk cId="0" sldId="267"/>
-        </pc:sldMkLst>
-        <pc:spChg chg="mod">
-          <ac:chgData name="Michael Olson2" userId="7fb21594-b682-4edc-9482-c69c6202f15f" providerId="ADAL" clId="{BA5D99CB-F5AF-4C7D-AD32-A9CF23A66002}" dt="2022-09-22T17:57:10.007" v="29"/>
-          <ac:spMkLst>
-            <pc:docMk/>
-            <pc:sldMk cId="0" sldId="267"/>
-            <ac:spMk id="10242" creationId="{497ADC64-B6F7-14FC-F746-F27FA39B5551}"/>
-          </ac:spMkLst>
-        </pc:spChg>
-        <pc:spChg chg="mod">
-          <ac:chgData name="Michael Olson2" userId="7fb21594-b682-4edc-9482-c69c6202f15f" providerId="ADAL" clId="{BA5D99CB-F5AF-4C7D-AD32-A9CF23A66002}" dt="2022-09-22T17:57:10.007" v="29"/>
-          <ac:spMkLst>
-            <pc:docMk/>
-            <pc:sldMk cId="0" sldId="267"/>
-            <ac:spMk id="10243" creationId="{80162389-6650-2FF0-3BA8-8AC22D10858F}"/>
-          </ac:spMkLst>
-        </pc:spChg>
-      </pc:sldChg>
-      <pc:sldChg chg="modSp mod">
-        <pc:chgData name="Michael Olson2" userId="7fb21594-b682-4edc-9482-c69c6202f15f" providerId="ADAL" clId="{BA5D99CB-F5AF-4C7D-AD32-A9CF23A66002}" dt="2022-09-22T17:57:10.007" v="29"/>
-        <pc:sldMkLst>
-          <pc:docMk/>
-          <pc:sldMk cId="0" sldId="268"/>
-        </pc:sldMkLst>
-        <pc:spChg chg="mod">
-          <ac:chgData name="Michael Olson2" userId="7fb21594-b682-4edc-9482-c69c6202f15f" providerId="ADAL" clId="{BA5D99CB-F5AF-4C7D-AD32-A9CF23A66002}" dt="2022-09-22T17:57:10.007" v="29"/>
-          <ac:spMkLst>
-            <pc:docMk/>
-            <pc:sldMk cId="0" sldId="268"/>
-            <ac:spMk id="2" creationId="{FB552B73-8A9B-8FC3-B44D-324C21911502}"/>
-          </ac:spMkLst>
-        </pc:spChg>
-      </pc:sldChg>
-      <pc:sldChg chg="modSp mod">
-        <pc:chgData name="Michael Olson2" userId="7fb21594-b682-4edc-9482-c69c6202f15f" providerId="ADAL" clId="{BA5D99CB-F5AF-4C7D-AD32-A9CF23A66002}" dt="2022-09-22T17:57:10.007" v="29"/>
-        <pc:sldMkLst>
-          <pc:docMk/>
-          <pc:sldMk cId="0" sldId="269"/>
-        </pc:sldMkLst>
-        <pc:spChg chg="mod">
-          <ac:chgData name="Michael Olson2" userId="7fb21594-b682-4edc-9482-c69c6202f15f" providerId="ADAL" clId="{BA5D99CB-F5AF-4C7D-AD32-A9CF23A66002}" dt="2022-09-22T17:57:10.007" v="29"/>
-          <ac:spMkLst>
-            <pc:docMk/>
-            <pc:sldMk cId="0" sldId="269"/>
-            <ac:spMk id="2" creationId="{DDDE3F83-A65A-EE7B-D9D1-C7B1A8027C00}"/>
-          </ac:spMkLst>
-        </pc:spChg>
-      </pc:sldChg>
-      <pc:sldChg chg="modSp">
-        <pc:chgData name="Michael Olson2" userId="7fb21594-b682-4edc-9482-c69c6202f15f" providerId="ADAL" clId="{BA5D99CB-F5AF-4C7D-AD32-A9CF23A66002}" dt="2022-09-22T17:57:10.007" v="29"/>
-        <pc:sldMkLst>
-          <pc:docMk/>
-          <pc:sldMk cId="0" sldId="270"/>
-        </pc:sldMkLst>
-        <pc:spChg chg="mod">
-          <ac:chgData name="Michael Olson2" userId="7fb21594-b682-4edc-9482-c69c6202f15f" providerId="ADAL" clId="{BA5D99CB-F5AF-4C7D-AD32-A9CF23A66002}" dt="2022-09-22T17:57:10.007" v="29"/>
-          <ac:spMkLst>
-            <pc:docMk/>
-            <pc:sldMk cId="0" sldId="270"/>
-            <ac:spMk id="13314" creationId="{1E78EC52-69ED-41FE-51AD-7EBBA54210B6}"/>
-          </ac:spMkLst>
-        </pc:spChg>
-        <pc:spChg chg="mod">
-          <ac:chgData name="Michael Olson2" userId="7fb21594-b682-4edc-9482-c69c6202f15f" providerId="ADAL" clId="{BA5D99CB-F5AF-4C7D-AD32-A9CF23A66002}" dt="2022-09-22T17:57:10.007" v="29"/>
-          <ac:spMkLst>
-            <pc:docMk/>
-            <pc:sldMk cId="0" sldId="270"/>
-            <ac:spMk id="13315" creationId="{D59C714F-1FEC-7315-940E-1BFAA8F17207}"/>
-          </ac:spMkLst>
-        </pc:spChg>
-      </pc:sldChg>
-      <pc:sldChg chg="modSp">
-        <pc:chgData name="Michael Olson2" userId="7fb21594-b682-4edc-9482-c69c6202f15f" providerId="ADAL" clId="{BA5D99CB-F5AF-4C7D-AD32-A9CF23A66002}" dt="2022-09-22T17:57:10.007" v="29"/>
-        <pc:sldMkLst>
-          <pc:docMk/>
-          <pc:sldMk cId="0" sldId="271"/>
-        </pc:sldMkLst>
-        <pc:spChg chg="mod">
-          <ac:chgData name="Michael Olson2" userId="7fb21594-b682-4edc-9482-c69c6202f15f" providerId="ADAL" clId="{BA5D99CB-F5AF-4C7D-AD32-A9CF23A66002}" dt="2022-09-22T17:57:10.007" v="29"/>
-          <ac:spMkLst>
-            <pc:docMk/>
-            <pc:sldMk cId="0" sldId="271"/>
-            <ac:spMk id="14338" creationId="{B1AD9996-DD4E-BA68-299E-D88B1E26EB5B}"/>
-          </ac:spMkLst>
-        </pc:spChg>
-        <pc:spChg chg="mod">
-          <ac:chgData name="Michael Olson2" userId="7fb21594-b682-4edc-9482-c69c6202f15f" providerId="ADAL" clId="{BA5D99CB-F5AF-4C7D-AD32-A9CF23A66002}" dt="2022-09-22T17:57:10.007" v="29"/>
-          <ac:spMkLst>
-            <pc:docMk/>
-            <pc:sldMk cId="0" sldId="271"/>
-            <ac:spMk id="14339" creationId="{CF8DC177-62A1-0BCD-751E-176853F346E4}"/>
-          </ac:spMkLst>
-        </pc:spChg>
-      </pc:sldChg>
-      <pc:sldChg chg="modSp">
-        <pc:chgData name="Michael Olson2" userId="7fb21594-b682-4edc-9482-c69c6202f15f" providerId="ADAL" clId="{BA5D99CB-F5AF-4C7D-AD32-A9CF23A66002}" dt="2022-09-22T17:57:10.007" v="29"/>
-        <pc:sldMkLst>
-          <pc:docMk/>
-          <pc:sldMk cId="0" sldId="272"/>
-        </pc:sldMkLst>
-        <pc:spChg chg="mod">
-          <ac:chgData name="Michael Olson2" userId="7fb21594-b682-4edc-9482-c69c6202f15f" providerId="ADAL" clId="{BA5D99CB-F5AF-4C7D-AD32-A9CF23A66002}" dt="2022-09-22T17:57:10.007" v="29"/>
-          <ac:spMkLst>
-            <pc:docMk/>
-            <pc:sldMk cId="0" sldId="272"/>
-            <ac:spMk id="15362" creationId="{31E43247-CE60-07D7-BB02-6EFF8DE7B4C6}"/>
-          </ac:spMkLst>
-        </pc:spChg>
-      </pc:sldChg>
-      <pc:sldChg chg="modSp">
-        <pc:chgData name="Michael Olson2" userId="7fb21594-b682-4edc-9482-c69c6202f15f" providerId="ADAL" clId="{BA5D99CB-F5AF-4C7D-AD32-A9CF23A66002}" dt="2022-09-22T17:57:10.007" v="29"/>
-        <pc:sldMkLst>
-          <pc:docMk/>
-          <pc:sldMk cId="0" sldId="273"/>
-        </pc:sldMkLst>
-        <pc:spChg chg="mod">
-          <ac:chgData name="Michael Olson2" userId="7fb21594-b682-4edc-9482-c69c6202f15f" providerId="ADAL" clId="{BA5D99CB-F5AF-4C7D-AD32-A9CF23A66002}" dt="2022-09-22T17:57:10.007" v="29"/>
-          <ac:spMkLst>
-            <pc:docMk/>
-            <pc:sldMk cId="0" sldId="273"/>
-            <ac:spMk id="16386" creationId="{A2BAFD41-2CDA-0072-6D13-83B6BF163149}"/>
-          </ac:spMkLst>
-        </pc:spChg>
-      </pc:sldChg>
-      <pc:sldChg chg="modSp mod">
-        <pc:chgData name="Michael Olson2" userId="7fb21594-b682-4edc-9482-c69c6202f15f" providerId="ADAL" clId="{BA5D99CB-F5AF-4C7D-AD32-A9CF23A66002}" dt="2022-09-22T17:57:10.007" v="29"/>
-        <pc:sldMkLst>
-          <pc:docMk/>
-          <pc:sldMk cId="0" sldId="274"/>
-        </pc:sldMkLst>
-        <pc:spChg chg="mod">
-          <ac:chgData name="Michael Olson2" userId="7fb21594-b682-4edc-9482-c69c6202f15f" providerId="ADAL" clId="{BA5D99CB-F5AF-4C7D-AD32-A9CF23A66002}" dt="2022-09-22T17:57:10.007" v="29"/>
-          <ac:spMkLst>
-            <pc:docMk/>
-            <pc:sldMk cId="0" sldId="274"/>
-            <ac:spMk id="2" creationId="{731509C8-9778-F4A9-005C-0D3EBF74BF26}"/>
-          </ac:spMkLst>
-        </pc:spChg>
-      </pc:sldChg>
-      <pc:sldChg chg="modSp mod">
-        <pc:chgData name="Michael Olson2" userId="7fb21594-b682-4edc-9482-c69c6202f15f" providerId="ADAL" clId="{BA5D99CB-F5AF-4C7D-AD32-A9CF23A66002}" dt="2022-09-22T17:57:10.007" v="29"/>
-        <pc:sldMkLst>
-          <pc:docMk/>
-          <pc:sldMk cId="0" sldId="275"/>
-        </pc:sldMkLst>
-        <pc:spChg chg="mod">
-          <ac:chgData name="Michael Olson2" userId="7fb21594-b682-4edc-9482-c69c6202f15f" providerId="ADAL" clId="{BA5D99CB-F5AF-4C7D-AD32-A9CF23A66002}" dt="2022-09-22T17:57:10.007" v="29"/>
-          <ac:spMkLst>
-            <pc:docMk/>
-            <pc:sldMk cId="0" sldId="275"/>
-            <ac:spMk id="18434" creationId="{127DEEF6-F063-FEC2-4DF3-18756E8F9D51}"/>
-          </ac:spMkLst>
-        </pc:spChg>
-        <pc:spChg chg="mod">
-          <ac:chgData name="Michael Olson2" userId="7fb21594-b682-4edc-9482-c69c6202f15f" providerId="ADAL" clId="{BA5D99CB-F5AF-4C7D-AD32-A9CF23A66002}" dt="2022-09-22T17:57:10.007" v="29"/>
-          <ac:spMkLst>
-            <pc:docMk/>
-            <pc:sldMk cId="0" sldId="275"/>
-            <ac:spMk id="18435" creationId="{758AA361-1A23-F8FE-DF84-3979CF2B4A8F}"/>
-          </ac:spMkLst>
-        </pc:spChg>
-      </pc:sldChg>
-      <pc:sldChg chg="modSp">
-        <pc:chgData name="Michael Olson2" userId="7fb21594-b682-4edc-9482-c69c6202f15f" providerId="ADAL" clId="{BA5D99CB-F5AF-4C7D-AD32-A9CF23A66002}" dt="2022-09-22T17:57:10.007" v="29"/>
-        <pc:sldMkLst>
-          <pc:docMk/>
-          <pc:sldMk cId="0" sldId="276"/>
-        </pc:sldMkLst>
-        <pc:spChg chg="mod">
-          <ac:chgData name="Michael Olson2" userId="7fb21594-b682-4edc-9482-c69c6202f15f" providerId="ADAL" clId="{BA5D99CB-F5AF-4C7D-AD32-A9CF23A66002}" dt="2022-09-22T17:57:10.007" v="29"/>
-          <ac:spMkLst>
-            <pc:docMk/>
-            <pc:sldMk cId="0" sldId="276"/>
-            <ac:spMk id="19458" creationId="{CB128E79-DB4C-46E4-CC06-640272F0F9F1}"/>
-          </ac:spMkLst>
-        </pc:spChg>
-        <pc:spChg chg="mod">
-          <ac:chgData name="Michael Olson2" userId="7fb21594-b682-4edc-9482-c69c6202f15f" providerId="ADAL" clId="{BA5D99CB-F5AF-4C7D-AD32-A9CF23A66002}" dt="2022-09-22T17:57:10.007" v="29"/>
-          <ac:spMkLst>
-            <pc:docMk/>
-            <pc:sldMk cId="0" sldId="276"/>
-            <ac:spMk id="19459" creationId="{654141D3-EA6B-57E2-BE3A-780DEE61B658}"/>
-          </ac:spMkLst>
-        </pc:spChg>
-      </pc:sldChg>
-      <pc:sldChg chg="modSp mod">
-        <pc:chgData name="Michael Olson2" userId="7fb21594-b682-4edc-9482-c69c6202f15f" providerId="ADAL" clId="{BA5D99CB-F5AF-4C7D-AD32-A9CF23A66002}" dt="2022-09-22T17:57:10.007" v="29"/>
-        <pc:sldMkLst>
-          <pc:docMk/>
-          <pc:sldMk cId="0" sldId="277"/>
-        </pc:sldMkLst>
-        <pc:spChg chg="mod">
-          <ac:chgData name="Michael Olson2" userId="7fb21594-b682-4edc-9482-c69c6202f15f" providerId="ADAL" clId="{BA5D99CB-F5AF-4C7D-AD32-A9CF23A66002}" dt="2022-09-22T17:57:10.007" v="29"/>
-          <ac:spMkLst>
-            <pc:docMk/>
-            <pc:sldMk cId="0" sldId="277"/>
-            <ac:spMk id="20482" creationId="{F74E73C7-0D4A-3B92-0C08-140FD26A5426}"/>
-          </ac:spMkLst>
-        </pc:spChg>
-        <pc:spChg chg="mod">
-          <ac:chgData name="Michael Olson2" userId="7fb21594-b682-4edc-9482-c69c6202f15f" providerId="ADAL" clId="{BA5D99CB-F5AF-4C7D-AD32-A9CF23A66002}" dt="2022-09-22T17:57:10.007" v="29"/>
-          <ac:spMkLst>
-            <pc:docMk/>
-            <pc:sldMk cId="0" sldId="277"/>
-            <ac:spMk id="20483" creationId="{B0381FD6-C640-2854-5172-FBA692105E02}"/>
-          </ac:spMkLst>
-        </pc:spChg>
-      </pc:sldChg>
-      <pc:sldChg chg="modSp">
-        <pc:chgData name="Michael Olson2" userId="7fb21594-b682-4edc-9482-c69c6202f15f" providerId="ADAL" clId="{BA5D99CB-F5AF-4C7D-AD32-A9CF23A66002}" dt="2022-09-22T17:57:10.007" v="29"/>
-        <pc:sldMkLst>
-          <pc:docMk/>
-          <pc:sldMk cId="0" sldId="278"/>
-        </pc:sldMkLst>
-        <pc:spChg chg="mod">
-          <ac:chgData name="Michael Olson2" userId="7fb21594-b682-4edc-9482-c69c6202f15f" providerId="ADAL" clId="{BA5D99CB-F5AF-4C7D-AD32-A9CF23A66002}" dt="2022-09-22T17:57:10.007" v="29"/>
-          <ac:spMkLst>
-            <pc:docMk/>
-            <pc:sldMk cId="0" sldId="278"/>
-            <ac:spMk id="21506" creationId="{6C74090F-3BB5-3263-730D-9709061D0DC5}"/>
-          </ac:spMkLst>
-        </pc:spChg>
-        <pc:spChg chg="mod">
-          <ac:chgData name="Michael Olson2" userId="7fb21594-b682-4edc-9482-c69c6202f15f" providerId="ADAL" clId="{BA5D99CB-F5AF-4C7D-AD32-A9CF23A66002}" dt="2022-09-22T17:57:10.007" v="29"/>
-          <ac:spMkLst>
-            <pc:docMk/>
-            <pc:sldMk cId="0" sldId="278"/>
-            <ac:spMk id="21507" creationId="{2A947654-0F5D-A23C-4678-6E79E8A65564}"/>
-          </ac:spMkLst>
-        </pc:spChg>
-      </pc:sldChg>
-      <pc:sldChg chg="modSp">
-        <pc:chgData name="Michael Olson2" userId="7fb21594-b682-4edc-9482-c69c6202f15f" providerId="ADAL" clId="{BA5D99CB-F5AF-4C7D-AD32-A9CF23A66002}" dt="2022-09-22T17:57:10.007" v="29"/>
-        <pc:sldMkLst>
-          <pc:docMk/>
-          <pc:sldMk cId="0" sldId="279"/>
-        </pc:sldMkLst>
-        <pc:spChg chg="mod">
-          <ac:chgData name="Michael Olson2" userId="7fb21594-b682-4edc-9482-c69c6202f15f" providerId="ADAL" clId="{BA5D99CB-F5AF-4C7D-AD32-A9CF23A66002}" dt="2022-09-22T17:57:10.007" v="29"/>
-          <ac:spMkLst>
-            <pc:docMk/>
-            <pc:sldMk cId="0" sldId="279"/>
-            <ac:spMk id="22530" creationId="{EA4800EB-2595-CCE8-0596-E786550E5722}"/>
-          </ac:spMkLst>
-        </pc:spChg>
-        <pc:spChg chg="mod">
-          <ac:chgData name="Michael Olson2" userId="7fb21594-b682-4edc-9482-c69c6202f15f" providerId="ADAL" clId="{BA5D99CB-F5AF-4C7D-AD32-A9CF23A66002}" dt="2022-09-22T17:57:10.007" v="29"/>
-          <ac:spMkLst>
-            <pc:docMk/>
-            <pc:sldMk cId="0" sldId="279"/>
-            <ac:spMk id="22531" creationId="{F4DBD76D-1D97-9264-B165-A524DF63C6BA}"/>
-          </ac:spMkLst>
-        </pc:spChg>
-      </pc:sldChg>
-      <pc:sldChg chg="modSp">
-        <pc:chgData name="Michael Olson2" userId="7fb21594-b682-4edc-9482-c69c6202f15f" providerId="ADAL" clId="{BA5D99CB-F5AF-4C7D-AD32-A9CF23A66002}" dt="2022-09-22T17:57:10.007" v="29"/>
-        <pc:sldMkLst>
-          <pc:docMk/>
-          <pc:sldMk cId="0" sldId="280"/>
-        </pc:sldMkLst>
-        <pc:spChg chg="mod">
-          <ac:chgData name="Michael Olson2" userId="7fb21594-b682-4edc-9482-c69c6202f15f" providerId="ADAL" clId="{BA5D99CB-F5AF-4C7D-AD32-A9CF23A66002}" dt="2022-09-22T17:57:10.007" v="29"/>
-          <ac:spMkLst>
-            <pc:docMk/>
-            <pc:sldMk cId="0" sldId="280"/>
-            <ac:spMk id="23554" creationId="{F512001F-2594-D180-BF82-35BE75468F4D}"/>
-          </ac:spMkLst>
-        </pc:spChg>
-        <pc:spChg chg="mod">
-          <ac:chgData name="Michael Olson2" userId="7fb21594-b682-4edc-9482-c69c6202f15f" providerId="ADAL" clId="{BA5D99CB-F5AF-4C7D-AD32-A9CF23A66002}" dt="2022-09-22T17:57:10.007" v="29"/>
-          <ac:spMkLst>
-            <pc:docMk/>
-            <pc:sldMk cId="0" sldId="280"/>
-            <ac:spMk id="23555" creationId="{8DB1E609-2F3D-881A-7799-E441E8084196}"/>
-          </ac:spMkLst>
-        </pc:spChg>
-      </pc:sldChg>
-      <pc:sldChg chg="modSp">
-        <pc:chgData name="Michael Olson2" userId="7fb21594-b682-4edc-9482-c69c6202f15f" providerId="ADAL" clId="{BA5D99CB-F5AF-4C7D-AD32-A9CF23A66002}" dt="2022-09-22T17:57:10.007" v="29"/>
-        <pc:sldMkLst>
-          <pc:docMk/>
-          <pc:sldMk cId="0" sldId="281"/>
-        </pc:sldMkLst>
-        <pc:spChg chg="mod">
-          <ac:chgData name="Michael Olson2" userId="7fb21594-b682-4edc-9482-c69c6202f15f" providerId="ADAL" clId="{BA5D99CB-F5AF-4C7D-AD32-A9CF23A66002}" dt="2022-09-22T17:57:10.007" v="29"/>
-          <ac:spMkLst>
-            <pc:docMk/>
-            <pc:sldMk cId="0" sldId="281"/>
-            <ac:spMk id="24578" creationId="{7C910BA5-E31F-AA7B-B711-19351F2F94CB}"/>
-          </ac:spMkLst>
-        </pc:spChg>
-        <pc:spChg chg="mod">
-          <ac:chgData name="Michael Olson2" userId="7fb21594-b682-4edc-9482-c69c6202f15f" providerId="ADAL" clId="{BA5D99CB-F5AF-4C7D-AD32-A9CF23A66002}" dt="2022-09-22T17:57:10.007" v="29"/>
-          <ac:spMkLst>
-            <pc:docMk/>
-            <pc:sldMk cId="0" sldId="281"/>
-            <ac:spMk id="24579" creationId="{A16D0798-38AC-D6A3-EA5A-A8670D793C8F}"/>
-          </ac:spMkLst>
-        </pc:spChg>
-      </pc:sldChg>
-      <pc:sldChg chg="modSp mod">
-        <pc:chgData name="Michael Olson2" userId="7fb21594-b682-4edc-9482-c69c6202f15f" providerId="ADAL" clId="{BA5D99CB-F5AF-4C7D-AD32-A9CF23A66002}" dt="2022-09-22T17:57:10.007" v="29"/>
-        <pc:sldMkLst>
-          <pc:docMk/>
-          <pc:sldMk cId="0" sldId="282"/>
-        </pc:sldMkLst>
-        <pc:spChg chg="mod">
-          <ac:chgData name="Michael Olson2" userId="7fb21594-b682-4edc-9482-c69c6202f15f" providerId="ADAL" clId="{BA5D99CB-F5AF-4C7D-AD32-A9CF23A66002}" dt="2022-09-22T17:57:10.007" v="29"/>
-          <ac:spMkLst>
-            <pc:docMk/>
-            <pc:sldMk cId="0" sldId="282"/>
-            <ac:spMk id="2" creationId="{BC8B779F-40AF-3D59-D299-9519446FF719}"/>
-          </ac:spMkLst>
-        </pc:spChg>
-      </pc:sldChg>
-      <pc:sldChg chg="modSp mod">
-        <pc:chgData name="Michael Olson2" userId="7fb21594-b682-4edc-9482-c69c6202f15f" providerId="ADAL" clId="{BA5D99CB-F5AF-4C7D-AD32-A9CF23A66002}" dt="2022-09-22T17:57:10.007" v="29"/>
-        <pc:sldMkLst>
-          <pc:docMk/>
-          <pc:sldMk cId="0" sldId="283"/>
-        </pc:sldMkLst>
-        <pc:spChg chg="mod">
-          <ac:chgData name="Michael Olson2" userId="7fb21594-b682-4edc-9482-c69c6202f15f" providerId="ADAL" clId="{BA5D99CB-F5AF-4C7D-AD32-A9CF23A66002}" dt="2022-09-22T17:57:10.007" v="29"/>
-          <ac:spMkLst>
-            <pc:docMk/>
-            <pc:sldMk cId="0" sldId="283"/>
-            <ac:spMk id="2" creationId="{CFD1D9A1-A14F-502F-9CFF-0611F0E915D0}"/>
-          </ac:spMkLst>
-        </pc:spChg>
-      </pc:sldChg>
-      <pc:sldChg chg="modSp mod">
-        <pc:chgData name="Michael Olson2" userId="7fb21594-b682-4edc-9482-c69c6202f15f" providerId="ADAL" clId="{BA5D99CB-F5AF-4C7D-AD32-A9CF23A66002}" dt="2022-09-22T17:57:10.007" v="29"/>
-        <pc:sldMkLst>
-          <pc:docMk/>
-          <pc:sldMk cId="0" sldId="284"/>
-        </pc:sldMkLst>
-        <pc:spChg chg="mod">
-          <ac:chgData name="Michael Olson2" userId="7fb21594-b682-4edc-9482-c69c6202f15f" providerId="ADAL" clId="{BA5D99CB-F5AF-4C7D-AD32-A9CF23A66002}" dt="2022-09-22T17:57:10.007" v="29"/>
-          <ac:spMkLst>
-            <pc:docMk/>
-            <pc:sldMk cId="0" sldId="284"/>
-            <ac:spMk id="2" creationId="{73D61B10-7EEE-0A6F-A910-2F930986DF5E}"/>
-          </ac:spMkLst>
-        </pc:spChg>
-      </pc:sldChg>
-      <pc:sldChg chg="modSp mod">
-        <pc:chgData name="Michael Olson2" userId="7fb21594-b682-4edc-9482-c69c6202f15f" providerId="ADAL" clId="{BA5D99CB-F5AF-4C7D-AD32-A9CF23A66002}" dt="2022-09-22T17:57:10.007" v="29"/>
-        <pc:sldMkLst>
-          <pc:docMk/>
-          <pc:sldMk cId="0" sldId="285"/>
-        </pc:sldMkLst>
-        <pc:spChg chg="mod">
-          <ac:chgData name="Michael Olson2" userId="7fb21594-b682-4edc-9482-c69c6202f15f" providerId="ADAL" clId="{BA5D99CB-F5AF-4C7D-AD32-A9CF23A66002}" dt="2022-09-22T17:57:10.007" v="29"/>
-          <ac:spMkLst>
-            <pc:docMk/>
-            <pc:sldMk cId="0" sldId="285"/>
-            <ac:spMk id="2" creationId="{F6B1BC0F-AC97-7507-CB31-BD666525A8BF}"/>
-          </ac:spMkLst>
-        </pc:spChg>
-      </pc:sldChg>
-      <pc:sldChg chg="modSp">
-        <pc:chgData name="Michael Olson2" userId="7fb21594-b682-4edc-9482-c69c6202f15f" providerId="ADAL" clId="{BA5D99CB-F5AF-4C7D-AD32-A9CF23A66002}" dt="2022-09-22T17:57:10.007" v="29"/>
-        <pc:sldMkLst>
-          <pc:docMk/>
-          <pc:sldMk cId="0" sldId="286"/>
-        </pc:sldMkLst>
-        <pc:spChg chg="mod">
-          <ac:chgData name="Michael Olson2" userId="7fb21594-b682-4edc-9482-c69c6202f15f" providerId="ADAL" clId="{BA5D99CB-F5AF-4C7D-AD32-A9CF23A66002}" dt="2022-09-22T17:57:10.007" v="29"/>
-          <ac:spMkLst>
-            <pc:docMk/>
-            <pc:sldMk cId="0" sldId="286"/>
-            <ac:spMk id="29698" creationId="{8AD11718-4742-CDEB-6128-25C617C6634F}"/>
-          </ac:spMkLst>
-        </pc:spChg>
-        <pc:spChg chg="mod">
-          <ac:chgData name="Michael Olson2" userId="7fb21594-b682-4edc-9482-c69c6202f15f" providerId="ADAL" clId="{BA5D99CB-F5AF-4C7D-AD32-A9CF23A66002}" dt="2022-09-22T17:57:10.007" v="29"/>
-          <ac:spMkLst>
-            <pc:docMk/>
-            <pc:sldMk cId="0" sldId="286"/>
-            <ac:spMk id="29699" creationId="{212B98E6-09D9-D5C5-DAB0-D56896EC0170}"/>
-          </ac:spMkLst>
-        </pc:spChg>
-      </pc:sldChg>
-      <pc:sldChg chg="modSp">
-        <pc:chgData name="Michael Olson2" userId="7fb21594-b682-4edc-9482-c69c6202f15f" providerId="ADAL" clId="{BA5D99CB-F5AF-4C7D-AD32-A9CF23A66002}" dt="2022-09-22T17:57:10.007" v="29"/>
-        <pc:sldMkLst>
-          <pc:docMk/>
-          <pc:sldMk cId="0" sldId="287"/>
-        </pc:sldMkLst>
-        <pc:spChg chg="mod">
-          <ac:chgData name="Michael Olson2" userId="7fb21594-b682-4edc-9482-c69c6202f15f" providerId="ADAL" clId="{BA5D99CB-F5AF-4C7D-AD32-A9CF23A66002}" dt="2022-09-22T17:57:10.007" v="29"/>
-          <ac:spMkLst>
-            <pc:docMk/>
-            <pc:sldMk cId="0" sldId="287"/>
-            <ac:spMk id="30722" creationId="{C96135F3-F49A-A700-E90C-531F5532FB0F}"/>
-          </ac:spMkLst>
-        </pc:spChg>
-        <pc:spChg chg="mod">
-          <ac:chgData name="Michael Olson2" userId="7fb21594-b682-4edc-9482-c69c6202f15f" providerId="ADAL" clId="{BA5D99CB-F5AF-4C7D-AD32-A9CF23A66002}" dt="2022-09-22T17:57:10.007" v="29"/>
-          <ac:spMkLst>
-            <pc:docMk/>
-            <pc:sldMk cId="0" sldId="287"/>
-            <ac:spMk id="30723" creationId="{520CEDED-EBF7-3915-1BFB-910D8853DE46}"/>
-          </ac:spMkLst>
-        </pc:spChg>
-      </pc:sldChg>
-      <pc:sldChg chg="modSp mod">
-        <pc:chgData name="Michael Olson2" userId="7fb21594-b682-4edc-9482-c69c6202f15f" providerId="ADAL" clId="{BA5D99CB-F5AF-4C7D-AD32-A9CF23A66002}" dt="2022-09-22T17:57:10.007" v="29"/>
-        <pc:sldMkLst>
-          <pc:docMk/>
-          <pc:sldMk cId="0" sldId="288"/>
-        </pc:sldMkLst>
-        <pc:spChg chg="mod">
-          <ac:chgData name="Michael Olson2" userId="7fb21594-b682-4edc-9482-c69c6202f15f" providerId="ADAL" clId="{BA5D99CB-F5AF-4C7D-AD32-A9CF23A66002}" dt="2022-09-22T17:57:10.007" v="29"/>
-          <ac:spMkLst>
-            <pc:docMk/>
-            <pc:sldMk cId="0" sldId="288"/>
-            <ac:spMk id="2" creationId="{40FE50A3-60BA-F004-8172-F5DDFDEA6EA8}"/>
-          </ac:spMkLst>
-        </pc:spChg>
-      </pc:sldChg>
-      <pc:sldChg chg="modSp">
-        <pc:chgData name="Michael Olson2" userId="7fb21594-b682-4edc-9482-c69c6202f15f" providerId="ADAL" clId="{BA5D99CB-F5AF-4C7D-AD32-A9CF23A66002}" dt="2022-09-22T17:57:10.007" v="29"/>
-        <pc:sldMkLst>
-          <pc:docMk/>
-          <pc:sldMk cId="0" sldId="289"/>
-        </pc:sldMkLst>
-        <pc:spChg chg="mod">
-          <ac:chgData name="Michael Olson2" userId="7fb21594-b682-4edc-9482-c69c6202f15f" providerId="ADAL" clId="{BA5D99CB-F5AF-4C7D-AD32-A9CF23A66002}" dt="2022-09-22T17:57:10.007" v="29"/>
-          <ac:spMkLst>
-            <pc:docMk/>
-            <pc:sldMk cId="0" sldId="289"/>
-            <ac:spMk id="32770" creationId="{9BECBA6A-EBFC-9F4B-F41C-A72F1437CC64}"/>
-          </ac:spMkLst>
-        </pc:spChg>
-        <pc:spChg chg="mod">
-          <ac:chgData name="Michael Olson2" userId="7fb21594-b682-4edc-9482-c69c6202f15f" providerId="ADAL" clId="{BA5D99CB-F5AF-4C7D-AD32-A9CF23A66002}" dt="2022-09-22T17:57:10.007" v="29"/>
-          <ac:spMkLst>
-            <pc:docMk/>
-            <pc:sldMk cId="0" sldId="289"/>
-            <ac:spMk id="32771" creationId="{01A163D0-892A-6B61-0C10-2A8787A203AB}"/>
-          </ac:spMkLst>
-        </pc:spChg>
-      </pc:sldChg>
-      <pc:sldChg chg="modSp">
-        <pc:chgData name="Michael Olson2" userId="7fb21594-b682-4edc-9482-c69c6202f15f" providerId="ADAL" clId="{BA5D99CB-F5AF-4C7D-AD32-A9CF23A66002}" dt="2022-09-22T17:57:10.007" v="29"/>
-        <pc:sldMkLst>
-          <pc:docMk/>
-          <pc:sldMk cId="0" sldId="290"/>
-        </pc:sldMkLst>
-        <pc:spChg chg="mod">
-          <ac:chgData name="Michael Olson2" userId="7fb21594-b682-4edc-9482-c69c6202f15f" providerId="ADAL" clId="{BA5D99CB-F5AF-4C7D-AD32-A9CF23A66002}" dt="2022-09-22T17:57:10.007" v="29"/>
-          <ac:spMkLst>
-            <pc:docMk/>
-            <pc:sldMk cId="0" sldId="290"/>
-            <ac:spMk id="33794" creationId="{DBE08F80-EF9E-7415-05C9-C1900171675F}"/>
-          </ac:spMkLst>
-        </pc:spChg>
-      </pc:sldChg>
-      <pc:sldChg chg="modSp">
-        <pc:chgData name="Michael Olson2" userId="7fb21594-b682-4edc-9482-c69c6202f15f" providerId="ADAL" clId="{BA5D99CB-F5AF-4C7D-AD32-A9CF23A66002}" dt="2022-09-22T17:57:10.007" v="29"/>
-        <pc:sldMkLst>
-          <pc:docMk/>
-          <pc:sldMk cId="0" sldId="291"/>
-        </pc:sldMkLst>
-        <pc:spChg chg="mod">
-          <ac:chgData name="Michael Olson2" userId="7fb21594-b682-4edc-9482-c69c6202f15f" providerId="ADAL" clId="{BA5D99CB-F5AF-4C7D-AD32-A9CF23A66002}" dt="2022-09-22T17:57:10.007" v="29"/>
-          <ac:spMkLst>
-            <pc:docMk/>
-            <pc:sldMk cId="0" sldId="291"/>
-            <ac:spMk id="34818" creationId="{82C8A0DB-E566-18C0-1CE4-2A0BF9F2E667}"/>
-          </ac:spMkLst>
-        </pc:spChg>
-        <pc:picChg chg="mod">
-          <ac:chgData name="Michael Olson2" userId="7fb21594-b682-4edc-9482-c69c6202f15f" providerId="ADAL" clId="{BA5D99CB-F5AF-4C7D-AD32-A9CF23A66002}" dt="2022-09-22T17:57:10.007" v="29"/>
-          <ac:picMkLst>
-            <pc:docMk/>
-            <pc:sldMk cId="0" sldId="291"/>
-            <ac:picMk id="34819" creationId="{CB1EE37D-6061-17C9-87B4-F107A647967D}"/>
-          </ac:picMkLst>
-        </pc:picChg>
-      </pc:sldChg>
-      <pc:sldChg chg="modSp">
-        <pc:chgData name="Michael Olson2" userId="7fb21594-b682-4edc-9482-c69c6202f15f" providerId="ADAL" clId="{BA5D99CB-F5AF-4C7D-AD32-A9CF23A66002}" dt="2022-09-22T17:57:10.007" v="29"/>
-        <pc:sldMkLst>
-          <pc:docMk/>
-          <pc:sldMk cId="0" sldId="292"/>
-        </pc:sldMkLst>
-        <pc:spChg chg="mod">
-          <ac:chgData name="Michael Olson2" userId="7fb21594-b682-4edc-9482-c69c6202f15f" providerId="ADAL" clId="{BA5D99CB-F5AF-4C7D-AD32-A9CF23A66002}" dt="2022-09-22T17:57:10.007" v="29"/>
-          <ac:spMkLst>
-            <pc:docMk/>
-            <pc:sldMk cId="0" sldId="292"/>
-            <ac:spMk id="35842" creationId="{1EC98500-3889-2B73-FAF8-8D5D09F8BCDA}"/>
-          </ac:spMkLst>
-        </pc:spChg>
-        <pc:spChg chg="mod">
-          <ac:chgData name="Michael Olson2" userId="7fb21594-b682-4edc-9482-c69c6202f15f" providerId="ADAL" clId="{BA5D99CB-F5AF-4C7D-AD32-A9CF23A66002}" dt="2022-09-22T17:57:10.007" v="29"/>
-          <ac:spMkLst>
-            <pc:docMk/>
-            <pc:sldMk cId="0" sldId="292"/>
-            <ac:spMk id="35843" creationId="{BEF8B7E0-859A-18AD-3F9A-A934C762A493}"/>
-          </ac:spMkLst>
-        </pc:spChg>
-      </pc:sldChg>
-      <pc:sldChg chg="modSp mod">
-        <pc:chgData name="Michael Olson2" userId="7fb21594-b682-4edc-9482-c69c6202f15f" providerId="ADAL" clId="{BA5D99CB-F5AF-4C7D-AD32-A9CF23A66002}" dt="2022-09-22T17:57:10.007" v="29"/>
-        <pc:sldMkLst>
-          <pc:docMk/>
-          <pc:sldMk cId="0" sldId="293"/>
-        </pc:sldMkLst>
-        <pc:spChg chg="mod">
-          <ac:chgData name="Michael Olson2" userId="7fb21594-b682-4edc-9482-c69c6202f15f" providerId="ADAL" clId="{BA5D99CB-F5AF-4C7D-AD32-A9CF23A66002}" dt="2022-09-22T17:57:10.007" v="29"/>
-          <ac:spMkLst>
-            <pc:docMk/>
-            <pc:sldMk cId="0" sldId="293"/>
-            <ac:spMk id="3" creationId="{08B5814F-C887-02D5-3FAB-36ED650BF8DC}"/>
-          </ac:spMkLst>
-        </pc:spChg>
-        <pc:spChg chg="mod">
-          <ac:chgData name="Michael Olson2" userId="7fb21594-b682-4edc-9482-c69c6202f15f" providerId="ADAL" clId="{BA5D99CB-F5AF-4C7D-AD32-A9CF23A66002}" dt="2022-09-22T17:57:10.007" v="29"/>
-          <ac:spMkLst>
-            <pc:docMk/>
-            <pc:sldMk cId="0" sldId="293"/>
-            <ac:spMk id="36866" creationId="{A615F666-9488-BFBF-C7DC-668C8AADEB92}"/>
-          </ac:spMkLst>
-        </pc:spChg>
-      </pc:sldChg>
-      <pc:sldChg chg="modSp">
-        <pc:chgData name="Michael Olson2" userId="7fb21594-b682-4edc-9482-c69c6202f15f" providerId="ADAL" clId="{BA5D99CB-F5AF-4C7D-AD32-A9CF23A66002}" dt="2022-09-22T17:57:10.007" v="29"/>
-        <pc:sldMkLst>
-          <pc:docMk/>
-          <pc:sldMk cId="0" sldId="294"/>
-        </pc:sldMkLst>
-        <pc:spChg chg="mod">
-          <ac:chgData name="Michael Olson2" userId="7fb21594-b682-4edc-9482-c69c6202f15f" providerId="ADAL" clId="{BA5D99CB-F5AF-4C7D-AD32-A9CF23A66002}" dt="2022-09-22T17:57:10.007" v="29"/>
-          <ac:spMkLst>
-            <pc:docMk/>
-            <pc:sldMk cId="0" sldId="294"/>
-            <ac:spMk id="37890" creationId="{053236D7-90E2-03C3-B27A-51302BF95545}"/>
-          </ac:spMkLst>
-        </pc:spChg>
-        <pc:spChg chg="mod">
-          <ac:chgData name="Michael Olson2" userId="7fb21594-b682-4edc-9482-c69c6202f15f" providerId="ADAL" clId="{BA5D99CB-F5AF-4C7D-AD32-A9CF23A66002}" dt="2022-09-22T17:57:10.007" v="29"/>
-          <ac:spMkLst>
-            <pc:docMk/>
-            <pc:sldMk cId="0" sldId="294"/>
-            <ac:spMk id="37891" creationId="{335DA215-C423-C9CD-D116-7B9E5B85EEF6}"/>
-          </ac:spMkLst>
-        </pc:spChg>
-      </pc:sldChg>
-      <pc:sldChg chg="modSp mod">
-        <pc:chgData name="Michael Olson2" userId="7fb21594-b682-4edc-9482-c69c6202f15f" providerId="ADAL" clId="{BA5D99CB-F5AF-4C7D-AD32-A9CF23A66002}" dt="2022-09-22T17:57:10.007" v="29"/>
-        <pc:sldMkLst>
-          <pc:docMk/>
-          <pc:sldMk cId="0" sldId="295"/>
-        </pc:sldMkLst>
-        <pc:spChg chg="mod">
-          <ac:chgData name="Michael Olson2" userId="7fb21594-b682-4edc-9482-c69c6202f15f" providerId="ADAL" clId="{BA5D99CB-F5AF-4C7D-AD32-A9CF23A66002}" dt="2022-09-22T17:57:10.007" v="29"/>
-          <ac:spMkLst>
-            <pc:docMk/>
-            <pc:sldMk cId="0" sldId="295"/>
-            <ac:spMk id="2" creationId="{C75EB425-AD06-BDCC-1A75-1DC94674FFF7}"/>
-          </ac:spMkLst>
-        </pc:spChg>
-      </pc:sldChg>
-      <pc:sldChg chg="modSp mod">
-        <pc:chgData name="Michael Olson2" userId="7fb21594-b682-4edc-9482-c69c6202f15f" providerId="ADAL" clId="{BA5D99CB-F5AF-4C7D-AD32-A9CF23A66002}" dt="2022-09-22T17:57:10.007" v="29"/>
-        <pc:sldMkLst>
-          <pc:docMk/>
-          <pc:sldMk cId="0" sldId="296"/>
-        </pc:sldMkLst>
-        <pc:spChg chg="mod">
-          <ac:chgData name="Michael Olson2" userId="7fb21594-b682-4edc-9482-c69c6202f15f" providerId="ADAL" clId="{BA5D99CB-F5AF-4C7D-AD32-A9CF23A66002}" dt="2022-09-22T17:57:10.007" v="29"/>
-          <ac:spMkLst>
-            <pc:docMk/>
-            <pc:sldMk cId="0" sldId="296"/>
-            <ac:spMk id="2" creationId="{A98B39FF-59E1-23AE-748E-523A388ECA5A}"/>
-          </ac:spMkLst>
-        </pc:spChg>
-        <pc:spChg chg="mod">
-          <ac:chgData name="Michael Olson2" userId="7fb21594-b682-4edc-9482-c69c6202f15f" providerId="ADAL" clId="{BA5D99CB-F5AF-4C7D-AD32-A9CF23A66002}" dt="2022-09-22T17:57:10.007" v="29"/>
-          <ac:spMkLst>
-            <pc:docMk/>
-            <pc:sldMk cId="0" sldId="296"/>
-            <ac:spMk id="39939" creationId="{F5E7A887-65F7-F57C-FE47-36825CA7EE58}"/>
-          </ac:spMkLst>
-        </pc:spChg>
-      </pc:sldChg>
-      <pc:sldChg chg="modSp">
-        <pc:chgData name="Michael Olson2" userId="7fb21594-b682-4edc-9482-c69c6202f15f" providerId="ADAL" clId="{BA5D99CB-F5AF-4C7D-AD32-A9CF23A66002}" dt="2022-09-22T17:57:10.007" v="29"/>
-        <pc:sldMkLst>
-          <pc:docMk/>
-          <pc:sldMk cId="0" sldId="297"/>
-        </pc:sldMkLst>
-        <pc:spChg chg="mod">
-          <ac:chgData name="Michael Olson2" userId="7fb21594-b682-4edc-9482-c69c6202f15f" providerId="ADAL" clId="{BA5D99CB-F5AF-4C7D-AD32-A9CF23A66002}" dt="2022-09-22T17:57:10.007" v="29"/>
-          <ac:spMkLst>
-            <pc:docMk/>
-            <pc:sldMk cId="0" sldId="297"/>
-            <ac:spMk id="40962" creationId="{7AABAEDA-4C2B-E4D1-93AC-5D9DAB5F1E99}"/>
-          </ac:spMkLst>
-        </pc:spChg>
-        <pc:spChg chg="mod">
-          <ac:chgData name="Michael Olson2" userId="7fb21594-b682-4edc-9482-c69c6202f15f" providerId="ADAL" clId="{BA5D99CB-F5AF-4C7D-AD32-A9CF23A66002}" dt="2022-09-22T17:57:10.007" v="29"/>
-          <ac:spMkLst>
-            <pc:docMk/>
-            <pc:sldMk cId="0" sldId="297"/>
-            <ac:spMk id="40963" creationId="{82271105-FD32-2833-E8AC-700EE4FCB698}"/>
-          </ac:spMkLst>
-        </pc:spChg>
-      </pc:sldChg>
-      <pc:sldChg chg="modSp">
-        <pc:chgData name="Michael Olson2" userId="7fb21594-b682-4edc-9482-c69c6202f15f" providerId="ADAL" clId="{BA5D99CB-F5AF-4C7D-AD32-A9CF23A66002}" dt="2022-09-22T17:57:10.007" v="29"/>
-        <pc:sldMkLst>
-          <pc:docMk/>
-          <pc:sldMk cId="0" sldId="298"/>
-        </pc:sldMkLst>
-        <pc:spChg chg="mod">
-          <ac:chgData name="Michael Olson2" userId="7fb21594-b682-4edc-9482-c69c6202f15f" providerId="ADAL" clId="{BA5D99CB-F5AF-4C7D-AD32-A9CF23A66002}" dt="2022-09-22T17:57:10.007" v="29"/>
-          <ac:spMkLst>
-            <pc:docMk/>
-            <pc:sldMk cId="0" sldId="298"/>
-            <ac:spMk id="46082" creationId="{349FE875-4DBF-8B08-DBB2-FE89B50515E1}"/>
-          </ac:spMkLst>
-        </pc:spChg>
-        <pc:spChg chg="mod">
-          <ac:chgData name="Michael Olson2" userId="7fb21594-b682-4edc-9482-c69c6202f15f" providerId="ADAL" clId="{BA5D99CB-F5AF-4C7D-AD32-A9CF23A66002}" dt="2022-09-22T17:57:10.007" v="29"/>
-          <ac:spMkLst>
-            <pc:docMk/>
-            <pc:sldMk cId="0" sldId="298"/>
-            <ac:spMk id="46083" creationId="{E1A70CC8-753A-8E6B-91F6-96730710124B}"/>
-          </ac:spMkLst>
-        </pc:spChg>
-      </pc:sldChg>
-      <pc:sldChg chg="modSp">
-        <pc:chgData name="Michael Olson2" userId="7fb21594-b682-4edc-9482-c69c6202f15f" providerId="ADAL" clId="{BA5D99CB-F5AF-4C7D-AD32-A9CF23A66002}" dt="2022-09-22T17:57:10.007" v="29"/>
-        <pc:sldMkLst>
-          <pc:docMk/>
-          <pc:sldMk cId="0" sldId="299"/>
-        </pc:sldMkLst>
-        <pc:spChg chg="mod">
-          <ac:chgData name="Michael Olson2" userId="7fb21594-b682-4edc-9482-c69c6202f15f" providerId="ADAL" clId="{BA5D99CB-F5AF-4C7D-AD32-A9CF23A66002}" dt="2022-09-22T17:57:10.007" v="29"/>
-          <ac:spMkLst>
-            <pc:docMk/>
-            <pc:sldMk cId="0" sldId="299"/>
-            <ac:spMk id="47106" creationId="{07994B44-2270-32C3-5E05-508C3F417BD0}"/>
-          </ac:spMkLst>
-        </pc:spChg>
-        <pc:spChg chg="mod">
-          <ac:chgData name="Michael Olson2" userId="7fb21594-b682-4edc-9482-c69c6202f15f" providerId="ADAL" clId="{BA5D99CB-F5AF-4C7D-AD32-A9CF23A66002}" dt="2022-09-22T17:57:10.007" v="29"/>
-          <ac:spMkLst>
-            <pc:docMk/>
-            <pc:sldMk cId="0" sldId="299"/>
-            <ac:spMk id="47107" creationId="{0A5036FA-18CC-EDDC-B10A-F44A55223062}"/>
-          </ac:spMkLst>
-        </pc:spChg>
-      </pc:sldChg>
-      <pc:sldChg chg="modSp">
-        <pc:chgData name="Michael Olson2" userId="7fb21594-b682-4edc-9482-c69c6202f15f" providerId="ADAL" clId="{BA5D99CB-F5AF-4C7D-AD32-A9CF23A66002}" dt="2022-09-22T17:57:10.007" v="29"/>
-        <pc:sldMkLst>
-          <pc:docMk/>
-          <pc:sldMk cId="0" sldId="300"/>
-        </pc:sldMkLst>
-        <pc:spChg chg="mod">
-          <ac:chgData name="Michael Olson2" userId="7fb21594-b682-4edc-9482-c69c6202f15f" providerId="ADAL" clId="{BA5D99CB-F5AF-4C7D-AD32-A9CF23A66002}" dt="2022-09-22T17:57:10.007" v="29"/>
-          <ac:spMkLst>
-            <pc:docMk/>
-            <pc:sldMk cId="0" sldId="300"/>
-            <ac:spMk id="48130" creationId="{BD3430A4-68D5-DBD5-8782-2C7530D28F11}"/>
-          </ac:spMkLst>
-        </pc:spChg>
-        <pc:spChg chg="mod">
-          <ac:chgData name="Michael Olson2" userId="7fb21594-b682-4edc-9482-c69c6202f15f" providerId="ADAL" clId="{BA5D99CB-F5AF-4C7D-AD32-A9CF23A66002}" dt="2022-09-22T17:57:10.007" v="29"/>
-          <ac:spMkLst>
-            <pc:docMk/>
-            <pc:sldMk cId="0" sldId="300"/>
-            <ac:spMk id="48131" creationId="{82A83F0D-D93B-536A-0F11-5BFF1F3470ED}"/>
-          </ac:spMkLst>
-        </pc:spChg>
-      </pc:sldChg>
-      <pc:sldChg chg="modSp">
-        <pc:chgData name="Michael Olson2" userId="7fb21594-b682-4edc-9482-c69c6202f15f" providerId="ADAL" clId="{BA5D99CB-F5AF-4C7D-AD32-A9CF23A66002}" dt="2022-09-22T17:57:10.007" v="29"/>
-        <pc:sldMkLst>
-          <pc:docMk/>
-          <pc:sldMk cId="0" sldId="301"/>
-        </pc:sldMkLst>
-        <pc:spChg chg="mod">
-          <ac:chgData name="Michael Olson2" userId="7fb21594-b682-4edc-9482-c69c6202f15f" providerId="ADAL" clId="{BA5D99CB-F5AF-4C7D-AD32-A9CF23A66002}" dt="2022-09-22T17:57:10.007" v="29"/>
-          <ac:spMkLst>
-            <pc:docMk/>
-            <pc:sldMk cId="0" sldId="301"/>
-            <ac:spMk id="49154" creationId="{7356158F-5A1D-A70B-0953-C35588CBB816}"/>
-          </ac:spMkLst>
-        </pc:spChg>
-      </pc:sldChg>
-      <pc:sldChg chg="modSp mod">
-        <pc:chgData name="Michael Olson2" userId="7fb21594-b682-4edc-9482-c69c6202f15f" providerId="ADAL" clId="{BA5D99CB-F5AF-4C7D-AD32-A9CF23A66002}" dt="2022-09-22T17:57:10.007" v="29"/>
-        <pc:sldMkLst>
-          <pc:docMk/>
-          <pc:sldMk cId="0" sldId="302"/>
-        </pc:sldMkLst>
-        <pc:spChg chg="mod">
-          <ac:chgData name="Michael Olson2" userId="7fb21594-b682-4edc-9482-c69c6202f15f" providerId="ADAL" clId="{BA5D99CB-F5AF-4C7D-AD32-A9CF23A66002}" dt="2022-09-22T17:57:10.007" v="29"/>
-          <ac:spMkLst>
-            <pc:docMk/>
-            <pc:sldMk cId="0" sldId="302"/>
-            <ac:spMk id="2" creationId="{9B6633BB-E853-50CE-0AAF-1E052263B695}"/>
-          </ac:spMkLst>
-        </pc:spChg>
-      </pc:sldChg>
-      <pc:sldChg chg="modSp mod">
-        <pc:chgData name="Michael Olson2" userId="7fb21594-b682-4edc-9482-c69c6202f15f" providerId="ADAL" clId="{BA5D99CB-F5AF-4C7D-AD32-A9CF23A66002}" dt="2022-09-22T17:57:10.007" v="29"/>
-        <pc:sldMkLst>
-          <pc:docMk/>
-          <pc:sldMk cId="0" sldId="303"/>
-        </pc:sldMkLst>
-        <pc:spChg chg="mod">
-          <ac:chgData name="Michael Olson2" userId="7fb21594-b682-4edc-9482-c69c6202f15f" providerId="ADAL" clId="{BA5D99CB-F5AF-4C7D-AD32-A9CF23A66002}" dt="2022-09-22T17:57:10.007" v="29"/>
-          <ac:spMkLst>
-            <pc:docMk/>
-            <pc:sldMk cId="0" sldId="303"/>
-            <ac:spMk id="2" creationId="{4213D7CF-162C-CBE4-DE94-96DEC18B23DA}"/>
-          </ac:spMkLst>
-        </pc:spChg>
-      </pc:sldChg>
-      <pc:sldChg chg="modSp mod">
-        <pc:chgData name="Michael Olson2" userId="7fb21594-b682-4edc-9482-c69c6202f15f" providerId="ADAL" clId="{BA5D99CB-F5AF-4C7D-AD32-A9CF23A66002}" dt="2022-09-22T17:57:10.007" v="29"/>
-        <pc:sldMkLst>
-          <pc:docMk/>
-          <pc:sldMk cId="0" sldId="304"/>
-        </pc:sldMkLst>
-        <pc:spChg chg="mod">
-          <ac:chgData name="Michael Olson2" userId="7fb21594-b682-4edc-9482-c69c6202f15f" providerId="ADAL" clId="{BA5D99CB-F5AF-4C7D-AD32-A9CF23A66002}" dt="2022-09-22T17:57:10.007" v="29"/>
-          <ac:spMkLst>
-            <pc:docMk/>
-            <pc:sldMk cId="0" sldId="304"/>
-            <ac:spMk id="2" creationId="{4E14E6EE-DA2E-2FC8-3F14-701FB74C9000}"/>
-          </ac:spMkLst>
-        </pc:spChg>
-      </pc:sldChg>
-      <pc:sldChg chg="modSp">
-        <pc:chgData name="Michael Olson2" userId="7fb21594-b682-4edc-9482-c69c6202f15f" providerId="ADAL" clId="{BA5D99CB-F5AF-4C7D-AD32-A9CF23A66002}" dt="2022-09-22T17:57:10.007" v="29"/>
-        <pc:sldMkLst>
-          <pc:docMk/>
-          <pc:sldMk cId="0" sldId="305"/>
-        </pc:sldMkLst>
-        <pc:spChg chg="mod">
-          <ac:chgData name="Michael Olson2" userId="7fb21594-b682-4edc-9482-c69c6202f15f" providerId="ADAL" clId="{BA5D99CB-F5AF-4C7D-AD32-A9CF23A66002}" dt="2022-09-22T17:57:10.007" v="29"/>
-          <ac:spMkLst>
-            <pc:docMk/>
-            <pc:sldMk cId="0" sldId="305"/>
-            <ac:spMk id="53250" creationId="{582EF820-D7B8-7FDB-4915-C47805FE5413}"/>
-          </ac:spMkLst>
-        </pc:spChg>
-        <pc:spChg chg="mod">
-          <ac:chgData name="Michael Olson2" userId="7fb21594-b682-4edc-9482-c69c6202f15f" providerId="ADAL" clId="{BA5D99CB-F5AF-4C7D-AD32-A9CF23A66002}" dt="2022-09-22T17:57:10.007" v="29"/>
-          <ac:spMkLst>
-            <pc:docMk/>
-            <pc:sldMk cId="0" sldId="305"/>
-            <ac:spMk id="53251" creationId="{EA0B5166-19E3-90C5-233D-814D71A14776}"/>
-          </ac:spMkLst>
-        </pc:spChg>
-      </pc:sldChg>
-      <pc:sldChg chg="modSp">
-        <pc:chgData name="Michael Olson2" userId="7fb21594-b682-4edc-9482-c69c6202f15f" providerId="ADAL" clId="{BA5D99CB-F5AF-4C7D-AD32-A9CF23A66002}" dt="2022-09-22T17:57:10.007" v="29"/>
-        <pc:sldMkLst>
-          <pc:docMk/>
-          <pc:sldMk cId="0" sldId="306"/>
-        </pc:sldMkLst>
-        <pc:spChg chg="mod">
-          <ac:chgData name="Michael Olson2" userId="7fb21594-b682-4edc-9482-c69c6202f15f" providerId="ADAL" clId="{BA5D99CB-F5AF-4C7D-AD32-A9CF23A66002}" dt="2022-09-22T17:57:10.007" v="29"/>
-          <ac:spMkLst>
-            <pc:docMk/>
-            <pc:sldMk cId="0" sldId="306"/>
-            <ac:spMk id="54274" creationId="{6E84F6D3-6F7F-9EFD-2D23-215B03AB45ED}"/>
-          </ac:spMkLst>
-        </pc:spChg>
-        <pc:spChg chg="mod">
-          <ac:chgData name="Michael Olson2" userId="7fb21594-b682-4edc-9482-c69c6202f15f" providerId="ADAL" clId="{BA5D99CB-F5AF-4C7D-AD32-A9CF23A66002}" dt="2022-09-22T17:57:10.007" v="29"/>
-          <ac:spMkLst>
-            <pc:docMk/>
-            <pc:sldMk cId="0" sldId="306"/>
-            <ac:spMk id="54275" creationId="{86B8E6B3-2526-636F-CFE6-5A4041318330}"/>
-          </ac:spMkLst>
-        </pc:spChg>
-      </pc:sldChg>
-      <pc:sldChg chg="modSp mod">
-        <pc:chgData name="Michael Olson2" userId="7fb21594-b682-4edc-9482-c69c6202f15f" providerId="ADAL" clId="{BA5D99CB-F5AF-4C7D-AD32-A9CF23A66002}" dt="2022-09-22T17:57:10.007" v="29"/>
-        <pc:sldMkLst>
-          <pc:docMk/>
-          <pc:sldMk cId="0" sldId="307"/>
-        </pc:sldMkLst>
-        <pc:spChg chg="mod">
-          <ac:chgData name="Michael Olson2" userId="7fb21594-b682-4edc-9482-c69c6202f15f" providerId="ADAL" clId="{BA5D99CB-F5AF-4C7D-AD32-A9CF23A66002}" dt="2022-09-22T17:57:10.007" v="29"/>
-          <ac:spMkLst>
-            <pc:docMk/>
-            <pc:sldMk cId="0" sldId="307"/>
-            <ac:spMk id="2" creationId="{85EDA599-D634-D11E-9782-BBAB2AE661DB}"/>
-          </ac:spMkLst>
-        </pc:spChg>
-        <pc:spChg chg="mod">
-          <ac:chgData name="Michael Olson2" userId="7fb21594-b682-4edc-9482-c69c6202f15f" providerId="ADAL" clId="{BA5D99CB-F5AF-4C7D-AD32-A9CF23A66002}" dt="2022-09-22T17:57:10.007" v="29"/>
-          <ac:spMkLst>
-            <pc:docMk/>
-            <pc:sldMk cId="0" sldId="307"/>
-            <ac:spMk id="55299" creationId="{AE996CE2-2C78-517B-2265-7CD90AE47AD4}"/>
-          </ac:spMkLst>
-        </pc:spChg>
-      </pc:sldChg>
-      <pc:sldChg chg="modSp">
-        <pc:chgData name="Michael Olson2" userId="7fb21594-b682-4edc-9482-c69c6202f15f" providerId="ADAL" clId="{BA5D99CB-F5AF-4C7D-AD32-A9CF23A66002}" dt="2022-09-22T17:57:10.007" v="29"/>
-        <pc:sldMkLst>
-          <pc:docMk/>
-          <pc:sldMk cId="0" sldId="308"/>
-        </pc:sldMkLst>
-        <pc:spChg chg="mod">
-          <ac:chgData name="Michael Olson2" userId="7fb21594-b682-4edc-9482-c69c6202f15f" providerId="ADAL" clId="{BA5D99CB-F5AF-4C7D-AD32-A9CF23A66002}" dt="2022-09-22T17:57:10.007" v="29"/>
-          <ac:spMkLst>
-            <pc:docMk/>
-            <pc:sldMk cId="0" sldId="308"/>
-            <ac:spMk id="56322" creationId="{C1CE88F2-4410-0E08-3B9F-4E3B73B389C3}"/>
-          </ac:spMkLst>
-        </pc:spChg>
-        <pc:spChg chg="mod">
-          <ac:chgData name="Michael Olson2" userId="7fb21594-b682-4edc-9482-c69c6202f15f" providerId="ADAL" clId="{BA5D99CB-F5AF-4C7D-AD32-A9CF23A66002}" dt="2022-09-22T17:57:10.007" v="29"/>
-          <ac:spMkLst>
-            <pc:docMk/>
-            <pc:sldMk cId="0" sldId="308"/>
-            <ac:spMk id="56323" creationId="{EC495CCB-1EAB-B861-EFBB-774D719C3A52}"/>
-          </ac:spMkLst>
-        </pc:spChg>
-      </pc:sldChg>
-      <pc:sldChg chg="modSp">
-        <pc:chgData name="Michael Olson2" userId="7fb21594-b682-4edc-9482-c69c6202f15f" providerId="ADAL" clId="{BA5D99CB-F5AF-4C7D-AD32-A9CF23A66002}" dt="2022-09-22T17:57:10.007" v="29"/>
-        <pc:sldMkLst>
-          <pc:docMk/>
-          <pc:sldMk cId="0" sldId="309"/>
-        </pc:sldMkLst>
-        <pc:spChg chg="mod">
-          <ac:chgData name="Michael Olson2" userId="7fb21594-b682-4edc-9482-c69c6202f15f" providerId="ADAL" clId="{BA5D99CB-F5AF-4C7D-AD32-A9CF23A66002}" dt="2022-09-22T17:57:10.007" v="29"/>
-          <ac:spMkLst>
-            <pc:docMk/>
-            <pc:sldMk cId="0" sldId="309"/>
-            <ac:spMk id="57346" creationId="{4EC0D69E-2847-7538-EB5C-A9F349C79054}"/>
-          </ac:spMkLst>
-        </pc:spChg>
-        <pc:spChg chg="mod">
-          <ac:chgData name="Michael Olson2" userId="7fb21594-b682-4edc-9482-c69c6202f15f" providerId="ADAL" clId="{BA5D99CB-F5AF-4C7D-AD32-A9CF23A66002}" dt="2022-09-22T17:57:10.007" v="29"/>
-          <ac:spMkLst>
-            <pc:docMk/>
-            <pc:sldMk cId="0" sldId="309"/>
-            <ac:spMk id="57347" creationId="{0D585F53-CF1A-A37F-C4D5-3EAA816ADB65}"/>
-          </ac:spMkLst>
-        </pc:spChg>
-      </pc:sldChg>
-      <pc:sldChg chg="modSp mod">
-        <pc:chgData name="Michael Olson2" userId="7fb21594-b682-4edc-9482-c69c6202f15f" providerId="ADAL" clId="{BA5D99CB-F5AF-4C7D-AD32-A9CF23A66002}" dt="2022-09-22T17:57:10.007" v="29"/>
-        <pc:sldMkLst>
-          <pc:docMk/>
-          <pc:sldMk cId="0" sldId="310"/>
-        </pc:sldMkLst>
-        <pc:spChg chg="mod">
-          <ac:chgData name="Michael Olson2" userId="7fb21594-b682-4edc-9482-c69c6202f15f" providerId="ADAL" clId="{BA5D99CB-F5AF-4C7D-AD32-A9CF23A66002}" dt="2022-09-22T17:57:10.007" v="29"/>
-          <ac:spMkLst>
-            <pc:docMk/>
-            <pc:sldMk cId="0" sldId="310"/>
-            <ac:spMk id="2" creationId="{1995E358-8A66-6EDA-DBD8-A8A8E597967C}"/>
-          </ac:spMkLst>
-        </pc:spChg>
-        <pc:spChg chg="mod">
-          <ac:chgData name="Michael Olson2" userId="7fb21594-b682-4edc-9482-c69c6202f15f" providerId="ADAL" clId="{BA5D99CB-F5AF-4C7D-AD32-A9CF23A66002}" dt="2022-09-22T17:57:10.007" v="29"/>
-          <ac:spMkLst>
-            <pc:docMk/>
-            <pc:sldMk cId="0" sldId="310"/>
-            <ac:spMk id="58371" creationId="{6E04A763-DE1B-35C4-5F43-30C8E4941E6D}"/>
-          </ac:spMkLst>
-        </pc:spChg>
-      </pc:sldChg>
-      <pc:sldChg chg="modSp">
-        <pc:chgData name="Michael Olson2" userId="7fb21594-b682-4edc-9482-c69c6202f15f" providerId="ADAL" clId="{BA5D99CB-F5AF-4C7D-AD32-A9CF23A66002}" dt="2022-09-22T17:57:10.007" v="29"/>
-        <pc:sldMkLst>
-          <pc:docMk/>
-          <pc:sldMk cId="0" sldId="311"/>
-        </pc:sldMkLst>
-        <pc:spChg chg="mod">
-          <ac:chgData name="Michael Olson2" userId="7fb21594-b682-4edc-9482-c69c6202f15f" providerId="ADAL" clId="{BA5D99CB-F5AF-4C7D-AD32-A9CF23A66002}" dt="2022-09-22T17:57:10.007" v="29"/>
-          <ac:spMkLst>
-            <pc:docMk/>
-            <pc:sldMk cId="0" sldId="311"/>
-            <ac:spMk id="59394" creationId="{B2ABDC51-2744-5C2C-6E6A-BE08A6F18634}"/>
-          </ac:spMkLst>
-        </pc:spChg>
-        <pc:spChg chg="mod">
-          <ac:chgData name="Michael Olson2" userId="7fb21594-b682-4edc-9482-c69c6202f15f" providerId="ADAL" clId="{BA5D99CB-F5AF-4C7D-AD32-A9CF23A66002}" dt="2022-09-22T17:57:10.007" v="29"/>
-          <ac:spMkLst>
-            <pc:docMk/>
-            <pc:sldMk cId="0" sldId="311"/>
-            <ac:spMk id="59395" creationId="{FF9B605B-A3E9-DF7F-5311-AE422A8107AE}"/>
-          </ac:spMkLst>
-        </pc:spChg>
-      </pc:sldChg>
-      <pc:sldChg chg="modSp">
-        <pc:chgData name="Michael Olson2" userId="7fb21594-b682-4edc-9482-c69c6202f15f" providerId="ADAL" clId="{BA5D99CB-F5AF-4C7D-AD32-A9CF23A66002}" dt="2022-09-22T17:57:10.007" v="29"/>
-        <pc:sldMkLst>
-          <pc:docMk/>
-          <pc:sldMk cId="0" sldId="312"/>
-        </pc:sldMkLst>
-        <pc:spChg chg="mod">
-          <ac:chgData name="Michael Olson2" userId="7fb21594-b682-4edc-9482-c69c6202f15f" providerId="ADAL" clId="{BA5D99CB-F5AF-4C7D-AD32-A9CF23A66002}" dt="2022-09-22T17:57:10.007" v="29"/>
-          <ac:spMkLst>
-            <pc:docMk/>
-            <pc:sldMk cId="0" sldId="312"/>
-            <ac:spMk id="60418" creationId="{4FEEB642-F508-DA6A-B7A5-350F53FFD5DE}"/>
-          </ac:spMkLst>
-        </pc:spChg>
-        <pc:spChg chg="mod">
-          <ac:chgData name="Michael Olson2" userId="7fb21594-b682-4edc-9482-c69c6202f15f" providerId="ADAL" clId="{BA5D99CB-F5AF-4C7D-AD32-A9CF23A66002}" dt="2022-09-22T17:57:10.007" v="29"/>
-          <ac:spMkLst>
-            <pc:docMk/>
-            <pc:sldMk cId="0" sldId="312"/>
-            <ac:spMk id="60419" creationId="{59362CB4-00D5-C89B-0C86-D09381B0EBF0}"/>
-          </ac:spMkLst>
-        </pc:spChg>
-      </pc:sldChg>
-      <pc:sldChg chg="modSp">
-        <pc:chgData name="Michael Olson2" userId="7fb21594-b682-4edc-9482-c69c6202f15f" providerId="ADAL" clId="{BA5D99CB-F5AF-4C7D-AD32-A9CF23A66002}" dt="2022-09-22T17:57:10.007" v="29"/>
-        <pc:sldMkLst>
-          <pc:docMk/>
-          <pc:sldMk cId="0" sldId="313"/>
-        </pc:sldMkLst>
-        <pc:spChg chg="mod">
-          <ac:chgData name="Michael Olson2" userId="7fb21594-b682-4edc-9482-c69c6202f15f" providerId="ADAL" clId="{BA5D99CB-F5AF-4C7D-AD32-A9CF23A66002}" dt="2022-09-22T17:57:10.007" v="29"/>
-          <ac:spMkLst>
-            <pc:docMk/>
-            <pc:sldMk cId="0" sldId="313"/>
-            <ac:spMk id="61442" creationId="{7CDD4938-3806-EB6B-C6F2-8FB1FE8E43E5}"/>
-          </ac:spMkLst>
-        </pc:spChg>
-      </pc:sldChg>
-      <pc:sldChg chg="modSp">
-        <pc:chgData name="Michael Olson2" userId="7fb21594-b682-4edc-9482-c69c6202f15f" providerId="ADAL" clId="{BA5D99CB-F5AF-4C7D-AD32-A9CF23A66002}" dt="2022-09-22T17:57:10.007" v="29"/>
-        <pc:sldMkLst>
-          <pc:docMk/>
-          <pc:sldMk cId="0" sldId="314"/>
-        </pc:sldMkLst>
-        <pc:spChg chg="mod">
-          <ac:chgData name="Michael Olson2" userId="7fb21594-b682-4edc-9482-c69c6202f15f" providerId="ADAL" clId="{BA5D99CB-F5AF-4C7D-AD32-A9CF23A66002}" dt="2022-09-22T17:57:10.007" v="29"/>
-          <ac:spMkLst>
-            <pc:docMk/>
-            <pc:sldMk cId="0" sldId="314"/>
-            <ac:spMk id="62466" creationId="{1197B533-013C-6FC1-4131-92F3C595DE32}"/>
-          </ac:spMkLst>
-        </pc:spChg>
-        <pc:spChg chg="mod">
-          <ac:chgData name="Michael Olson2" userId="7fb21594-b682-4edc-9482-c69c6202f15f" providerId="ADAL" clId="{BA5D99CB-F5AF-4C7D-AD32-A9CF23A66002}" dt="2022-09-22T17:57:10.007" v="29"/>
-          <ac:spMkLst>
-            <pc:docMk/>
-            <pc:sldMk cId="0" sldId="314"/>
-            <ac:spMk id="62467" creationId="{09D65AAA-3171-2BA4-3C38-FE5D419EA202}"/>
-          </ac:spMkLst>
-        </pc:spChg>
-      </pc:sldChg>
-      <pc:sldChg chg="modSp">
-        <pc:chgData name="Michael Olson2" userId="7fb21594-b682-4edc-9482-c69c6202f15f" providerId="ADAL" clId="{BA5D99CB-F5AF-4C7D-AD32-A9CF23A66002}" dt="2022-09-22T17:57:10.007" v="29"/>
-        <pc:sldMkLst>
-          <pc:docMk/>
-          <pc:sldMk cId="0" sldId="315"/>
-        </pc:sldMkLst>
-        <pc:spChg chg="mod">
-          <ac:chgData name="Michael Olson2" userId="7fb21594-b682-4edc-9482-c69c6202f15f" providerId="ADAL" clId="{BA5D99CB-F5AF-4C7D-AD32-A9CF23A66002}" dt="2022-09-22T17:57:10.007" v="29"/>
-          <ac:spMkLst>
-            <pc:docMk/>
-            <pc:sldMk cId="0" sldId="315"/>
-            <ac:spMk id="3" creationId="{B1F92F48-D205-2848-CED7-7107474038A5}"/>
-          </ac:spMkLst>
-        </pc:spChg>
-        <pc:spChg chg="mod">
-          <ac:chgData name="Michael Olson2" userId="7fb21594-b682-4edc-9482-c69c6202f15f" providerId="ADAL" clId="{BA5D99CB-F5AF-4C7D-AD32-A9CF23A66002}" dt="2022-09-22T17:57:10.007" v="29"/>
-          <ac:spMkLst>
-            <pc:docMk/>
-            <pc:sldMk cId="0" sldId="315"/>
-            <ac:spMk id="63490" creationId="{329D245C-2377-3F57-1F67-9132696D717A}"/>
-          </ac:spMkLst>
-        </pc:spChg>
-      </pc:sldChg>
-      <pc:sldChg chg="modSp mod">
-        <pc:chgData name="Michael Olson2" userId="7fb21594-b682-4edc-9482-c69c6202f15f" providerId="ADAL" clId="{BA5D99CB-F5AF-4C7D-AD32-A9CF23A66002}" dt="2022-09-22T17:57:10.007" v="29"/>
-        <pc:sldMkLst>
-          <pc:docMk/>
-          <pc:sldMk cId="0" sldId="316"/>
-        </pc:sldMkLst>
-        <pc:spChg chg="mod">
-          <ac:chgData name="Michael Olson2" userId="7fb21594-b682-4edc-9482-c69c6202f15f" providerId="ADAL" clId="{BA5D99CB-F5AF-4C7D-AD32-A9CF23A66002}" dt="2022-09-22T17:57:10.007" v="29"/>
-          <ac:spMkLst>
-            <pc:docMk/>
-            <pc:sldMk cId="0" sldId="316"/>
-            <ac:spMk id="2" creationId="{EFE2AB40-1AA6-930D-A4C7-DFC8E3492090}"/>
-          </ac:spMkLst>
-        </pc:spChg>
-      </pc:sldChg>
-      <pc:sldChg chg="modSp">
-        <pc:chgData name="Michael Olson2" userId="7fb21594-b682-4edc-9482-c69c6202f15f" providerId="ADAL" clId="{BA5D99CB-F5AF-4C7D-AD32-A9CF23A66002}" dt="2022-09-22T17:57:10.007" v="29"/>
-        <pc:sldMkLst>
-          <pc:docMk/>
-          <pc:sldMk cId="0" sldId="317"/>
-        </pc:sldMkLst>
-        <pc:spChg chg="mod">
-          <ac:chgData name="Michael Olson2" userId="7fb21594-b682-4edc-9482-c69c6202f15f" providerId="ADAL" clId="{BA5D99CB-F5AF-4C7D-AD32-A9CF23A66002}" dt="2022-09-22T17:57:10.007" v="29"/>
-          <ac:spMkLst>
-            <pc:docMk/>
-            <pc:sldMk cId="0" sldId="317"/>
-            <ac:spMk id="65538" creationId="{C2CB4376-2DC0-9D0B-FFF5-20988D4BB81C}"/>
-          </ac:spMkLst>
-        </pc:spChg>
-        <pc:spChg chg="mod">
-          <ac:chgData name="Michael Olson2" userId="7fb21594-b682-4edc-9482-c69c6202f15f" providerId="ADAL" clId="{BA5D99CB-F5AF-4C7D-AD32-A9CF23A66002}" dt="2022-09-22T17:57:10.007" v="29"/>
-          <ac:spMkLst>
-            <pc:docMk/>
-            <pc:sldMk cId="0" sldId="317"/>
-            <ac:spMk id="65539" creationId="{D926EF10-228F-D339-4AC1-CA9882D378CC}"/>
-          </ac:spMkLst>
-        </pc:spChg>
-      </pc:sldChg>
-      <pc:sldChg chg="modSp">
-        <pc:chgData name="Michael Olson2" userId="7fb21594-b682-4edc-9482-c69c6202f15f" providerId="ADAL" clId="{BA5D99CB-F5AF-4C7D-AD32-A9CF23A66002}" dt="2022-09-22T17:57:10.007" v="29"/>
-        <pc:sldMkLst>
-          <pc:docMk/>
-          <pc:sldMk cId="0" sldId="318"/>
-        </pc:sldMkLst>
-        <pc:spChg chg="mod">
-          <ac:chgData name="Michael Olson2" userId="7fb21594-b682-4edc-9482-c69c6202f15f" providerId="ADAL" clId="{BA5D99CB-F5AF-4C7D-AD32-A9CF23A66002}" dt="2022-09-22T17:57:10.007" v="29"/>
-          <ac:spMkLst>
-            <pc:docMk/>
-            <pc:sldMk cId="0" sldId="318"/>
-            <ac:spMk id="66562" creationId="{0244C993-A1CE-B1B1-BEF3-487CADEB48A4}"/>
-          </ac:spMkLst>
-        </pc:spChg>
-      </pc:sldChg>
-      <pc:sldChg chg="modSp">
-        <pc:chgData name="Michael Olson2" userId="7fb21594-b682-4edc-9482-c69c6202f15f" providerId="ADAL" clId="{BA5D99CB-F5AF-4C7D-AD32-A9CF23A66002}" dt="2022-09-22T17:57:10.007" v="29"/>
-        <pc:sldMkLst>
-          <pc:docMk/>
-          <pc:sldMk cId="0" sldId="319"/>
-        </pc:sldMkLst>
-        <pc:spChg chg="mod">
-          <ac:chgData name="Michael Olson2" userId="7fb21594-b682-4edc-9482-c69c6202f15f" providerId="ADAL" clId="{BA5D99CB-F5AF-4C7D-AD32-A9CF23A66002}" dt="2022-09-22T17:57:10.007" v="29"/>
-          <ac:spMkLst>
-            <pc:docMk/>
-            <pc:sldMk cId="0" sldId="319"/>
-            <ac:spMk id="67586" creationId="{FE178C1B-1478-785E-958F-4DD2B89F9A81}"/>
-          </ac:spMkLst>
-        </pc:spChg>
-        <pc:spChg chg="mod">
-          <ac:chgData name="Michael Olson2" userId="7fb21594-b682-4edc-9482-c69c6202f15f" providerId="ADAL" clId="{BA5D99CB-F5AF-4C7D-AD32-A9CF23A66002}" dt="2022-09-22T17:57:10.007" v="29"/>
-          <ac:spMkLst>
-            <pc:docMk/>
-            <pc:sldMk cId="0" sldId="319"/>
-            <ac:spMk id="67587" creationId="{92FFE32B-69BF-A28B-D8F0-323141E26CC9}"/>
-          </ac:spMkLst>
-        </pc:spChg>
-      </pc:sldChg>
-      <pc:sldChg chg="modSp">
-        <pc:chgData name="Michael Olson2" userId="7fb21594-b682-4edc-9482-c69c6202f15f" providerId="ADAL" clId="{BA5D99CB-F5AF-4C7D-AD32-A9CF23A66002}" dt="2022-09-22T17:57:10.007" v="29"/>
-        <pc:sldMkLst>
-          <pc:docMk/>
-          <pc:sldMk cId="0" sldId="320"/>
-        </pc:sldMkLst>
-        <pc:spChg chg="mod">
-          <ac:chgData name="Michael Olson2" userId="7fb21594-b682-4edc-9482-c69c6202f15f" providerId="ADAL" clId="{BA5D99CB-F5AF-4C7D-AD32-A9CF23A66002}" dt="2022-09-22T17:57:10.007" v="29"/>
-          <ac:spMkLst>
-            <pc:docMk/>
-            <pc:sldMk cId="0" sldId="320"/>
-            <ac:spMk id="68610" creationId="{5335022A-526F-EAEF-7B30-1EF719FDC060}"/>
-          </ac:spMkLst>
-        </pc:spChg>
-        <pc:spChg chg="mod">
-          <ac:chgData name="Michael Olson2" userId="7fb21594-b682-4edc-9482-c69c6202f15f" providerId="ADAL" clId="{BA5D99CB-F5AF-4C7D-AD32-A9CF23A66002}" dt="2022-09-22T17:57:10.007" v="29"/>
-          <ac:spMkLst>
-            <pc:docMk/>
-            <pc:sldMk cId="0" sldId="320"/>
-            <ac:spMk id="68611" creationId="{8CE1853B-2C92-7E0D-6933-726706B3D5F5}"/>
-          </ac:spMkLst>
-        </pc:spChg>
-      </pc:sldChg>
-      <pc:sldChg chg="modSp">
-        <pc:chgData name="Michael Olson2" userId="7fb21594-b682-4edc-9482-c69c6202f15f" providerId="ADAL" clId="{BA5D99CB-F5AF-4C7D-AD32-A9CF23A66002}" dt="2022-09-22T17:57:10.007" v="29"/>
-        <pc:sldMkLst>
-          <pc:docMk/>
-          <pc:sldMk cId="0" sldId="321"/>
-        </pc:sldMkLst>
-        <pc:spChg chg="mod">
-          <ac:chgData name="Michael Olson2" userId="7fb21594-b682-4edc-9482-c69c6202f15f" providerId="ADAL" clId="{BA5D99CB-F5AF-4C7D-AD32-A9CF23A66002}" dt="2022-09-22T17:57:10.007" v="29"/>
-          <ac:spMkLst>
-            <pc:docMk/>
-            <pc:sldMk cId="0" sldId="321"/>
-            <ac:spMk id="69634" creationId="{3F68584C-D269-751C-F661-6F3C98F55FE9}"/>
-          </ac:spMkLst>
-        </pc:spChg>
-        <pc:spChg chg="mod">
-          <ac:chgData name="Michael Olson2" userId="7fb21594-b682-4edc-9482-c69c6202f15f" providerId="ADAL" clId="{BA5D99CB-F5AF-4C7D-AD32-A9CF23A66002}" dt="2022-09-22T17:57:10.007" v="29"/>
-          <ac:spMkLst>
-            <pc:docMk/>
-            <pc:sldMk cId="0" sldId="321"/>
-            <ac:spMk id="69635" creationId="{52937456-D1BD-4EEE-8279-F02FEF4A2E92}"/>
-          </ac:spMkLst>
-        </pc:spChg>
-      </pc:sldChg>
-      <pc:sldChg chg="modSp mod">
-        <pc:chgData name="Michael Olson2" userId="7fb21594-b682-4edc-9482-c69c6202f15f" providerId="ADAL" clId="{BA5D99CB-F5AF-4C7D-AD32-A9CF23A66002}" dt="2022-09-22T17:57:10.007" v="29"/>
-        <pc:sldMkLst>
-          <pc:docMk/>
-          <pc:sldMk cId="0" sldId="322"/>
-        </pc:sldMkLst>
-        <pc:spChg chg="mod">
-          <ac:chgData name="Michael Olson2" userId="7fb21594-b682-4edc-9482-c69c6202f15f" providerId="ADAL" clId="{BA5D99CB-F5AF-4C7D-AD32-A9CF23A66002}" dt="2022-09-22T17:57:10.007" v="29"/>
-          <ac:spMkLst>
-            <pc:docMk/>
-            <pc:sldMk cId="0" sldId="322"/>
-            <ac:spMk id="2" creationId="{758BE4F7-4DAE-391A-C345-58DAFDDEB444}"/>
-          </ac:spMkLst>
-        </pc:spChg>
-      </pc:sldChg>
-      <pc:sldChg chg="modSp">
-        <pc:chgData name="Michael Olson2" userId="7fb21594-b682-4edc-9482-c69c6202f15f" providerId="ADAL" clId="{BA5D99CB-F5AF-4C7D-AD32-A9CF23A66002}" dt="2022-09-22T17:57:10.007" v="29"/>
-        <pc:sldMkLst>
-          <pc:docMk/>
-          <pc:sldMk cId="0" sldId="323"/>
-        </pc:sldMkLst>
-        <pc:spChg chg="mod">
-          <ac:chgData name="Michael Olson2" userId="7fb21594-b682-4edc-9482-c69c6202f15f" providerId="ADAL" clId="{BA5D99CB-F5AF-4C7D-AD32-A9CF23A66002}" dt="2022-09-22T17:57:10.007" v="29"/>
-          <ac:spMkLst>
-            <pc:docMk/>
-            <pc:sldMk cId="0" sldId="323"/>
-            <ac:spMk id="71682" creationId="{F7A2B9E7-4F2B-DCD8-9617-9E94E106D444}"/>
-          </ac:spMkLst>
-        </pc:spChg>
-        <pc:spChg chg="mod">
-          <ac:chgData name="Michael Olson2" userId="7fb21594-b682-4edc-9482-c69c6202f15f" providerId="ADAL" clId="{BA5D99CB-F5AF-4C7D-AD32-A9CF23A66002}" dt="2022-09-22T17:57:10.007" v="29"/>
-          <ac:spMkLst>
-            <pc:docMk/>
-            <pc:sldMk cId="0" sldId="323"/>
-            <ac:spMk id="71683" creationId="{A5D3D534-3AEE-F027-4044-B0E944DE9F9E}"/>
-          </ac:spMkLst>
-        </pc:spChg>
-      </pc:sldChg>
-      <pc:sldChg chg="modSp">
-        <pc:chgData name="Michael Olson2" userId="7fb21594-b682-4edc-9482-c69c6202f15f" providerId="ADAL" clId="{BA5D99CB-F5AF-4C7D-AD32-A9CF23A66002}" dt="2022-09-22T17:57:10.007" v="29"/>
-        <pc:sldMkLst>
-          <pc:docMk/>
-          <pc:sldMk cId="0" sldId="324"/>
-        </pc:sldMkLst>
-        <pc:spChg chg="mod">
-          <ac:chgData name="Michael Olson2" userId="7fb21594-b682-4edc-9482-c69c6202f15f" providerId="ADAL" clId="{BA5D99CB-F5AF-4C7D-AD32-A9CF23A66002}" dt="2022-09-22T17:57:10.007" v="29"/>
-          <ac:spMkLst>
-            <pc:docMk/>
-            <pc:sldMk cId="0" sldId="324"/>
-            <ac:spMk id="72706" creationId="{44B1CAEF-A5B9-695C-0346-7999B2DE887E}"/>
-          </ac:spMkLst>
-        </pc:spChg>
-        <pc:spChg chg="mod">
-          <ac:chgData name="Michael Olson2" userId="7fb21594-b682-4edc-9482-c69c6202f15f" providerId="ADAL" clId="{BA5D99CB-F5AF-4C7D-AD32-A9CF23A66002}" dt="2022-09-22T17:57:10.007" v="29"/>
-          <ac:spMkLst>
-            <pc:docMk/>
-            <pc:sldMk cId="0" sldId="324"/>
-            <ac:spMk id="72707" creationId="{14D332AF-FB29-114F-620F-8408C5324759}"/>
-          </ac:spMkLst>
-        </pc:spChg>
-      </pc:sldChg>
-      <pc:sldChg chg="modSp">
-        <pc:chgData name="Michael Olson2" userId="7fb21594-b682-4edc-9482-c69c6202f15f" providerId="ADAL" clId="{BA5D99CB-F5AF-4C7D-AD32-A9CF23A66002}" dt="2022-09-22T17:57:10.007" v="29"/>
-        <pc:sldMkLst>
-          <pc:docMk/>
-          <pc:sldMk cId="0" sldId="325"/>
-        </pc:sldMkLst>
-        <pc:spChg chg="mod">
-          <ac:chgData name="Michael Olson2" userId="7fb21594-b682-4edc-9482-c69c6202f15f" providerId="ADAL" clId="{BA5D99CB-F5AF-4C7D-AD32-A9CF23A66002}" dt="2022-09-22T17:57:10.007" v="29"/>
-          <ac:spMkLst>
-            <pc:docMk/>
-            <pc:sldMk cId="0" sldId="325"/>
-            <ac:spMk id="73730" creationId="{89306CAA-D2FB-A41C-9F90-6EF0D790AEE9}"/>
-          </ac:spMkLst>
-        </pc:spChg>
-        <pc:spChg chg="mod">
-          <ac:chgData name="Michael Olson2" userId="7fb21594-b682-4edc-9482-c69c6202f15f" providerId="ADAL" clId="{BA5D99CB-F5AF-4C7D-AD32-A9CF23A66002}" dt="2022-09-22T17:57:10.007" v="29"/>
-          <ac:spMkLst>
-            <pc:docMk/>
-            <pc:sldMk cId="0" sldId="325"/>
-            <ac:spMk id="73731" creationId="{80307587-DC65-0DF8-B209-0EBBA23D8596}"/>
-          </ac:spMkLst>
-        </pc:spChg>
-      </pc:sldChg>
-      <pc:sldChg chg="modSp">
-        <pc:chgData name="Michael Olson2" userId="7fb21594-b682-4edc-9482-c69c6202f15f" providerId="ADAL" clId="{BA5D99CB-F5AF-4C7D-AD32-A9CF23A66002}" dt="2022-09-22T17:57:10.007" v="29"/>
-        <pc:sldMkLst>
-          <pc:docMk/>
-          <pc:sldMk cId="0" sldId="326"/>
-        </pc:sldMkLst>
-        <pc:spChg chg="mod">
-          <ac:chgData name="Michael Olson2" userId="7fb21594-b682-4edc-9482-c69c6202f15f" providerId="ADAL" clId="{BA5D99CB-F5AF-4C7D-AD32-A9CF23A66002}" dt="2022-09-22T17:57:10.007" v="29"/>
-          <ac:spMkLst>
-            <pc:docMk/>
-            <pc:sldMk cId="0" sldId="326"/>
-            <ac:spMk id="74754" creationId="{DA95C73F-2B92-0437-9F85-20466C152DE9}"/>
-          </ac:spMkLst>
-        </pc:spChg>
-      </pc:sldChg>
-      <pc:sldChg chg="modSp mod">
-        <pc:chgData name="Michael Olson2" userId="7fb21594-b682-4edc-9482-c69c6202f15f" providerId="ADAL" clId="{BA5D99CB-F5AF-4C7D-AD32-A9CF23A66002}" dt="2022-09-22T17:57:10.007" v="29"/>
-        <pc:sldMkLst>
-          <pc:docMk/>
-          <pc:sldMk cId="0" sldId="327"/>
-        </pc:sldMkLst>
-        <pc:spChg chg="mod">
-          <ac:chgData name="Michael Olson2" userId="7fb21594-b682-4edc-9482-c69c6202f15f" providerId="ADAL" clId="{BA5D99CB-F5AF-4C7D-AD32-A9CF23A66002}" dt="2022-09-22T17:57:10.007" v="29"/>
-          <ac:spMkLst>
-            <pc:docMk/>
-            <pc:sldMk cId="0" sldId="327"/>
-            <ac:spMk id="2" creationId="{88359F8A-16C0-DA90-3222-7668C4AA85E6}"/>
-          </ac:spMkLst>
-        </pc:spChg>
-        <pc:spChg chg="mod">
-          <ac:chgData name="Michael Olson2" userId="7fb21594-b682-4edc-9482-c69c6202f15f" providerId="ADAL" clId="{BA5D99CB-F5AF-4C7D-AD32-A9CF23A66002}" dt="2022-09-22T17:57:10.007" v="29"/>
-          <ac:spMkLst>
-            <pc:docMk/>
-            <pc:sldMk cId="0" sldId="327"/>
-            <ac:spMk id="3" creationId="{6ED4C9E4-3385-24DB-5D51-D7677BFB6469}"/>
-          </ac:spMkLst>
-        </pc:spChg>
-      </pc:sldChg>
-      <pc:sldChg chg="modSp mod">
-        <pc:chgData name="Michael Olson2" userId="7fb21594-b682-4edc-9482-c69c6202f15f" providerId="ADAL" clId="{BA5D99CB-F5AF-4C7D-AD32-A9CF23A66002}" dt="2022-09-22T17:57:10.007" v="29"/>
-        <pc:sldMkLst>
-          <pc:docMk/>
-          <pc:sldMk cId="0" sldId="328"/>
-        </pc:sldMkLst>
-        <pc:spChg chg="mod">
-          <ac:chgData name="Michael Olson2" userId="7fb21594-b682-4edc-9482-c69c6202f15f" providerId="ADAL" clId="{BA5D99CB-F5AF-4C7D-AD32-A9CF23A66002}" dt="2022-09-22T17:57:10.007" v="29"/>
-          <ac:spMkLst>
-            <pc:docMk/>
-            <pc:sldMk cId="0" sldId="328"/>
-            <ac:spMk id="2" creationId="{49A9C4C5-7DC7-1FA3-2BFA-1FE3192A0F8F}"/>
-          </ac:spMkLst>
-        </pc:spChg>
-        <pc:spChg chg="mod">
-          <ac:chgData name="Michael Olson2" userId="7fb21594-b682-4edc-9482-c69c6202f15f" providerId="ADAL" clId="{BA5D99CB-F5AF-4C7D-AD32-A9CF23A66002}" dt="2022-09-22T17:57:10.007" v="29"/>
-          <ac:spMkLst>
-            <pc:docMk/>
-            <pc:sldMk cId="0" sldId="328"/>
-            <ac:spMk id="3" creationId="{FCD84FB3-465F-0D62-5D91-061BB3F8A651}"/>
-          </ac:spMkLst>
-        </pc:spChg>
-      </pc:sldChg>
-      <pc:sldChg chg="modSp">
-        <pc:chgData name="Michael Olson2" userId="7fb21594-b682-4edc-9482-c69c6202f15f" providerId="ADAL" clId="{BA5D99CB-F5AF-4C7D-AD32-A9CF23A66002}" dt="2022-09-22T17:57:10.007" v="29"/>
-        <pc:sldMkLst>
-          <pc:docMk/>
-          <pc:sldMk cId="0" sldId="329"/>
-        </pc:sldMkLst>
-        <pc:spChg chg="mod">
-          <ac:chgData name="Michael Olson2" userId="7fb21594-b682-4edc-9482-c69c6202f15f" providerId="ADAL" clId="{BA5D99CB-F5AF-4C7D-AD32-A9CF23A66002}" dt="2022-09-22T17:57:10.007" v="29"/>
-          <ac:spMkLst>
-            <pc:docMk/>
-            <pc:sldMk cId="0" sldId="329"/>
-            <ac:spMk id="77826" creationId="{4FD341EB-867C-D072-AFBC-761AF33882CB}"/>
-          </ac:spMkLst>
-        </pc:spChg>
-        <pc:spChg chg="mod">
-          <ac:chgData name="Michael Olson2" userId="7fb21594-b682-4edc-9482-c69c6202f15f" providerId="ADAL" clId="{BA5D99CB-F5AF-4C7D-AD32-A9CF23A66002}" dt="2022-09-22T17:57:10.007" v="29"/>
-          <ac:spMkLst>
-            <pc:docMk/>
-            <pc:sldMk cId="0" sldId="329"/>
-            <ac:spMk id="77827" creationId="{E5678808-8872-D744-F456-25698136A5F3}"/>
-          </ac:spMkLst>
-        </pc:spChg>
-      </pc:sldChg>
-      <pc:sldChg chg="modSp mod">
-        <pc:chgData name="Michael Olson2" userId="7fb21594-b682-4edc-9482-c69c6202f15f" providerId="ADAL" clId="{BA5D99CB-F5AF-4C7D-AD32-A9CF23A66002}" dt="2022-09-22T17:57:10.007" v="29"/>
-        <pc:sldMkLst>
-          <pc:docMk/>
-          <pc:sldMk cId="0" sldId="330"/>
-        </pc:sldMkLst>
-        <pc:spChg chg="mod">
-          <ac:chgData name="Michael Olson2" userId="7fb21594-b682-4edc-9482-c69c6202f15f" providerId="ADAL" clId="{BA5D99CB-F5AF-4C7D-AD32-A9CF23A66002}" dt="2022-09-22T17:57:10.007" v="29"/>
-          <ac:spMkLst>
-            <pc:docMk/>
-            <pc:sldMk cId="0" sldId="330"/>
-            <ac:spMk id="2" creationId="{03C2CAD3-70D3-87D7-8A1B-810004D536DB}"/>
-          </ac:spMkLst>
-        </pc:spChg>
-      </pc:sldChg>
-      <pc:sldChg chg="modSp mod">
-        <pc:chgData name="Michael Olson2" userId="7fb21594-b682-4edc-9482-c69c6202f15f" providerId="ADAL" clId="{BA5D99CB-F5AF-4C7D-AD32-A9CF23A66002}" dt="2022-09-22T17:57:10.007" v="29"/>
-        <pc:sldMkLst>
-          <pc:docMk/>
-          <pc:sldMk cId="0" sldId="331"/>
-        </pc:sldMkLst>
-        <pc:spChg chg="mod">
-          <ac:chgData name="Michael Olson2" userId="7fb21594-b682-4edc-9482-c69c6202f15f" providerId="ADAL" clId="{BA5D99CB-F5AF-4C7D-AD32-A9CF23A66002}" dt="2022-09-22T17:57:10.007" v="29"/>
-          <ac:spMkLst>
-            <pc:docMk/>
-            <pc:sldMk cId="0" sldId="331"/>
-            <ac:spMk id="2" creationId="{10C29D34-47EE-0E56-2739-57DD12FC8511}"/>
-          </ac:spMkLst>
-        </pc:spChg>
-      </pc:sldChg>
-      <pc:sldChg chg="modSp">
-        <pc:chgData name="Michael Olson2" userId="7fb21594-b682-4edc-9482-c69c6202f15f" providerId="ADAL" clId="{BA5D99CB-F5AF-4C7D-AD32-A9CF23A66002}" dt="2022-09-22T17:57:10.007" v="29"/>
-        <pc:sldMkLst>
-          <pc:docMk/>
-          <pc:sldMk cId="0" sldId="332"/>
-        </pc:sldMkLst>
-        <pc:spChg chg="mod">
-          <ac:chgData name="Michael Olson2" userId="7fb21594-b682-4edc-9482-c69c6202f15f" providerId="ADAL" clId="{BA5D99CB-F5AF-4C7D-AD32-A9CF23A66002}" dt="2022-09-22T17:57:10.007" v="29"/>
-          <ac:spMkLst>
-            <pc:docMk/>
-            <pc:sldMk cId="0" sldId="332"/>
-            <ac:spMk id="81922" creationId="{41B0E83C-4323-31FC-A9ED-C762911E814A}"/>
-          </ac:spMkLst>
-        </pc:spChg>
-        <pc:spChg chg="mod">
-          <ac:chgData name="Michael Olson2" userId="7fb21594-b682-4edc-9482-c69c6202f15f" providerId="ADAL" clId="{BA5D99CB-F5AF-4C7D-AD32-A9CF23A66002}" dt="2022-09-22T17:57:10.007" v="29"/>
-          <ac:spMkLst>
-            <pc:docMk/>
-            <pc:sldMk cId="0" sldId="332"/>
-            <ac:spMk id="81923" creationId="{53319258-DFF6-B1A1-01CA-89AF7FFBC167}"/>
-          </ac:spMkLst>
-        </pc:spChg>
-      </pc:sldChg>
-      <pc:sldChg chg="modSp">
-        <pc:chgData name="Michael Olson2" userId="7fb21594-b682-4edc-9482-c69c6202f15f" providerId="ADAL" clId="{BA5D99CB-F5AF-4C7D-AD32-A9CF23A66002}" dt="2022-09-22T17:57:10.007" v="29"/>
-        <pc:sldMkLst>
-          <pc:docMk/>
-          <pc:sldMk cId="0" sldId="333"/>
-        </pc:sldMkLst>
-        <pc:spChg chg="mod">
-          <ac:chgData name="Michael Olson2" userId="7fb21594-b682-4edc-9482-c69c6202f15f" providerId="ADAL" clId="{BA5D99CB-F5AF-4C7D-AD32-A9CF23A66002}" dt="2022-09-22T17:57:10.007" v="29"/>
-          <ac:spMkLst>
-            <pc:docMk/>
-            <pc:sldMk cId="0" sldId="333"/>
-            <ac:spMk id="82946" creationId="{FAB7038E-3C57-A71E-40FF-E6D9F92332D1}"/>
-          </ac:spMkLst>
-        </pc:spChg>
-        <pc:spChg chg="mod">
-          <ac:chgData name="Michael Olson2" userId="7fb21594-b682-4edc-9482-c69c6202f15f" providerId="ADAL" clId="{BA5D99CB-F5AF-4C7D-AD32-A9CF23A66002}" dt="2022-09-22T17:57:10.007" v="29"/>
-          <ac:spMkLst>
-            <pc:docMk/>
-            <pc:sldMk cId="0" sldId="333"/>
-            <ac:spMk id="82947" creationId="{9EB0ADA6-9754-8FA8-6A43-06468513BA69}"/>
-          </ac:spMkLst>
-        </pc:spChg>
-      </pc:sldChg>
-      <pc:sldChg chg="modSp">
-        <pc:chgData name="Michael Olson2" userId="7fb21594-b682-4edc-9482-c69c6202f15f" providerId="ADAL" clId="{BA5D99CB-F5AF-4C7D-AD32-A9CF23A66002}" dt="2022-09-22T17:57:10.007" v="29"/>
-        <pc:sldMkLst>
-          <pc:docMk/>
-          <pc:sldMk cId="0" sldId="334"/>
-        </pc:sldMkLst>
-        <pc:spChg chg="mod">
-          <ac:chgData name="Michael Olson2" userId="7fb21594-b682-4edc-9482-c69c6202f15f" providerId="ADAL" clId="{BA5D99CB-F5AF-4C7D-AD32-A9CF23A66002}" dt="2022-09-22T17:57:10.007" v="29"/>
-          <ac:spMkLst>
-            <pc:docMk/>
-            <pc:sldMk cId="0" sldId="334"/>
-            <ac:spMk id="88066" creationId="{4337D163-3007-7CB9-D674-BF4D6C587427}"/>
-          </ac:spMkLst>
-        </pc:spChg>
-        <pc:spChg chg="mod">
-          <ac:chgData name="Michael Olson2" userId="7fb21594-b682-4edc-9482-c69c6202f15f" providerId="ADAL" clId="{BA5D99CB-F5AF-4C7D-AD32-A9CF23A66002}" dt="2022-09-22T17:57:10.007" v="29"/>
-          <ac:spMkLst>
-            <pc:docMk/>
-            <pc:sldMk cId="0" sldId="334"/>
-            <ac:spMk id="88067" creationId="{DEBCBF7C-9915-121F-44E9-28DD11C16DF8}"/>
-          </ac:spMkLst>
-        </pc:spChg>
-      </pc:sldChg>
-      <pc:sldChg chg="modSp mod">
-        <pc:chgData name="Michael Olson2" userId="7fb21594-b682-4edc-9482-c69c6202f15f" providerId="ADAL" clId="{BA5D99CB-F5AF-4C7D-AD32-A9CF23A66002}" dt="2022-09-22T17:57:10.007" v="29"/>
-        <pc:sldMkLst>
-          <pc:docMk/>
-          <pc:sldMk cId="0" sldId="335"/>
-        </pc:sldMkLst>
-        <pc:spChg chg="mod">
-          <ac:chgData name="Michael Olson2" userId="7fb21594-b682-4edc-9482-c69c6202f15f" providerId="ADAL" clId="{BA5D99CB-F5AF-4C7D-AD32-A9CF23A66002}" dt="2022-09-22T17:57:10.007" v="29"/>
-          <ac:spMkLst>
-            <pc:docMk/>
-            <pc:sldMk cId="0" sldId="335"/>
-            <ac:spMk id="2" creationId="{6D1F3485-9BFF-770A-8157-BF2FA0143133}"/>
-          </ac:spMkLst>
-        </pc:spChg>
-      </pc:sldChg>
-      <pc:sldChg chg="modSp">
-        <pc:chgData name="Michael Olson2" userId="7fb21594-b682-4edc-9482-c69c6202f15f" providerId="ADAL" clId="{BA5D99CB-F5AF-4C7D-AD32-A9CF23A66002}" dt="2022-09-22T17:57:10.007" v="29"/>
-        <pc:sldMkLst>
-          <pc:docMk/>
-          <pc:sldMk cId="0" sldId="336"/>
-        </pc:sldMkLst>
-        <pc:spChg chg="mod">
-          <ac:chgData name="Michael Olson2" userId="7fb21594-b682-4edc-9482-c69c6202f15f" providerId="ADAL" clId="{BA5D99CB-F5AF-4C7D-AD32-A9CF23A66002}" dt="2022-09-22T17:57:10.007" v="29"/>
-          <ac:spMkLst>
-            <pc:docMk/>
-            <pc:sldMk cId="0" sldId="336"/>
-            <ac:spMk id="90114" creationId="{7639269B-A78C-1232-6316-BB7362964A8F}"/>
-          </ac:spMkLst>
-        </pc:spChg>
-        <pc:spChg chg="mod">
-          <ac:chgData name="Michael Olson2" userId="7fb21594-b682-4edc-9482-c69c6202f15f" providerId="ADAL" clId="{BA5D99CB-F5AF-4C7D-AD32-A9CF23A66002}" dt="2022-09-22T17:57:10.007" v="29"/>
-          <ac:spMkLst>
-            <pc:docMk/>
-            <pc:sldMk cId="0" sldId="336"/>
-            <ac:spMk id="90115" creationId="{D517F4A0-289F-F9EC-66A8-35E679F09EE7}"/>
-          </ac:spMkLst>
-        </pc:spChg>
-      </pc:sldChg>
-      <pc:sldChg chg="modSp">
-        <pc:chgData name="Michael Olson2" userId="7fb21594-b682-4edc-9482-c69c6202f15f" providerId="ADAL" clId="{BA5D99CB-F5AF-4C7D-AD32-A9CF23A66002}" dt="2022-09-22T17:57:10.007" v="29"/>
-        <pc:sldMkLst>
-          <pc:docMk/>
-          <pc:sldMk cId="0" sldId="337"/>
-        </pc:sldMkLst>
-        <pc:spChg chg="mod">
-          <ac:chgData name="Michael Olson2" userId="7fb21594-b682-4edc-9482-c69c6202f15f" providerId="ADAL" clId="{BA5D99CB-F5AF-4C7D-AD32-A9CF23A66002}" dt="2022-09-22T17:57:10.007" v="29"/>
-          <ac:spMkLst>
-            <pc:docMk/>
-            <pc:sldMk cId="0" sldId="337"/>
-            <ac:spMk id="91138" creationId="{480A303C-F1FE-4BAF-079D-CDB53AC8BF9B}"/>
-          </ac:spMkLst>
-        </pc:spChg>
-      </pc:sldChg>
-      <pc:sldChg chg="modSp mod">
-        <pc:chgData name="Michael Olson2" userId="7fb21594-b682-4edc-9482-c69c6202f15f" providerId="ADAL" clId="{BA5D99CB-F5AF-4C7D-AD32-A9CF23A66002}" dt="2022-09-22T17:57:10.007" v="29"/>
-        <pc:sldMkLst>
-          <pc:docMk/>
-          <pc:sldMk cId="0" sldId="338"/>
-        </pc:sldMkLst>
-        <pc:spChg chg="mod">
-          <ac:chgData name="Michael Olson2" userId="7fb21594-b682-4edc-9482-c69c6202f15f" providerId="ADAL" clId="{BA5D99CB-F5AF-4C7D-AD32-A9CF23A66002}" dt="2022-09-22T17:57:10.007" v="29"/>
-          <ac:spMkLst>
-            <pc:docMk/>
-            <pc:sldMk cId="0" sldId="338"/>
-            <ac:spMk id="2" creationId="{7C2FE6A7-FA3E-B3A4-B069-033372D2A3A2}"/>
-          </ac:spMkLst>
-        </pc:spChg>
-      </pc:sldChg>
-      <pc:sldChg chg="modSp">
-        <pc:chgData name="Michael Olson2" userId="7fb21594-b682-4edc-9482-c69c6202f15f" providerId="ADAL" clId="{BA5D99CB-F5AF-4C7D-AD32-A9CF23A66002}" dt="2022-09-22T17:57:10.007" v="29"/>
-        <pc:sldMkLst>
-          <pc:docMk/>
-          <pc:sldMk cId="0" sldId="339"/>
-        </pc:sldMkLst>
-        <pc:spChg chg="mod">
-          <ac:chgData name="Michael Olson2" userId="7fb21594-b682-4edc-9482-c69c6202f15f" providerId="ADAL" clId="{BA5D99CB-F5AF-4C7D-AD32-A9CF23A66002}" dt="2022-09-22T17:57:10.007" v="29"/>
-          <ac:spMkLst>
-            <pc:docMk/>
-            <pc:sldMk cId="0" sldId="339"/>
-            <ac:spMk id="45058" creationId="{BE8B0C7F-54AE-511B-140F-2350D2820CCE}"/>
-          </ac:spMkLst>
-        </pc:spChg>
-        <pc:spChg chg="mod">
-          <ac:chgData name="Michael Olson2" userId="7fb21594-b682-4edc-9482-c69c6202f15f" providerId="ADAL" clId="{BA5D99CB-F5AF-4C7D-AD32-A9CF23A66002}" dt="2022-09-22T17:57:10.007" v="29"/>
-          <ac:spMkLst>
-            <pc:docMk/>
-            <pc:sldMk cId="0" sldId="339"/>
-            <ac:spMk id="45059" creationId="{4D9025D7-31BA-DADD-889B-C7E5F3817E3C}"/>
-          </ac:spMkLst>
-        </pc:spChg>
-      </pc:sldChg>
-      <pc:sldChg chg="modSp">
-        <pc:chgData name="Michael Olson2" userId="7fb21594-b682-4edc-9482-c69c6202f15f" providerId="ADAL" clId="{BA5D99CB-F5AF-4C7D-AD32-A9CF23A66002}" dt="2022-09-22T17:57:10.007" v="29"/>
-        <pc:sldMkLst>
-          <pc:docMk/>
-          <pc:sldMk cId="0" sldId="340"/>
-        </pc:sldMkLst>
-        <pc:spChg chg="mod">
-          <ac:chgData name="Michael Olson2" userId="7fb21594-b682-4edc-9482-c69c6202f15f" providerId="ADAL" clId="{BA5D99CB-F5AF-4C7D-AD32-A9CF23A66002}" dt="2022-09-22T17:57:10.007" v="29"/>
-          <ac:spMkLst>
-            <pc:docMk/>
-            <pc:sldMk cId="0" sldId="340"/>
-            <ac:spMk id="41986" creationId="{ADF6FF0B-0D50-5675-7354-CA3E2DAB5702}"/>
-          </ac:spMkLst>
-        </pc:spChg>
-        <pc:spChg chg="mod">
-          <ac:chgData name="Michael Olson2" userId="7fb21594-b682-4edc-9482-c69c6202f15f" providerId="ADAL" clId="{BA5D99CB-F5AF-4C7D-AD32-A9CF23A66002}" dt="2022-09-22T17:57:10.007" v="29"/>
-          <ac:spMkLst>
-            <pc:docMk/>
-            <pc:sldMk cId="0" sldId="340"/>
-            <ac:spMk id="41987" creationId="{66B5B5D0-E4F8-3CD5-0C34-3BD52BE1B68A}"/>
-          </ac:spMkLst>
-        </pc:spChg>
-      </pc:sldChg>
-      <pc:sldChg chg="modSp">
-        <pc:chgData name="Michael Olson2" userId="7fb21594-b682-4edc-9482-c69c6202f15f" providerId="ADAL" clId="{BA5D99CB-F5AF-4C7D-AD32-A9CF23A66002}" dt="2022-09-22T17:57:10.007" v="29"/>
-        <pc:sldMkLst>
-          <pc:docMk/>
-          <pc:sldMk cId="0" sldId="341"/>
-        </pc:sldMkLst>
-        <pc:spChg chg="mod">
-          <ac:chgData name="Michael Olson2" userId="7fb21594-b682-4edc-9482-c69c6202f15f" providerId="ADAL" clId="{BA5D99CB-F5AF-4C7D-AD32-A9CF23A66002}" dt="2022-09-22T17:57:10.007" v="29"/>
-          <ac:spMkLst>
-            <pc:docMk/>
-            <pc:sldMk cId="0" sldId="341"/>
-            <ac:spMk id="43010" creationId="{60CBF2E5-EA28-96DA-EB95-2E9FBBE880E6}"/>
-          </ac:spMkLst>
-        </pc:spChg>
-        <pc:spChg chg="mod">
-          <ac:chgData name="Michael Olson2" userId="7fb21594-b682-4edc-9482-c69c6202f15f" providerId="ADAL" clId="{BA5D99CB-F5AF-4C7D-AD32-A9CF23A66002}" dt="2022-09-22T17:57:10.007" v="29"/>
-          <ac:spMkLst>
-            <pc:docMk/>
-            <pc:sldMk cId="0" sldId="341"/>
-            <ac:spMk id="43011" creationId="{5F234EEB-3BE6-4BD4-DC9C-E5F349B494C6}"/>
-          </ac:spMkLst>
-        </pc:spChg>
-      </pc:sldChg>
-      <pc:sldChg chg="modSp">
-        <pc:chgData name="Michael Olson2" userId="7fb21594-b682-4edc-9482-c69c6202f15f" providerId="ADAL" clId="{BA5D99CB-F5AF-4C7D-AD32-A9CF23A66002}" dt="2022-09-22T17:57:10.007" v="29"/>
-        <pc:sldMkLst>
-          <pc:docMk/>
-          <pc:sldMk cId="0" sldId="342"/>
-        </pc:sldMkLst>
-        <pc:spChg chg="mod">
-          <ac:chgData name="Michael Olson2" userId="7fb21594-b682-4edc-9482-c69c6202f15f" providerId="ADAL" clId="{BA5D99CB-F5AF-4C7D-AD32-A9CF23A66002}" dt="2022-09-22T17:57:10.007" v="29"/>
-          <ac:spMkLst>
-            <pc:docMk/>
-            <pc:sldMk cId="0" sldId="342"/>
-            <ac:spMk id="44034" creationId="{618FA64F-89F4-2E36-ADB0-0A8E790C7CCB}"/>
-          </ac:spMkLst>
-        </pc:spChg>
-        <pc:spChg chg="mod">
-          <ac:chgData name="Michael Olson2" userId="7fb21594-b682-4edc-9482-c69c6202f15f" providerId="ADAL" clId="{BA5D99CB-F5AF-4C7D-AD32-A9CF23A66002}" dt="2022-09-22T17:57:10.007" v="29"/>
-          <ac:spMkLst>
-            <pc:docMk/>
-            <pc:sldMk cId="0" sldId="342"/>
-            <ac:spMk id="44035" creationId="{1D8CB182-3D43-67F6-2DCE-410730ED0642}"/>
-          </ac:spMkLst>
-        </pc:spChg>
-      </pc:sldChg>
-      <pc:sldChg chg="modSp">
-        <pc:chgData name="Michael Olson2" userId="7fb21594-b682-4edc-9482-c69c6202f15f" providerId="ADAL" clId="{BA5D99CB-F5AF-4C7D-AD32-A9CF23A66002}" dt="2022-09-22T17:57:10.007" v="29"/>
-        <pc:sldMkLst>
-          <pc:docMk/>
-          <pc:sldMk cId="0" sldId="343"/>
-        </pc:sldMkLst>
-        <pc:spChg chg="mod">
-          <ac:chgData name="Michael Olson2" userId="7fb21594-b682-4edc-9482-c69c6202f15f" providerId="ADAL" clId="{BA5D99CB-F5AF-4C7D-AD32-A9CF23A66002}" dt="2022-09-22T17:57:10.007" v="29"/>
-          <ac:spMkLst>
-            <pc:docMk/>
-            <pc:sldMk cId="0" sldId="343"/>
-            <ac:spMk id="87042" creationId="{E57612C1-7559-B9EA-4D43-861E2BEB4581}"/>
-          </ac:spMkLst>
-        </pc:spChg>
-        <pc:spChg chg="mod">
-          <ac:chgData name="Michael Olson2" userId="7fb21594-b682-4edc-9482-c69c6202f15f" providerId="ADAL" clId="{BA5D99CB-F5AF-4C7D-AD32-A9CF23A66002}" dt="2022-09-22T17:57:10.007" v="29"/>
-          <ac:spMkLst>
-            <pc:docMk/>
-            <pc:sldMk cId="0" sldId="343"/>
-            <ac:spMk id="87043" creationId="{DCE9804C-B2D9-540E-6AC4-FAC5AA3684BC}"/>
-          </ac:spMkLst>
-        </pc:spChg>
-      </pc:sldChg>
-      <pc:sldChg chg="modSp">
-        <pc:chgData name="Michael Olson2" userId="7fb21594-b682-4edc-9482-c69c6202f15f" providerId="ADAL" clId="{BA5D99CB-F5AF-4C7D-AD32-A9CF23A66002}" dt="2022-09-22T17:57:10.007" v="29"/>
-        <pc:sldMkLst>
-          <pc:docMk/>
-          <pc:sldMk cId="0" sldId="344"/>
-        </pc:sldMkLst>
-        <pc:spChg chg="mod">
-          <ac:chgData name="Michael Olson2" userId="7fb21594-b682-4edc-9482-c69c6202f15f" providerId="ADAL" clId="{BA5D99CB-F5AF-4C7D-AD32-A9CF23A66002}" dt="2022-09-22T17:57:10.007" v="29"/>
-          <ac:spMkLst>
-            <pc:docMk/>
-            <pc:sldMk cId="0" sldId="344"/>
-            <ac:spMk id="83970" creationId="{AA4BA5CE-2F9A-F436-3E99-E7B831E28FEB}"/>
-          </ac:spMkLst>
-        </pc:spChg>
-        <pc:spChg chg="mod">
-          <ac:chgData name="Michael Olson2" userId="7fb21594-b682-4edc-9482-c69c6202f15f" providerId="ADAL" clId="{BA5D99CB-F5AF-4C7D-AD32-A9CF23A66002}" dt="2022-09-22T17:57:10.007" v="29"/>
-          <ac:spMkLst>
-            <pc:docMk/>
-            <pc:sldMk cId="0" sldId="344"/>
-            <ac:spMk id="83971" creationId="{5EA01892-3BEC-3FEF-3D96-0991524D306C}"/>
-          </ac:spMkLst>
-        </pc:spChg>
-      </pc:sldChg>
-      <pc:sldChg chg="modSp">
-        <pc:chgData name="Michael Olson2" userId="7fb21594-b682-4edc-9482-c69c6202f15f" providerId="ADAL" clId="{BA5D99CB-F5AF-4C7D-AD32-A9CF23A66002}" dt="2022-09-22T17:57:10.007" v="29"/>
-        <pc:sldMkLst>
-          <pc:docMk/>
-          <pc:sldMk cId="0" sldId="345"/>
-        </pc:sldMkLst>
-        <pc:spChg chg="mod">
-          <ac:chgData name="Michael Olson2" userId="7fb21594-b682-4edc-9482-c69c6202f15f" providerId="ADAL" clId="{BA5D99CB-F5AF-4C7D-AD32-A9CF23A66002}" dt="2022-09-22T17:57:10.007" v="29"/>
-          <ac:spMkLst>
-            <pc:docMk/>
-            <pc:sldMk cId="0" sldId="345"/>
-            <ac:spMk id="84994" creationId="{7C428C1F-BA15-7A0A-6E17-2BEE42638264}"/>
-          </ac:spMkLst>
-        </pc:spChg>
-        <pc:spChg chg="mod">
-          <ac:chgData name="Michael Olson2" userId="7fb21594-b682-4edc-9482-c69c6202f15f" providerId="ADAL" clId="{BA5D99CB-F5AF-4C7D-AD32-A9CF23A66002}" dt="2022-09-22T17:57:10.007" v="29"/>
-          <ac:spMkLst>
-            <pc:docMk/>
-            <pc:sldMk cId="0" sldId="345"/>
-            <ac:spMk id="84995" creationId="{7A6408C5-328E-239C-C283-1A1E6759C8F3}"/>
-          </ac:spMkLst>
-        </pc:spChg>
-      </pc:sldChg>
-      <pc:sldChg chg="modSp">
-        <pc:chgData name="Michael Olson2" userId="7fb21594-b682-4edc-9482-c69c6202f15f" providerId="ADAL" clId="{BA5D99CB-F5AF-4C7D-AD32-A9CF23A66002}" dt="2022-09-22T17:57:10.007" v="29"/>
-        <pc:sldMkLst>
-          <pc:docMk/>
-          <pc:sldMk cId="0" sldId="346"/>
-        </pc:sldMkLst>
-        <pc:spChg chg="mod">
-          <ac:chgData name="Michael Olson2" userId="7fb21594-b682-4edc-9482-c69c6202f15f" providerId="ADAL" clId="{BA5D99CB-F5AF-4C7D-AD32-A9CF23A66002}" dt="2022-09-22T17:57:10.007" v="29"/>
-          <ac:spMkLst>
-            <pc:docMk/>
-            <pc:sldMk cId="0" sldId="346"/>
-            <ac:spMk id="86018" creationId="{ECE85167-BD58-AFB0-BA74-9AC7396B7F3D}"/>
-          </ac:spMkLst>
-        </pc:spChg>
-        <pc:spChg chg="mod">
-          <ac:chgData name="Michael Olson2" userId="7fb21594-b682-4edc-9482-c69c6202f15f" providerId="ADAL" clId="{BA5D99CB-F5AF-4C7D-AD32-A9CF23A66002}" dt="2022-09-22T17:57:10.007" v="29"/>
-          <ac:spMkLst>
-            <pc:docMk/>
-            <pc:sldMk cId="0" sldId="346"/>
-            <ac:spMk id="86019" creationId="{719944A0-9E37-C9B6-3C33-8A0FE697ED0A}"/>
-          </ac:spMkLst>
-        </pc:spChg>
-      </pc:sldChg>
-      <pc:sldChg chg="modSp add mod">
-        <pc:chgData name="Michael Olson2" userId="7fb21594-b682-4edc-9482-c69c6202f15f" providerId="ADAL" clId="{BA5D99CB-F5AF-4C7D-AD32-A9CF23A66002}" dt="2022-09-22T17:57:36.841" v="51" actId="20577"/>
-        <pc:sldMkLst>
-          <pc:docMk/>
-          <pc:sldMk cId="0" sldId="347"/>
-        </pc:sldMkLst>
-        <pc:spChg chg="mod">
-          <ac:chgData name="Michael Olson2" userId="7fb21594-b682-4edc-9482-c69c6202f15f" providerId="ADAL" clId="{BA5D99CB-F5AF-4C7D-AD32-A9CF23A66002}" dt="2022-09-22T17:57:36.841" v="51" actId="20577"/>
-          <ac:spMkLst>
-            <pc:docMk/>
-            <pc:sldMk cId="0" sldId="347"/>
-            <ac:spMk id="4" creationId="{035FDE51-1EAF-41A2-EF4F-4093CE7D5F9B}"/>
-          </ac:spMkLst>
-        </pc:spChg>
-      </pc:sldChg>
-      <pc:sldMasterChg chg="addSp">
-        <pc:chgData name="Michael Olson2" userId="7fb21594-b682-4edc-9482-c69c6202f15f" providerId="ADAL" clId="{BA5D99CB-F5AF-4C7D-AD32-A9CF23A66002}" dt="2022-09-22T17:57:08.641" v="0"/>
-        <pc:sldMasterMkLst>
-          <pc:docMk/>
-          <pc:sldMasterMk cId="1137456211" sldId="2147483852"/>
-        </pc:sldMasterMkLst>
-        <pc:spChg chg="add">
-          <ac:chgData name="Michael Olson2" userId="7fb21594-b682-4edc-9482-c69c6202f15f" providerId="ADAL" clId="{BA5D99CB-F5AF-4C7D-AD32-A9CF23A66002}" dt="2022-09-22T17:57:08.641" v="0"/>
-          <ac:spMkLst>
-            <pc:docMk/>
-            <pc:sldMasterMk cId="1137456211" sldId="2147483852"/>
-            <ac:spMk id="8" creationId="{13D115D8-7531-24E4-67D8-2D4EBD358144}"/>
-          </ac:spMkLst>
-        </pc:spChg>
-        <pc:picChg chg="add">
-          <ac:chgData name="Michael Olson2" userId="7fb21594-b682-4edc-9482-c69c6202f15f" providerId="ADAL" clId="{BA5D99CB-F5AF-4C7D-AD32-A9CF23A66002}" dt="2022-09-22T17:57:08.641" v="0"/>
-          <ac:picMkLst>
-            <pc:docMk/>
-            <pc:sldMasterMk cId="1137456211" sldId="2147483852"/>
-            <ac:picMk id="11" creationId="{96D5426F-1A95-1430-4389-99395ABE1EE7}"/>
-          </ac:picMkLst>
-        </pc:picChg>
-      </pc:sldMasterChg>
-      <pc:sldMasterChg chg="addSp">
-        <pc:chgData name="Michael Olson2" userId="7fb21594-b682-4edc-9482-c69c6202f15f" providerId="ADAL" clId="{BA5D99CB-F5AF-4C7D-AD32-A9CF23A66002}" dt="2022-09-22T17:57:10.007" v="29"/>
-        <pc:sldMasterMkLst>
-          <pc:docMk/>
-          <pc:sldMasterMk cId="1786936359" sldId="2147483864"/>
-        </pc:sldMasterMkLst>
-        <pc:spChg chg="add">
-          <ac:chgData name="Michael Olson2" userId="7fb21594-b682-4edc-9482-c69c6202f15f" providerId="ADAL" clId="{BA5D99CB-F5AF-4C7D-AD32-A9CF23A66002}" dt="2022-09-22T17:57:10.007" v="29"/>
-          <ac:spMkLst>
-            <pc:docMk/>
-            <pc:sldMasterMk cId="1786936359" sldId="2147483864"/>
-            <ac:spMk id="8" creationId="{5EB77E44-3DC2-8632-E77A-BF83CE44FBE2}"/>
-          </ac:spMkLst>
-        </pc:spChg>
-        <pc:picChg chg="add">
-          <ac:chgData name="Michael Olson2" userId="7fb21594-b682-4edc-9482-c69c6202f15f" providerId="ADAL" clId="{BA5D99CB-F5AF-4C7D-AD32-A9CF23A66002}" dt="2022-09-22T17:57:10.007" v="29"/>
-          <ac:picMkLst>
-            <pc:docMk/>
-            <pc:sldMasterMk cId="1786936359" sldId="2147483864"/>
-            <ac:picMk id="11" creationId="{69FA368E-8556-1994-9ADE-AB552975BDFB}"/>
-          </ac:picMkLst>
-        </pc:picChg>
-      </pc:sldMasterChg>
-    </pc:docChg>
-  </pc:docChgLst>
-</pc:chgInfo>
-</file>
-
 <file path=ppt/handoutMasters/handoutMaster1.xml><?xml version="1.0" encoding="utf-8"?>
 <p:handoutMaster xmlns:a="http://schemas.openxmlformats.org/drawingml/2006/main" xmlns:r="http://schemas.openxmlformats.org/officeDocument/2006/relationships" xmlns:p="http://schemas.openxmlformats.org/presentationml/2006/main">
   <p:cSld>
@@ -2163,7 +334,7 @@
               <a:pPr>
                 <a:defRPr/>
               </a:pPr>
-              <a:t>10/11/2022</a:t>
+              <a:t>10/12/2022</a:t>
             </a:fld>
             <a:endParaRPr lang="en-US"/>
           </a:p>
@@ -2351,7 +522,7 @@
           <a:p>
             <a:fld id="{8FE04174-3D17-4F43-B8FC-6F5CC5E217DD}" type="datetimeFigureOut">
               <a:rPr lang="en-US" smtClean="0"/>
-              <a:t>10/10/2022</a:t>
+              <a:t>10/12/2022</a:t>
             </a:fld>
             <a:endParaRPr lang="en-US"/>
           </a:p>
@@ -2895,7 +1066,7 @@
           <a:p>
             <a:fld id="{96DFF08F-DC6B-4601-B491-B0F83F6DD2DA}" type="datetimeFigureOut">
               <a:rPr lang="en-US" smtClean="0"/>
-              <a:t>10/10/2022</a:t>
+              <a:t>10/12/2022</a:t>
             </a:fld>
             <a:endParaRPr lang="en-US" dirty="0"/>
           </a:p>
@@ -3147,7 +1318,7 @@
           <a:p>
             <a:fld id="{96DFF08F-DC6B-4601-B491-B0F83F6DD2DA}" type="datetimeFigureOut">
               <a:rPr lang="en-US" smtClean="0"/>
-              <a:t>10/10/2022</a:t>
+              <a:t>10/12/2022</a:t>
             </a:fld>
             <a:endParaRPr lang="en-US" dirty="0"/>
           </a:p>
@@ -3411,7 +1582,7 @@
           <a:p>
             <a:fld id="{96DFF08F-DC6B-4601-B491-B0F83F6DD2DA}" type="datetimeFigureOut">
               <a:rPr lang="en-US" smtClean="0"/>
-              <a:t>10/10/2022</a:t>
+              <a:t>10/12/2022</a:t>
             </a:fld>
             <a:endParaRPr lang="en-US" dirty="0"/>
           </a:p>
@@ -3587,7 +1758,7 @@
           <a:p>
             <a:fld id="{A3E28D29-1ECB-41DF-951B-2A23F95AD026}" type="datetimeFigureOut">
               <a:rPr lang="en-US" smtClean="0"/>
-              <a:t>10/10/2022</a:t>
+              <a:t>10/12/2022</a:t>
             </a:fld>
             <a:endParaRPr lang="en-US" dirty="0"/>
           </a:p>
@@ -3892,7 +2063,7 @@
           <a:p>
             <a:fld id="{96DFF08F-DC6B-4601-B491-B0F83F6DD2DA}" type="datetimeFigureOut">
               <a:rPr lang="en-US" smtClean="0"/>
-              <a:t>10/10/2022</a:t>
+              <a:t>10/12/2022</a:t>
             </a:fld>
             <a:endParaRPr lang="en-US" dirty="0"/>
           </a:p>
@@ -4211,7 +2382,7 @@
           <a:p>
             <a:fld id="{96DFF08F-DC6B-4601-B491-B0F83F6DD2DA}" type="datetimeFigureOut">
               <a:rPr lang="en-US" smtClean="0"/>
-              <a:t>10/10/2022</a:t>
+              <a:t>10/12/2022</a:t>
             </a:fld>
             <a:endParaRPr lang="en-US" dirty="0"/>
           </a:p>
@@ -4596,7 +2767,7 @@
           <a:p>
             <a:fld id="{96DFF08F-DC6B-4601-B491-B0F83F6DD2DA}" type="datetimeFigureOut">
               <a:rPr lang="en-US" smtClean="0"/>
-              <a:t>10/10/2022</a:t>
+              <a:t>10/12/2022</a:t>
             </a:fld>
             <a:endParaRPr lang="en-US" dirty="0"/>
           </a:p>
@@ -4720,7 +2891,7 @@
           <a:p>
             <a:fld id="{96DFF08F-DC6B-4601-B491-B0F83F6DD2DA}" type="datetimeFigureOut">
               <a:rPr lang="en-US" smtClean="0"/>
-              <a:t>10/10/2022</a:t>
+              <a:t>10/12/2022</a:t>
             </a:fld>
             <a:endParaRPr lang="en-US" dirty="0"/>
           </a:p>
@@ -4900,7 +3071,7 @@
             <a:fld id="{96DFF08F-DC6B-4601-B491-B0F83F6DD2DA}" type="datetimeFigureOut">
               <a:rPr lang="en-US" smtClean="0"/>
               <a:pPr/>
-              <a:t>10/10/2022</a:t>
+              <a:t>10/12/2022</a:t>
             </a:fld>
             <a:endParaRPr lang="en-US" dirty="0"/>
           </a:p>
@@ -5263,7 +3434,7 @@
             <a:fld id="{96DFF08F-DC6B-4601-B491-B0F83F6DD2DA}" type="datetimeFigureOut">
               <a:rPr lang="en-US" smtClean="0"/>
               <a:pPr/>
-              <a:t>10/10/2022</a:t>
+              <a:t>10/12/2022</a:t>
             </a:fld>
             <a:endParaRPr lang="en-US" dirty="0"/>
           </a:p>
@@ -5648,7 +3819,7 @@
           <a:p>
             <a:fld id="{96DFF08F-DC6B-4601-B491-B0F83F6DD2DA}" type="datetimeFigureOut">
               <a:rPr lang="en-US" smtClean="0"/>
-              <a:t>10/10/2022</a:t>
+              <a:t>10/12/2022</a:t>
             </a:fld>
             <a:endParaRPr lang="en-US" dirty="0"/>
           </a:p>
@@ -5944,7 +4115,7 @@
             <a:fld id="{96DFF08F-DC6B-4601-B491-B0F83F6DD2DA}" type="datetimeFigureOut">
               <a:rPr lang="en-US" smtClean="0"/>
               <a:pPr/>
-              <a:t>10/10/2022</a:t>
+              <a:t>10/12/2022</a:t>
             </a:fld>
             <a:endParaRPr lang="en-US" dirty="0"/>
           </a:p>

</xml_diff>